<commit_message>
update plots in slides
</commit_message>
<xml_diff>
--- a/Presentation/Social_Media_Impact_final_ppt.pptx
+++ b/Presentation/Social_Media_Impact_final_ppt.pptx
@@ -130,7 +130,7 @@
   </p:defaultTextStyle>
   <p:extLst>
     <p:ext uri="{EFAFB233-063F-42B5-8137-9DF3F51BA10A}">
-      <p15:sldGuideLst xmlns:p15="http://schemas.microsoft.com/office/powerpoint/2012/main">
+      <p15:sldGuideLst xmlns:p15="http://schemas.microsoft.com/office/powerpoint/2012/main" xmlns="">
         <p15:guide id="1" orient="horz" pos="2160">
           <p15:clr>
             <a:srgbClr val="A4A3A4"/>
@@ -288,7 +288,7 @@
             <a:fld id="{3F9AFA87-1417-4992-ABD9-27C3BC8CC883}" type="datetimeFigureOut">
               <a:rPr lang="en-US" smtClean="0"/>
               <a:pPr algn="r"/>
-              <a:t>2022-04-07</a:t>
+              <a:t>4/7/2022</a:t>
             </a:fld>
             <a:endParaRPr lang="en-US" dirty="0"/>
           </a:p>
@@ -500,7 +500,7 @@
           <a:p>
             <a:fld id="{3F9AFA87-1417-4992-ABD9-27C3BC8CC883}" type="datetimeFigureOut">
               <a:rPr lang="en-US" smtClean="0"/>
-              <a:t>2022-04-07</a:t>
+              <a:t>4/7/2022</a:t>
             </a:fld>
             <a:endParaRPr lang="en-US"/>
           </a:p>
@@ -715,7 +715,7 @@
           <a:p>
             <a:fld id="{3F9AFA87-1417-4992-ABD9-27C3BC8CC883}" type="datetimeFigureOut">
               <a:rPr lang="en-US" smtClean="0"/>
-              <a:t>2022-04-07</a:t>
+              <a:t>4/7/2022</a:t>
             </a:fld>
             <a:endParaRPr lang="en-US"/>
           </a:p>
@@ -916,7 +916,7 @@
           <a:p>
             <a:fld id="{3F9AFA87-1417-4992-ABD9-27C3BC8CC883}" type="datetimeFigureOut">
               <a:rPr lang="en-US" smtClean="0"/>
-              <a:t>2022-04-07</a:t>
+              <a:t>4/7/2022</a:t>
             </a:fld>
             <a:endParaRPr lang="en-US"/>
           </a:p>
@@ -1195,7 +1195,7 @@
           <a:p>
             <a:fld id="{3F9AFA87-1417-4992-ABD9-27C3BC8CC883}" type="datetimeFigureOut">
               <a:rPr lang="en-US" smtClean="0"/>
-              <a:t>2022-04-07</a:t>
+              <a:t>4/7/2022</a:t>
             </a:fld>
             <a:endParaRPr lang="en-US"/>
           </a:p>
@@ -1463,7 +1463,7 @@
           <a:p>
             <a:fld id="{3F9AFA87-1417-4992-ABD9-27C3BC8CC883}" type="datetimeFigureOut">
               <a:rPr lang="en-US" smtClean="0"/>
-              <a:t>2022-04-07</a:t>
+              <a:t>4/7/2022</a:t>
             </a:fld>
             <a:endParaRPr lang="en-US" dirty="0"/>
           </a:p>
@@ -1879,7 +1879,7 @@
           <a:p>
             <a:fld id="{3F9AFA87-1417-4992-ABD9-27C3BC8CC883}" type="datetimeFigureOut">
               <a:rPr lang="en-US" smtClean="0"/>
-              <a:t>2022-04-07</a:t>
+              <a:t>4/7/2022</a:t>
             </a:fld>
             <a:endParaRPr lang="en-US"/>
           </a:p>
@@ -2028,7 +2028,7 @@
           <a:p>
             <a:fld id="{3F9AFA87-1417-4992-ABD9-27C3BC8CC883}" type="datetimeFigureOut">
               <a:rPr lang="en-US" smtClean="0"/>
-              <a:t>2022-04-07</a:t>
+              <a:t>4/7/2022</a:t>
             </a:fld>
             <a:endParaRPr lang="en-US"/>
           </a:p>
@@ -2154,7 +2154,7 @@
           <a:p>
             <a:fld id="{3F9AFA87-1417-4992-ABD9-27C3BC8CC883}" type="datetimeFigureOut">
               <a:rPr lang="en-US" smtClean="0"/>
-              <a:t>2022-04-07</a:t>
+              <a:t>4/7/2022</a:t>
             </a:fld>
             <a:endParaRPr lang="en-US"/>
           </a:p>
@@ -2405,7 +2405,7 @@
           <a:p>
             <a:fld id="{3F9AFA87-1417-4992-ABD9-27C3BC8CC883}" type="datetimeFigureOut">
               <a:rPr lang="en-US" smtClean="0"/>
-              <a:t>2022-04-07</a:t>
+              <a:t>4/7/2022</a:t>
             </a:fld>
             <a:endParaRPr lang="en-US"/>
           </a:p>
@@ -2850,7 +2850,7 @@
           <a:p>
             <a:fld id="{3F9AFA87-1417-4992-ABD9-27C3BC8CC883}" type="datetimeFigureOut">
               <a:rPr lang="en-US" smtClean="0"/>
-              <a:t>2022-04-07</a:t>
+              <a:t>4/7/2022</a:t>
             </a:fld>
             <a:endParaRPr lang="en-US"/>
           </a:p>
@@ -3179,7 +3179,7 @@
             <a:fld id="{3F9AFA87-1417-4992-ABD9-27C3BC8CC883}" type="datetimeFigureOut">
               <a:rPr lang="en-US" smtClean="0"/>
               <a:pPr algn="r"/>
-              <a:t>2022-04-07</a:t>
+              <a:t>4/7/2022</a:t>
             </a:fld>
             <a:endParaRPr lang="en-US" dirty="0"/>
           </a:p>
@@ -3695,10 +3695,10 @@
           <p:cNvPr id="7" name="Rectangle 6">
             <a:extLst>
               <a:ext uri="{FF2B5EF4-FFF2-40B4-BE49-F238E27FC236}">
-                <a16:creationId xmlns:a16="http://schemas.microsoft.com/office/drawing/2014/main" id="{23522FE7-5A29-4EF6-B1EF-2CA55748A772}"/>
+                <a16:creationId xmlns:a16="http://schemas.microsoft.com/office/drawing/2014/main" xmlns="" id="{23522FE7-5A29-4EF6-B1EF-2CA55748A772}"/>
               </a:ext>
               <a:ext uri="{C183D7F6-B498-43B3-948B-1728B52AA6E4}">
-                <adec:decorative xmlns:adec="http://schemas.microsoft.com/office/drawing/2017/decorative" val="1"/>
+                <adec:decorative xmlns:adec="http://schemas.microsoft.com/office/drawing/2017/decorative" xmlns="" val="1"/>
               </a:ext>
             </a:extLst>
           </p:cNvPr>
@@ -3708,7 +3708,7 @@
           <p:nvPr>
             <p:extLst>
               <p:ext uri="{386F3935-93C4-4BCD-93E2-E3B085C9AB24}">
-                <p16:designElem xmlns:p16="http://schemas.microsoft.com/office/powerpoint/2015/main" val="1"/>
+                <p16:designElem xmlns:p16="http://schemas.microsoft.com/office/powerpoint/2015/main" xmlns="" val="1"/>
               </p:ext>
             </p:extLst>
           </p:nvPr>
@@ -3761,10 +3761,10 @@
           <p:cNvPr id="9" name="Picture 8">
             <a:extLst>
               <a:ext uri="{FF2B5EF4-FFF2-40B4-BE49-F238E27FC236}">
-                <a16:creationId xmlns:a16="http://schemas.microsoft.com/office/drawing/2014/main" id="{C2192E09-EBC7-416C-B887-DFF915D7F43D}"/>
+                <a16:creationId xmlns:a16="http://schemas.microsoft.com/office/drawing/2014/main" xmlns="" id="{C2192E09-EBC7-416C-B887-DFF915D7F43D}"/>
               </a:ext>
               <a:ext uri="{C183D7F6-B498-43B3-948B-1728B52AA6E4}">
-                <adec:decorative xmlns:adec="http://schemas.microsoft.com/office/drawing/2017/decorative" val="1"/>
+                <adec:decorative xmlns:adec="http://schemas.microsoft.com/office/drawing/2017/decorative" xmlns="" val="1"/>
               </a:ext>
             </a:extLst>
           </p:cNvPr>
@@ -3774,7 +3774,7 @@
           <p:nvPr>
             <p:extLst>
               <p:ext uri="{386F3935-93C4-4BCD-93E2-E3B085C9AB24}">
-                <p16:designElem xmlns:p16="http://schemas.microsoft.com/office/powerpoint/2015/main" val="1"/>
+                <p16:designElem xmlns:p16="http://schemas.microsoft.com/office/powerpoint/2015/main" xmlns="" val="1"/>
               </p:ext>
             </p:extLst>
           </p:nvPr>
@@ -3805,10 +3805,10 @@
           <p:cNvPr id="11" name="Straight Connector 10">
             <a:extLst>
               <a:ext uri="{FF2B5EF4-FFF2-40B4-BE49-F238E27FC236}">
-                <a16:creationId xmlns:a16="http://schemas.microsoft.com/office/drawing/2014/main" id="{2924498D-E084-44BE-A196-CFCE35564350}"/>
+                <a16:creationId xmlns:a16="http://schemas.microsoft.com/office/drawing/2014/main" xmlns="" id="{2924498D-E084-44BE-A196-CFCE35564350}"/>
               </a:ext>
               <a:ext uri="{C183D7F6-B498-43B3-948B-1728B52AA6E4}">
-                <adec:decorative xmlns:adec="http://schemas.microsoft.com/office/drawing/2017/decorative" val="1"/>
+                <adec:decorative xmlns:adec="http://schemas.microsoft.com/office/drawing/2017/decorative" xmlns="" val="1"/>
               </a:ext>
             </a:extLst>
           </p:cNvPr>
@@ -3818,7 +3818,7 @@
           <p:nvPr>
             <p:extLst>
               <p:ext uri="{386F3935-93C4-4BCD-93E2-E3B085C9AB24}">
-                <p16:designElem xmlns:p16="http://schemas.microsoft.com/office/powerpoint/2015/main" val="1"/>
+                <p16:designElem xmlns:p16="http://schemas.microsoft.com/office/powerpoint/2015/main" xmlns="" val="1"/>
               </p:ext>
             </p:extLst>
           </p:nvPr>
@@ -3859,10 +3859,10 @@
           <p:cNvPr id="13" name="Straight Connector 12">
             <a:extLst>
               <a:ext uri="{FF2B5EF4-FFF2-40B4-BE49-F238E27FC236}">
-                <a16:creationId xmlns:a16="http://schemas.microsoft.com/office/drawing/2014/main" id="{3BBC7667-C352-4842-9AFD-E5C16AD002F4}"/>
+                <a16:creationId xmlns:a16="http://schemas.microsoft.com/office/drawing/2014/main" xmlns="" id="{3BBC7667-C352-4842-9AFD-E5C16AD002F4}"/>
               </a:ext>
               <a:ext uri="{C183D7F6-B498-43B3-948B-1728B52AA6E4}">
-                <adec:decorative xmlns:adec="http://schemas.microsoft.com/office/drawing/2017/decorative" val="1"/>
+                <adec:decorative xmlns:adec="http://schemas.microsoft.com/office/drawing/2017/decorative" xmlns="" val="1"/>
               </a:ext>
             </a:extLst>
           </p:cNvPr>
@@ -3872,7 +3872,7 @@
           <p:nvPr>
             <p:extLst>
               <p:ext uri="{386F3935-93C4-4BCD-93E2-E3B085C9AB24}">
-                <p16:designElem xmlns:p16="http://schemas.microsoft.com/office/powerpoint/2015/main" val="1"/>
+                <p16:designElem xmlns:p16="http://schemas.microsoft.com/office/powerpoint/2015/main" xmlns="" val="1"/>
               </p:ext>
             </p:extLst>
           </p:nvPr>
@@ -3907,10 +3907,10 @@
           <p:cNvPr id="15" name="Rectangle 14">
             <a:extLst>
               <a:ext uri="{FF2B5EF4-FFF2-40B4-BE49-F238E27FC236}">
-                <a16:creationId xmlns:a16="http://schemas.microsoft.com/office/drawing/2014/main" id="{F0AB17F6-592B-45CB-96F6-705C9825AFBC}"/>
+                <a16:creationId xmlns:a16="http://schemas.microsoft.com/office/drawing/2014/main" xmlns="" id="{F0AB17F6-592B-45CB-96F6-705C9825AFBC}"/>
               </a:ext>
               <a:ext uri="{C183D7F6-B498-43B3-948B-1728B52AA6E4}">
-                <adec:decorative xmlns:adec="http://schemas.microsoft.com/office/drawing/2017/decorative" val="1"/>
+                <adec:decorative xmlns:adec="http://schemas.microsoft.com/office/drawing/2017/decorative" xmlns="" val="1"/>
               </a:ext>
             </a:extLst>
           </p:cNvPr>
@@ -3920,7 +3920,7 @@
           <p:nvPr>
             <p:extLst>
               <p:ext uri="{386F3935-93C4-4BCD-93E2-E3B085C9AB24}">
-                <p16:designElem xmlns:p16="http://schemas.microsoft.com/office/powerpoint/2015/main" val="1"/>
+                <p16:designElem xmlns:p16="http://schemas.microsoft.com/office/powerpoint/2015/main" xmlns="" val="1"/>
               </p:ext>
             </p:extLst>
           </p:nvPr>
@@ -3967,7 +3967,7 @@
           <p:cNvPr id="2" name="Title 1">
             <a:extLst>
               <a:ext uri="{FF2B5EF4-FFF2-40B4-BE49-F238E27FC236}">
-                <a16:creationId xmlns:a16="http://schemas.microsoft.com/office/drawing/2014/main" id="{6FC29038-DDBC-4BFF-89F4-CE1EC9E6EEB3}"/>
+                <a16:creationId xmlns:a16="http://schemas.microsoft.com/office/drawing/2014/main" xmlns="" id="{6FC29038-DDBC-4BFF-89F4-CE1EC9E6EEB3}"/>
               </a:ext>
             </a:extLst>
           </p:cNvPr>
@@ -4003,10 +4003,10 @@
           <p:cNvPr id="17" name="Straight Connector 16">
             <a:extLst>
               <a:ext uri="{FF2B5EF4-FFF2-40B4-BE49-F238E27FC236}">
-                <a16:creationId xmlns:a16="http://schemas.microsoft.com/office/drawing/2014/main" id="{5A9284E7-0823-472D-9963-18D89DFEB8B4}"/>
+                <a16:creationId xmlns:a16="http://schemas.microsoft.com/office/drawing/2014/main" xmlns="" id="{5A9284E7-0823-472D-9963-18D89DFEB8B4}"/>
               </a:ext>
               <a:ext uri="{C183D7F6-B498-43B3-948B-1728B52AA6E4}">
-                <adec:decorative xmlns:adec="http://schemas.microsoft.com/office/drawing/2017/decorative" val="1"/>
+                <adec:decorative xmlns:adec="http://schemas.microsoft.com/office/drawing/2017/decorative" xmlns="" val="1"/>
               </a:ext>
             </a:extLst>
           </p:cNvPr>
@@ -4016,7 +4016,7 @@
           <p:nvPr>
             <p:extLst>
               <p:ext uri="{386F3935-93C4-4BCD-93E2-E3B085C9AB24}">
-                <p16:designElem xmlns:p16="http://schemas.microsoft.com/office/powerpoint/2015/main" val="1"/>
+                <p16:designElem xmlns:p16="http://schemas.microsoft.com/office/powerpoint/2015/main" xmlns="" val="1"/>
               </p:ext>
             </p:extLst>
           </p:nvPr>
@@ -4105,10 +4105,10 @@
           <p:cNvPr id="7" name="Rectangle 6">
             <a:extLst>
               <a:ext uri="{FF2B5EF4-FFF2-40B4-BE49-F238E27FC236}">
-                <a16:creationId xmlns:a16="http://schemas.microsoft.com/office/drawing/2014/main" id="{23522FE7-5A29-4EF6-B1EF-2CA55748A772}"/>
+                <a16:creationId xmlns:a16="http://schemas.microsoft.com/office/drawing/2014/main" xmlns="" id="{23522FE7-5A29-4EF6-B1EF-2CA55748A772}"/>
               </a:ext>
               <a:ext uri="{C183D7F6-B498-43B3-948B-1728B52AA6E4}">
-                <adec:decorative xmlns:adec="http://schemas.microsoft.com/office/drawing/2017/decorative" val="1"/>
+                <adec:decorative xmlns:adec="http://schemas.microsoft.com/office/drawing/2017/decorative" xmlns="" val="1"/>
               </a:ext>
             </a:extLst>
           </p:cNvPr>
@@ -4118,7 +4118,7 @@
           <p:nvPr>
             <p:extLst>
               <p:ext uri="{386F3935-93C4-4BCD-93E2-E3B085C9AB24}">
-                <p16:designElem xmlns:p16="http://schemas.microsoft.com/office/powerpoint/2015/main" val="1"/>
+                <p16:designElem xmlns:p16="http://schemas.microsoft.com/office/powerpoint/2015/main" xmlns="" val="1"/>
               </p:ext>
             </p:extLst>
           </p:nvPr>
@@ -4171,10 +4171,10 @@
           <p:cNvPr id="9" name="Picture 8">
             <a:extLst>
               <a:ext uri="{FF2B5EF4-FFF2-40B4-BE49-F238E27FC236}">
-                <a16:creationId xmlns:a16="http://schemas.microsoft.com/office/drawing/2014/main" id="{C2192E09-EBC7-416C-B887-DFF915D7F43D}"/>
+                <a16:creationId xmlns:a16="http://schemas.microsoft.com/office/drawing/2014/main" xmlns="" id="{C2192E09-EBC7-416C-B887-DFF915D7F43D}"/>
               </a:ext>
               <a:ext uri="{C183D7F6-B498-43B3-948B-1728B52AA6E4}">
-                <adec:decorative xmlns:adec="http://schemas.microsoft.com/office/drawing/2017/decorative" val="1"/>
+                <adec:decorative xmlns:adec="http://schemas.microsoft.com/office/drawing/2017/decorative" xmlns="" val="1"/>
               </a:ext>
             </a:extLst>
           </p:cNvPr>
@@ -4184,7 +4184,7 @@
           <p:nvPr>
             <p:extLst>
               <p:ext uri="{386F3935-93C4-4BCD-93E2-E3B085C9AB24}">
-                <p16:designElem xmlns:p16="http://schemas.microsoft.com/office/powerpoint/2015/main" val="1"/>
+                <p16:designElem xmlns:p16="http://schemas.microsoft.com/office/powerpoint/2015/main" xmlns="" val="1"/>
               </p:ext>
             </p:extLst>
           </p:nvPr>
@@ -4215,10 +4215,10 @@
           <p:cNvPr id="11" name="Straight Connector 10">
             <a:extLst>
               <a:ext uri="{FF2B5EF4-FFF2-40B4-BE49-F238E27FC236}">
-                <a16:creationId xmlns:a16="http://schemas.microsoft.com/office/drawing/2014/main" id="{2924498D-E084-44BE-A196-CFCE35564350}"/>
+                <a16:creationId xmlns:a16="http://schemas.microsoft.com/office/drawing/2014/main" xmlns="" id="{2924498D-E084-44BE-A196-CFCE35564350}"/>
               </a:ext>
               <a:ext uri="{C183D7F6-B498-43B3-948B-1728B52AA6E4}">
-                <adec:decorative xmlns:adec="http://schemas.microsoft.com/office/drawing/2017/decorative" val="1"/>
+                <adec:decorative xmlns:adec="http://schemas.microsoft.com/office/drawing/2017/decorative" xmlns="" val="1"/>
               </a:ext>
             </a:extLst>
           </p:cNvPr>
@@ -4228,7 +4228,7 @@
           <p:nvPr>
             <p:extLst>
               <p:ext uri="{386F3935-93C4-4BCD-93E2-E3B085C9AB24}">
-                <p16:designElem xmlns:p16="http://schemas.microsoft.com/office/powerpoint/2015/main" val="1"/>
+                <p16:designElem xmlns:p16="http://schemas.microsoft.com/office/powerpoint/2015/main" xmlns="" val="1"/>
               </p:ext>
             </p:extLst>
           </p:nvPr>
@@ -4269,10 +4269,10 @@
           <p:cNvPr id="13" name="Straight Connector 12">
             <a:extLst>
               <a:ext uri="{FF2B5EF4-FFF2-40B4-BE49-F238E27FC236}">
-                <a16:creationId xmlns:a16="http://schemas.microsoft.com/office/drawing/2014/main" id="{3BBC7667-C352-4842-9AFD-E5C16AD002F4}"/>
+                <a16:creationId xmlns:a16="http://schemas.microsoft.com/office/drawing/2014/main" xmlns="" id="{3BBC7667-C352-4842-9AFD-E5C16AD002F4}"/>
               </a:ext>
               <a:ext uri="{C183D7F6-B498-43B3-948B-1728B52AA6E4}">
-                <adec:decorative xmlns:adec="http://schemas.microsoft.com/office/drawing/2017/decorative" val="1"/>
+                <adec:decorative xmlns:adec="http://schemas.microsoft.com/office/drawing/2017/decorative" xmlns="" val="1"/>
               </a:ext>
             </a:extLst>
           </p:cNvPr>
@@ -4282,7 +4282,7 @@
           <p:nvPr>
             <p:extLst>
               <p:ext uri="{386F3935-93C4-4BCD-93E2-E3B085C9AB24}">
-                <p16:designElem xmlns:p16="http://schemas.microsoft.com/office/powerpoint/2015/main" val="1"/>
+                <p16:designElem xmlns:p16="http://schemas.microsoft.com/office/powerpoint/2015/main" xmlns="" val="1"/>
               </p:ext>
             </p:extLst>
           </p:nvPr>
@@ -4317,10 +4317,10 @@
           <p:cNvPr id="15" name="Rectangle 14">
             <a:extLst>
               <a:ext uri="{FF2B5EF4-FFF2-40B4-BE49-F238E27FC236}">
-                <a16:creationId xmlns:a16="http://schemas.microsoft.com/office/drawing/2014/main" id="{F0AB17F6-592B-45CB-96F6-705C9825AFBC}"/>
+                <a16:creationId xmlns:a16="http://schemas.microsoft.com/office/drawing/2014/main" xmlns="" id="{F0AB17F6-592B-45CB-96F6-705C9825AFBC}"/>
               </a:ext>
               <a:ext uri="{C183D7F6-B498-43B3-948B-1728B52AA6E4}">
-                <adec:decorative xmlns:adec="http://schemas.microsoft.com/office/drawing/2017/decorative" val="1"/>
+                <adec:decorative xmlns:adec="http://schemas.microsoft.com/office/drawing/2017/decorative" xmlns="" val="1"/>
               </a:ext>
             </a:extLst>
           </p:cNvPr>
@@ -4330,7 +4330,7 @@
           <p:nvPr>
             <p:extLst>
               <p:ext uri="{386F3935-93C4-4BCD-93E2-E3B085C9AB24}">
-                <p16:designElem xmlns:p16="http://schemas.microsoft.com/office/powerpoint/2015/main" val="1"/>
+                <p16:designElem xmlns:p16="http://schemas.microsoft.com/office/powerpoint/2015/main" xmlns="" val="1"/>
               </p:ext>
             </p:extLst>
           </p:nvPr>
@@ -4377,7 +4377,7 @@
           <p:cNvPr id="2" name="Title 1">
             <a:extLst>
               <a:ext uri="{FF2B5EF4-FFF2-40B4-BE49-F238E27FC236}">
-                <a16:creationId xmlns:a16="http://schemas.microsoft.com/office/drawing/2014/main" id="{6FC29038-DDBC-4BFF-89F4-CE1EC9E6EEB3}"/>
+                <a16:creationId xmlns:a16="http://schemas.microsoft.com/office/drawing/2014/main" xmlns="" id="{6FC29038-DDBC-4BFF-89F4-CE1EC9E6EEB3}"/>
               </a:ext>
             </a:extLst>
           </p:cNvPr>
@@ -4417,10 +4417,10 @@
           <p:cNvPr id="17" name="Straight Connector 16">
             <a:extLst>
               <a:ext uri="{FF2B5EF4-FFF2-40B4-BE49-F238E27FC236}">
-                <a16:creationId xmlns:a16="http://schemas.microsoft.com/office/drawing/2014/main" id="{5A9284E7-0823-472D-9963-18D89DFEB8B4}"/>
+                <a16:creationId xmlns:a16="http://schemas.microsoft.com/office/drawing/2014/main" xmlns="" id="{5A9284E7-0823-472D-9963-18D89DFEB8B4}"/>
               </a:ext>
               <a:ext uri="{C183D7F6-B498-43B3-948B-1728B52AA6E4}">
-                <adec:decorative xmlns:adec="http://schemas.microsoft.com/office/drawing/2017/decorative" val="1"/>
+                <adec:decorative xmlns:adec="http://schemas.microsoft.com/office/drawing/2017/decorative" xmlns="" val="1"/>
               </a:ext>
             </a:extLst>
           </p:cNvPr>
@@ -4430,7 +4430,7 @@
           <p:nvPr>
             <p:extLst>
               <p:ext uri="{386F3935-93C4-4BCD-93E2-E3B085C9AB24}">
-                <p16:designElem xmlns:p16="http://schemas.microsoft.com/office/powerpoint/2015/main" val="1"/>
+                <p16:designElem xmlns:p16="http://schemas.microsoft.com/office/powerpoint/2015/main" xmlns="" val="1"/>
               </p:ext>
             </p:extLst>
           </p:nvPr>
@@ -4519,7 +4519,7 @@
           <p:cNvPr id="2" name="Title 1">
             <a:extLst>
               <a:ext uri="{FF2B5EF4-FFF2-40B4-BE49-F238E27FC236}">
-                <a16:creationId xmlns:a16="http://schemas.microsoft.com/office/drawing/2014/main" id="{8889499D-19E6-427B-B727-0C2FA93DD911}"/>
+                <a16:creationId xmlns:a16="http://schemas.microsoft.com/office/drawing/2014/main" xmlns="" id="{8889499D-19E6-427B-B727-0C2FA93DD911}"/>
               </a:ext>
             </a:extLst>
           </p:cNvPr>
@@ -4554,7 +4554,7 @@
           <p:cNvPr id="3" name="Content Placeholder 2">
             <a:extLst>
               <a:ext uri="{FF2B5EF4-FFF2-40B4-BE49-F238E27FC236}">
-                <a16:creationId xmlns:a16="http://schemas.microsoft.com/office/drawing/2014/main" id="{D5267366-8BC9-4150-9547-80CF723798F3}"/>
+                <a16:creationId xmlns:a16="http://schemas.microsoft.com/office/drawing/2014/main" xmlns="" id="{D5267366-8BC9-4150-9547-80CF723798F3}"/>
               </a:ext>
             </a:extLst>
           </p:cNvPr>
@@ -4573,7 +4573,7 @@
         </p:spPr>
         <p:txBody>
           <a:bodyPr>
-            <a:normAutofit/>
+            <a:normAutofit lnSpcReduction="10000"/>
           </a:bodyPr>
           <a:lstStyle/>
           <a:p>
@@ -4601,7 +4601,7 @@
           <p:cNvPr id="5" name="Picture 4" descr="Chart, line chart&#10;&#10;Description automatically generated">
             <a:extLst>
               <a:ext uri="{FF2B5EF4-FFF2-40B4-BE49-F238E27FC236}">
-                <a16:creationId xmlns:a16="http://schemas.microsoft.com/office/drawing/2014/main" id="{6AFBE7AF-C1DD-4418-96F5-8CDF47DBE8B4}"/>
+                <a16:creationId xmlns:a16="http://schemas.microsoft.com/office/drawing/2014/main" xmlns="" id="{6AFBE7AF-C1DD-4418-96F5-8CDF47DBE8B4}"/>
               </a:ext>
             </a:extLst>
           </p:cNvPr>
@@ -4691,10 +4691,10 @@
           <p:cNvPr id="7" name="Rectangle 6">
             <a:extLst>
               <a:ext uri="{FF2B5EF4-FFF2-40B4-BE49-F238E27FC236}">
-                <a16:creationId xmlns:a16="http://schemas.microsoft.com/office/drawing/2014/main" id="{23522FE7-5A29-4EF6-B1EF-2CA55748A772}"/>
+                <a16:creationId xmlns:a16="http://schemas.microsoft.com/office/drawing/2014/main" xmlns="" id="{23522FE7-5A29-4EF6-B1EF-2CA55748A772}"/>
               </a:ext>
               <a:ext uri="{C183D7F6-B498-43B3-948B-1728B52AA6E4}">
-                <adec:decorative xmlns:adec="http://schemas.microsoft.com/office/drawing/2017/decorative" val="1"/>
+                <adec:decorative xmlns:adec="http://schemas.microsoft.com/office/drawing/2017/decorative" xmlns="" val="1"/>
               </a:ext>
             </a:extLst>
           </p:cNvPr>
@@ -4704,7 +4704,7 @@
           <p:nvPr>
             <p:extLst>
               <p:ext uri="{386F3935-93C4-4BCD-93E2-E3B085C9AB24}">
-                <p16:designElem xmlns:p16="http://schemas.microsoft.com/office/powerpoint/2015/main" val="1"/>
+                <p16:designElem xmlns:p16="http://schemas.microsoft.com/office/powerpoint/2015/main" xmlns="" val="1"/>
               </p:ext>
             </p:extLst>
           </p:nvPr>
@@ -4757,10 +4757,10 @@
           <p:cNvPr id="9" name="Picture 8">
             <a:extLst>
               <a:ext uri="{FF2B5EF4-FFF2-40B4-BE49-F238E27FC236}">
-                <a16:creationId xmlns:a16="http://schemas.microsoft.com/office/drawing/2014/main" id="{C2192E09-EBC7-416C-B887-DFF915D7F43D}"/>
+                <a16:creationId xmlns:a16="http://schemas.microsoft.com/office/drawing/2014/main" xmlns="" id="{C2192E09-EBC7-416C-B887-DFF915D7F43D}"/>
               </a:ext>
               <a:ext uri="{C183D7F6-B498-43B3-948B-1728B52AA6E4}">
-                <adec:decorative xmlns:adec="http://schemas.microsoft.com/office/drawing/2017/decorative" val="1"/>
+                <adec:decorative xmlns:adec="http://schemas.microsoft.com/office/drawing/2017/decorative" xmlns="" val="1"/>
               </a:ext>
             </a:extLst>
           </p:cNvPr>
@@ -4770,7 +4770,7 @@
           <p:nvPr>
             <p:extLst>
               <p:ext uri="{386F3935-93C4-4BCD-93E2-E3B085C9AB24}">
-                <p16:designElem xmlns:p16="http://schemas.microsoft.com/office/powerpoint/2015/main" val="1"/>
+                <p16:designElem xmlns:p16="http://schemas.microsoft.com/office/powerpoint/2015/main" xmlns="" val="1"/>
               </p:ext>
             </p:extLst>
           </p:nvPr>
@@ -4801,10 +4801,10 @@
           <p:cNvPr id="11" name="Straight Connector 10">
             <a:extLst>
               <a:ext uri="{FF2B5EF4-FFF2-40B4-BE49-F238E27FC236}">
-                <a16:creationId xmlns:a16="http://schemas.microsoft.com/office/drawing/2014/main" id="{2924498D-E084-44BE-A196-CFCE35564350}"/>
+                <a16:creationId xmlns:a16="http://schemas.microsoft.com/office/drawing/2014/main" xmlns="" id="{2924498D-E084-44BE-A196-CFCE35564350}"/>
               </a:ext>
               <a:ext uri="{C183D7F6-B498-43B3-948B-1728B52AA6E4}">
-                <adec:decorative xmlns:adec="http://schemas.microsoft.com/office/drawing/2017/decorative" val="1"/>
+                <adec:decorative xmlns:adec="http://schemas.microsoft.com/office/drawing/2017/decorative" xmlns="" val="1"/>
               </a:ext>
             </a:extLst>
           </p:cNvPr>
@@ -4814,7 +4814,7 @@
           <p:nvPr>
             <p:extLst>
               <p:ext uri="{386F3935-93C4-4BCD-93E2-E3B085C9AB24}">
-                <p16:designElem xmlns:p16="http://schemas.microsoft.com/office/powerpoint/2015/main" val="1"/>
+                <p16:designElem xmlns:p16="http://schemas.microsoft.com/office/powerpoint/2015/main" xmlns="" val="1"/>
               </p:ext>
             </p:extLst>
           </p:nvPr>
@@ -4855,10 +4855,10 @@
           <p:cNvPr id="13" name="Straight Connector 12">
             <a:extLst>
               <a:ext uri="{FF2B5EF4-FFF2-40B4-BE49-F238E27FC236}">
-                <a16:creationId xmlns:a16="http://schemas.microsoft.com/office/drawing/2014/main" id="{3BBC7667-C352-4842-9AFD-E5C16AD002F4}"/>
+                <a16:creationId xmlns:a16="http://schemas.microsoft.com/office/drawing/2014/main" xmlns="" id="{3BBC7667-C352-4842-9AFD-E5C16AD002F4}"/>
               </a:ext>
               <a:ext uri="{C183D7F6-B498-43B3-948B-1728B52AA6E4}">
-                <adec:decorative xmlns:adec="http://schemas.microsoft.com/office/drawing/2017/decorative" val="1"/>
+                <adec:decorative xmlns:adec="http://schemas.microsoft.com/office/drawing/2017/decorative" xmlns="" val="1"/>
               </a:ext>
             </a:extLst>
           </p:cNvPr>
@@ -4868,7 +4868,7 @@
           <p:nvPr>
             <p:extLst>
               <p:ext uri="{386F3935-93C4-4BCD-93E2-E3B085C9AB24}">
-                <p16:designElem xmlns:p16="http://schemas.microsoft.com/office/powerpoint/2015/main" val="1"/>
+                <p16:designElem xmlns:p16="http://schemas.microsoft.com/office/powerpoint/2015/main" xmlns="" val="1"/>
               </p:ext>
             </p:extLst>
           </p:nvPr>
@@ -4903,10 +4903,10 @@
           <p:cNvPr id="15" name="Rectangle 14">
             <a:extLst>
               <a:ext uri="{FF2B5EF4-FFF2-40B4-BE49-F238E27FC236}">
-                <a16:creationId xmlns:a16="http://schemas.microsoft.com/office/drawing/2014/main" id="{F0AB17F6-592B-45CB-96F6-705C9825AFBC}"/>
+                <a16:creationId xmlns:a16="http://schemas.microsoft.com/office/drawing/2014/main" xmlns="" id="{F0AB17F6-592B-45CB-96F6-705C9825AFBC}"/>
               </a:ext>
               <a:ext uri="{C183D7F6-B498-43B3-948B-1728B52AA6E4}">
-                <adec:decorative xmlns:adec="http://schemas.microsoft.com/office/drawing/2017/decorative" val="1"/>
+                <adec:decorative xmlns:adec="http://schemas.microsoft.com/office/drawing/2017/decorative" xmlns="" val="1"/>
               </a:ext>
             </a:extLst>
           </p:cNvPr>
@@ -4916,7 +4916,7 @@
           <p:nvPr>
             <p:extLst>
               <p:ext uri="{386F3935-93C4-4BCD-93E2-E3B085C9AB24}">
-                <p16:designElem xmlns:p16="http://schemas.microsoft.com/office/powerpoint/2015/main" val="1"/>
+                <p16:designElem xmlns:p16="http://schemas.microsoft.com/office/powerpoint/2015/main" xmlns="" val="1"/>
               </p:ext>
             </p:extLst>
           </p:nvPr>
@@ -4963,7 +4963,7 @@
           <p:cNvPr id="2" name="Title 1">
             <a:extLst>
               <a:ext uri="{FF2B5EF4-FFF2-40B4-BE49-F238E27FC236}">
-                <a16:creationId xmlns:a16="http://schemas.microsoft.com/office/drawing/2014/main" id="{6FC29038-DDBC-4BFF-89F4-CE1EC9E6EEB3}"/>
+                <a16:creationId xmlns:a16="http://schemas.microsoft.com/office/drawing/2014/main" xmlns="" id="{6FC29038-DDBC-4BFF-89F4-CE1EC9E6EEB3}"/>
               </a:ext>
             </a:extLst>
           </p:cNvPr>
@@ -5003,10 +5003,10 @@
           <p:cNvPr id="17" name="Straight Connector 16">
             <a:extLst>
               <a:ext uri="{FF2B5EF4-FFF2-40B4-BE49-F238E27FC236}">
-                <a16:creationId xmlns:a16="http://schemas.microsoft.com/office/drawing/2014/main" id="{5A9284E7-0823-472D-9963-18D89DFEB8B4}"/>
+                <a16:creationId xmlns:a16="http://schemas.microsoft.com/office/drawing/2014/main" xmlns="" id="{5A9284E7-0823-472D-9963-18D89DFEB8B4}"/>
               </a:ext>
               <a:ext uri="{C183D7F6-B498-43B3-948B-1728B52AA6E4}">
-                <adec:decorative xmlns:adec="http://schemas.microsoft.com/office/drawing/2017/decorative" val="1"/>
+                <adec:decorative xmlns:adec="http://schemas.microsoft.com/office/drawing/2017/decorative" xmlns="" val="1"/>
               </a:ext>
             </a:extLst>
           </p:cNvPr>
@@ -5016,7 +5016,7 @@
           <p:nvPr>
             <p:extLst>
               <p:ext uri="{386F3935-93C4-4BCD-93E2-E3B085C9AB24}">
-                <p16:designElem xmlns:p16="http://schemas.microsoft.com/office/powerpoint/2015/main" val="1"/>
+                <p16:designElem xmlns:p16="http://schemas.microsoft.com/office/powerpoint/2015/main" xmlns="" val="1"/>
               </p:ext>
             </p:extLst>
           </p:nvPr>
@@ -5081,7 +5081,7 @@
           <p:cNvPr id="2" name="Title 1">
             <a:extLst>
               <a:ext uri="{FF2B5EF4-FFF2-40B4-BE49-F238E27FC236}">
-                <a16:creationId xmlns:a16="http://schemas.microsoft.com/office/drawing/2014/main" id="{8889499D-19E6-427B-B727-0C2FA93DD911}"/>
+                <a16:creationId xmlns:a16="http://schemas.microsoft.com/office/drawing/2014/main" xmlns="" id="{8889499D-19E6-427B-B727-0C2FA93DD911}"/>
               </a:ext>
             </a:extLst>
           </p:cNvPr>
@@ -5347,10 +5347,10 @@
           <p:cNvPr id="7" name="Rectangle 6">
             <a:extLst>
               <a:ext uri="{FF2B5EF4-FFF2-40B4-BE49-F238E27FC236}">
-                <a16:creationId xmlns:a16="http://schemas.microsoft.com/office/drawing/2014/main" id="{23522FE7-5A29-4EF6-B1EF-2CA55748A772}"/>
+                <a16:creationId xmlns:a16="http://schemas.microsoft.com/office/drawing/2014/main" xmlns="" id="{23522FE7-5A29-4EF6-B1EF-2CA55748A772}"/>
               </a:ext>
               <a:ext uri="{C183D7F6-B498-43B3-948B-1728B52AA6E4}">
-                <adec:decorative xmlns:adec="http://schemas.microsoft.com/office/drawing/2017/decorative" val="1"/>
+                <adec:decorative xmlns:adec="http://schemas.microsoft.com/office/drawing/2017/decorative" xmlns="" val="1"/>
               </a:ext>
             </a:extLst>
           </p:cNvPr>
@@ -5360,7 +5360,7 @@
           <p:nvPr>
             <p:extLst>
               <p:ext uri="{386F3935-93C4-4BCD-93E2-E3B085C9AB24}">
-                <p16:designElem xmlns:p16="http://schemas.microsoft.com/office/powerpoint/2015/main" val="1"/>
+                <p16:designElem xmlns:p16="http://schemas.microsoft.com/office/powerpoint/2015/main" xmlns="" val="1"/>
               </p:ext>
             </p:extLst>
           </p:nvPr>
@@ -5413,10 +5413,10 @@
           <p:cNvPr id="9" name="Picture 8">
             <a:extLst>
               <a:ext uri="{FF2B5EF4-FFF2-40B4-BE49-F238E27FC236}">
-                <a16:creationId xmlns:a16="http://schemas.microsoft.com/office/drawing/2014/main" id="{C2192E09-EBC7-416C-B887-DFF915D7F43D}"/>
+                <a16:creationId xmlns:a16="http://schemas.microsoft.com/office/drawing/2014/main" xmlns="" id="{C2192E09-EBC7-416C-B887-DFF915D7F43D}"/>
               </a:ext>
               <a:ext uri="{C183D7F6-B498-43B3-948B-1728B52AA6E4}">
-                <adec:decorative xmlns:adec="http://schemas.microsoft.com/office/drawing/2017/decorative" val="1"/>
+                <adec:decorative xmlns:adec="http://schemas.microsoft.com/office/drawing/2017/decorative" xmlns="" val="1"/>
               </a:ext>
             </a:extLst>
           </p:cNvPr>
@@ -5426,7 +5426,7 @@
           <p:nvPr>
             <p:extLst>
               <p:ext uri="{386F3935-93C4-4BCD-93E2-E3B085C9AB24}">
-                <p16:designElem xmlns:p16="http://schemas.microsoft.com/office/powerpoint/2015/main" val="1"/>
+                <p16:designElem xmlns:p16="http://schemas.microsoft.com/office/powerpoint/2015/main" xmlns="" val="1"/>
               </p:ext>
             </p:extLst>
           </p:nvPr>
@@ -5457,10 +5457,10 @@
           <p:cNvPr id="11" name="Straight Connector 10">
             <a:extLst>
               <a:ext uri="{FF2B5EF4-FFF2-40B4-BE49-F238E27FC236}">
-                <a16:creationId xmlns:a16="http://schemas.microsoft.com/office/drawing/2014/main" id="{2924498D-E084-44BE-A196-CFCE35564350}"/>
+                <a16:creationId xmlns:a16="http://schemas.microsoft.com/office/drawing/2014/main" xmlns="" id="{2924498D-E084-44BE-A196-CFCE35564350}"/>
               </a:ext>
               <a:ext uri="{C183D7F6-B498-43B3-948B-1728B52AA6E4}">
-                <adec:decorative xmlns:adec="http://schemas.microsoft.com/office/drawing/2017/decorative" val="1"/>
+                <adec:decorative xmlns:adec="http://schemas.microsoft.com/office/drawing/2017/decorative" xmlns="" val="1"/>
               </a:ext>
             </a:extLst>
           </p:cNvPr>
@@ -5470,7 +5470,7 @@
           <p:nvPr>
             <p:extLst>
               <p:ext uri="{386F3935-93C4-4BCD-93E2-E3B085C9AB24}">
-                <p16:designElem xmlns:p16="http://schemas.microsoft.com/office/powerpoint/2015/main" val="1"/>
+                <p16:designElem xmlns:p16="http://schemas.microsoft.com/office/powerpoint/2015/main" xmlns="" val="1"/>
               </p:ext>
             </p:extLst>
           </p:nvPr>
@@ -5511,10 +5511,10 @@
           <p:cNvPr id="13" name="Straight Connector 12">
             <a:extLst>
               <a:ext uri="{FF2B5EF4-FFF2-40B4-BE49-F238E27FC236}">
-                <a16:creationId xmlns:a16="http://schemas.microsoft.com/office/drawing/2014/main" id="{3BBC7667-C352-4842-9AFD-E5C16AD002F4}"/>
+                <a16:creationId xmlns:a16="http://schemas.microsoft.com/office/drawing/2014/main" xmlns="" id="{3BBC7667-C352-4842-9AFD-E5C16AD002F4}"/>
               </a:ext>
               <a:ext uri="{C183D7F6-B498-43B3-948B-1728B52AA6E4}">
-                <adec:decorative xmlns:adec="http://schemas.microsoft.com/office/drawing/2017/decorative" val="1"/>
+                <adec:decorative xmlns:adec="http://schemas.microsoft.com/office/drawing/2017/decorative" xmlns="" val="1"/>
               </a:ext>
             </a:extLst>
           </p:cNvPr>
@@ -5524,7 +5524,7 @@
           <p:nvPr>
             <p:extLst>
               <p:ext uri="{386F3935-93C4-4BCD-93E2-E3B085C9AB24}">
-                <p16:designElem xmlns:p16="http://schemas.microsoft.com/office/powerpoint/2015/main" val="1"/>
+                <p16:designElem xmlns:p16="http://schemas.microsoft.com/office/powerpoint/2015/main" xmlns="" val="1"/>
               </p:ext>
             </p:extLst>
           </p:nvPr>
@@ -5559,10 +5559,10 @@
           <p:cNvPr id="15" name="Rectangle 14">
             <a:extLst>
               <a:ext uri="{FF2B5EF4-FFF2-40B4-BE49-F238E27FC236}">
-                <a16:creationId xmlns:a16="http://schemas.microsoft.com/office/drawing/2014/main" id="{F0AB17F6-592B-45CB-96F6-705C9825AFBC}"/>
+                <a16:creationId xmlns:a16="http://schemas.microsoft.com/office/drawing/2014/main" xmlns="" id="{F0AB17F6-592B-45CB-96F6-705C9825AFBC}"/>
               </a:ext>
               <a:ext uri="{C183D7F6-B498-43B3-948B-1728B52AA6E4}">
-                <adec:decorative xmlns:adec="http://schemas.microsoft.com/office/drawing/2017/decorative" val="1"/>
+                <adec:decorative xmlns:adec="http://schemas.microsoft.com/office/drawing/2017/decorative" xmlns="" val="1"/>
               </a:ext>
             </a:extLst>
           </p:cNvPr>
@@ -5572,7 +5572,7 @@
           <p:nvPr>
             <p:extLst>
               <p:ext uri="{386F3935-93C4-4BCD-93E2-E3B085C9AB24}">
-                <p16:designElem xmlns:p16="http://schemas.microsoft.com/office/powerpoint/2015/main" val="1"/>
+                <p16:designElem xmlns:p16="http://schemas.microsoft.com/office/powerpoint/2015/main" xmlns="" val="1"/>
               </p:ext>
             </p:extLst>
           </p:nvPr>
@@ -5619,7 +5619,7 @@
           <p:cNvPr id="2" name="Title 1">
             <a:extLst>
               <a:ext uri="{FF2B5EF4-FFF2-40B4-BE49-F238E27FC236}">
-                <a16:creationId xmlns:a16="http://schemas.microsoft.com/office/drawing/2014/main" id="{6FC29038-DDBC-4BFF-89F4-CE1EC9E6EEB3}"/>
+                <a16:creationId xmlns:a16="http://schemas.microsoft.com/office/drawing/2014/main" xmlns="" id="{6FC29038-DDBC-4BFF-89F4-CE1EC9E6EEB3}"/>
               </a:ext>
             </a:extLst>
           </p:cNvPr>
@@ -5659,10 +5659,10 @@
           <p:cNvPr id="17" name="Straight Connector 16">
             <a:extLst>
               <a:ext uri="{FF2B5EF4-FFF2-40B4-BE49-F238E27FC236}">
-                <a16:creationId xmlns:a16="http://schemas.microsoft.com/office/drawing/2014/main" id="{5A9284E7-0823-472D-9963-18D89DFEB8B4}"/>
+                <a16:creationId xmlns:a16="http://schemas.microsoft.com/office/drawing/2014/main" xmlns="" id="{5A9284E7-0823-472D-9963-18D89DFEB8B4}"/>
               </a:ext>
               <a:ext uri="{C183D7F6-B498-43B3-948B-1728B52AA6E4}">
-                <adec:decorative xmlns:adec="http://schemas.microsoft.com/office/drawing/2017/decorative" val="1"/>
+                <adec:decorative xmlns:adec="http://schemas.microsoft.com/office/drawing/2017/decorative" xmlns="" val="1"/>
               </a:ext>
             </a:extLst>
           </p:cNvPr>
@@ -5672,7 +5672,7 @@
           <p:nvPr>
             <p:extLst>
               <p:ext uri="{386F3935-93C4-4BCD-93E2-E3B085C9AB24}">
-                <p16:designElem xmlns:p16="http://schemas.microsoft.com/office/powerpoint/2015/main" val="1"/>
+                <p16:designElem xmlns:p16="http://schemas.microsoft.com/office/powerpoint/2015/main" xmlns="" val="1"/>
               </p:ext>
             </p:extLst>
           </p:nvPr>
@@ -5761,7 +5761,7 @@
           <p:cNvPr id="2" name="Title 1">
             <a:extLst>
               <a:ext uri="{FF2B5EF4-FFF2-40B4-BE49-F238E27FC236}">
-                <a16:creationId xmlns:a16="http://schemas.microsoft.com/office/drawing/2014/main" id="{F01D79B6-8945-4B13-8E99-94D3944484CC}"/>
+                <a16:creationId xmlns:a16="http://schemas.microsoft.com/office/drawing/2014/main" xmlns="" id="{F01D79B6-8945-4B13-8E99-94D3944484CC}"/>
               </a:ext>
             </a:extLst>
           </p:cNvPr>
@@ -5797,7 +5797,7 @@
           <p:cNvPr id="62" name="Content Placeholder 61">
             <a:extLst>
               <a:ext uri="{FF2B5EF4-FFF2-40B4-BE49-F238E27FC236}">
-                <a16:creationId xmlns:a16="http://schemas.microsoft.com/office/drawing/2014/main" id="{197D4776-45F9-93C9-A54F-76CB03469F81}"/>
+                <a16:creationId xmlns:a16="http://schemas.microsoft.com/office/drawing/2014/main" xmlns="" id="{197D4776-45F9-93C9-A54F-76CB03469F81}"/>
               </a:ext>
             </a:extLst>
           </p:cNvPr>
@@ -5864,7 +5864,7 @@
       </p:sp>
       <p:pic>
         <p:nvPicPr>
-          <p:cNvPr id="3074" name="Picture 2" descr="C:\Users\quang\Desktop\Class\Social_media_impact\Jupyter_Notebook\analysis\Fig2.png"/>
+          <p:cNvPr id="1026" name="Picture 2" descr="C:\Users\quang\Desktop\Class\Social_media_impact\Jupyter_Notebook\analysis\Fig2.png"/>
           <p:cNvPicPr>
             <a:picLocks noChangeAspect="1" noChangeArrowheads="1"/>
           </p:cNvPicPr>
@@ -5885,7 +5885,7 @@
         </p:blipFill>
         <p:spPr bwMode="auto">
           <a:xfrm>
-            <a:off x="5602065" y="1970734"/>
+            <a:off x="5581530" y="1992157"/>
             <a:ext cx="5486400" cy="3657600"/>
           </a:xfrm>
           <a:prstGeom prst="rect">
@@ -5938,7 +5938,7 @@
           <p:cNvPr id="2" name="Title 1">
             <a:extLst>
               <a:ext uri="{FF2B5EF4-FFF2-40B4-BE49-F238E27FC236}">
-                <a16:creationId xmlns:a16="http://schemas.microsoft.com/office/drawing/2014/main" id="{F01D79B6-8945-4B13-8E99-94D3944484CC}"/>
+                <a16:creationId xmlns:a16="http://schemas.microsoft.com/office/drawing/2014/main" xmlns="" id="{F01D79B6-8945-4B13-8E99-94D3944484CC}"/>
               </a:ext>
             </a:extLst>
           </p:cNvPr>
@@ -5982,7 +5982,7 @@
           <p:cNvPr id="62" name="Content Placeholder 61">
             <a:extLst>
               <a:ext uri="{FF2B5EF4-FFF2-40B4-BE49-F238E27FC236}">
-                <a16:creationId xmlns:a16="http://schemas.microsoft.com/office/drawing/2014/main" id="{197D4776-45F9-93C9-A54F-76CB03469F81}"/>
+                <a16:creationId xmlns:a16="http://schemas.microsoft.com/office/drawing/2014/main" xmlns="" id="{197D4776-45F9-93C9-A54F-76CB03469F81}"/>
               </a:ext>
             </a:extLst>
           </p:cNvPr>
@@ -6049,7 +6049,7 @@
       </p:sp>
       <p:pic>
         <p:nvPicPr>
-          <p:cNvPr id="4098" name="Picture 2" descr="C:\Users\quang\Desktop\Class\Social_media_impact\Jupyter_Notebook\analysis\Fig3.png"/>
+          <p:cNvPr id="2050" name="Picture 2" descr="C:\Users\quang\Desktop\Class\Social_media_impact\Jupyter_Notebook\analysis\Fig3.png"/>
           <p:cNvPicPr>
             <a:picLocks noChangeAspect="1" noChangeArrowheads="1"/>
           </p:cNvPicPr>
@@ -6070,7 +6070,7 @@
         </p:blipFill>
         <p:spPr bwMode="auto">
           <a:xfrm>
-            <a:off x="5582657" y="1970712"/>
+            <a:off x="5580871" y="1992756"/>
             <a:ext cx="5486400" cy="3657600"/>
           </a:xfrm>
           <a:prstGeom prst="rect">
@@ -6123,7 +6123,7 @@
           <p:cNvPr id="2" name="Title 1">
             <a:extLst>
               <a:ext uri="{FF2B5EF4-FFF2-40B4-BE49-F238E27FC236}">
-                <a16:creationId xmlns:a16="http://schemas.microsoft.com/office/drawing/2014/main" id="{F01D79B6-8945-4B13-8E99-94D3944484CC}"/>
+                <a16:creationId xmlns:a16="http://schemas.microsoft.com/office/drawing/2014/main" xmlns="" id="{F01D79B6-8945-4B13-8E99-94D3944484CC}"/>
               </a:ext>
             </a:extLst>
           </p:cNvPr>
@@ -6156,7 +6156,7 @@
       </p:sp>
       <p:pic>
         <p:nvPicPr>
-          <p:cNvPr id="5122" name="Picture 2" descr="C:\Users\quang\Desktop\Class\Social_media_impact\Jupyter_Notebook\analysis\Fig4.png"/>
+          <p:cNvPr id="3075" name="Picture 3" descr="C:\Users\quang\Desktop\Class\Social_media_impact\Jupyter_Notebook\analysis\Fig4.png"/>
           <p:cNvPicPr>
             <a:picLocks noChangeAspect="1" noChangeArrowheads="1"/>
           </p:cNvPicPr>
@@ -6177,8 +6177,8 @@
         </p:blipFill>
         <p:spPr bwMode="auto">
           <a:xfrm>
-            <a:off x="3258356" y="1971236"/>
-            <a:ext cx="5785386" cy="3856924"/>
+            <a:off x="2311878" y="1988742"/>
+            <a:ext cx="7962121" cy="3981061"/>
           </a:xfrm>
           <a:prstGeom prst="rect">
             <a:avLst/>
@@ -6254,10 +6254,10 @@
           <p:cNvPr id="7" name="Rectangle 6">
             <a:extLst>
               <a:ext uri="{FF2B5EF4-FFF2-40B4-BE49-F238E27FC236}">
-                <a16:creationId xmlns:a16="http://schemas.microsoft.com/office/drawing/2014/main" id="{23522FE7-5A29-4EF6-B1EF-2CA55748A772}"/>
+                <a16:creationId xmlns:a16="http://schemas.microsoft.com/office/drawing/2014/main" xmlns="" id="{23522FE7-5A29-4EF6-B1EF-2CA55748A772}"/>
               </a:ext>
               <a:ext uri="{C183D7F6-B498-43B3-948B-1728B52AA6E4}">
-                <adec:decorative xmlns:adec="http://schemas.microsoft.com/office/drawing/2017/decorative" val="1"/>
+                <adec:decorative xmlns:adec="http://schemas.microsoft.com/office/drawing/2017/decorative" xmlns="" val="1"/>
               </a:ext>
             </a:extLst>
           </p:cNvPr>
@@ -6267,7 +6267,7 @@
           <p:nvPr>
             <p:extLst>
               <p:ext uri="{386F3935-93C4-4BCD-93E2-E3B085C9AB24}">
-                <p16:designElem xmlns:p16="http://schemas.microsoft.com/office/powerpoint/2015/main" val="1"/>
+                <p16:designElem xmlns:p16="http://schemas.microsoft.com/office/powerpoint/2015/main" xmlns="" val="1"/>
               </p:ext>
             </p:extLst>
           </p:nvPr>
@@ -6320,10 +6320,10 @@
           <p:cNvPr id="9" name="Picture 8">
             <a:extLst>
               <a:ext uri="{FF2B5EF4-FFF2-40B4-BE49-F238E27FC236}">
-                <a16:creationId xmlns:a16="http://schemas.microsoft.com/office/drawing/2014/main" id="{C2192E09-EBC7-416C-B887-DFF915D7F43D}"/>
+                <a16:creationId xmlns:a16="http://schemas.microsoft.com/office/drawing/2014/main" xmlns="" id="{C2192E09-EBC7-416C-B887-DFF915D7F43D}"/>
               </a:ext>
               <a:ext uri="{C183D7F6-B498-43B3-948B-1728B52AA6E4}">
-                <adec:decorative xmlns:adec="http://schemas.microsoft.com/office/drawing/2017/decorative" val="1"/>
+                <adec:decorative xmlns:adec="http://schemas.microsoft.com/office/drawing/2017/decorative" xmlns="" val="1"/>
               </a:ext>
             </a:extLst>
           </p:cNvPr>
@@ -6333,7 +6333,7 @@
           <p:nvPr>
             <p:extLst>
               <p:ext uri="{386F3935-93C4-4BCD-93E2-E3B085C9AB24}">
-                <p16:designElem xmlns:p16="http://schemas.microsoft.com/office/powerpoint/2015/main" val="1"/>
+                <p16:designElem xmlns:p16="http://schemas.microsoft.com/office/powerpoint/2015/main" xmlns="" val="1"/>
               </p:ext>
             </p:extLst>
           </p:nvPr>
@@ -6364,10 +6364,10 @@
           <p:cNvPr id="11" name="Straight Connector 10">
             <a:extLst>
               <a:ext uri="{FF2B5EF4-FFF2-40B4-BE49-F238E27FC236}">
-                <a16:creationId xmlns:a16="http://schemas.microsoft.com/office/drawing/2014/main" id="{2924498D-E084-44BE-A196-CFCE35564350}"/>
+                <a16:creationId xmlns:a16="http://schemas.microsoft.com/office/drawing/2014/main" xmlns="" id="{2924498D-E084-44BE-A196-CFCE35564350}"/>
               </a:ext>
               <a:ext uri="{C183D7F6-B498-43B3-948B-1728B52AA6E4}">
-                <adec:decorative xmlns:adec="http://schemas.microsoft.com/office/drawing/2017/decorative" val="1"/>
+                <adec:decorative xmlns:adec="http://schemas.microsoft.com/office/drawing/2017/decorative" xmlns="" val="1"/>
               </a:ext>
             </a:extLst>
           </p:cNvPr>
@@ -6377,7 +6377,7 @@
           <p:nvPr>
             <p:extLst>
               <p:ext uri="{386F3935-93C4-4BCD-93E2-E3B085C9AB24}">
-                <p16:designElem xmlns:p16="http://schemas.microsoft.com/office/powerpoint/2015/main" val="1"/>
+                <p16:designElem xmlns:p16="http://schemas.microsoft.com/office/powerpoint/2015/main" xmlns="" val="1"/>
               </p:ext>
             </p:extLst>
           </p:nvPr>
@@ -6418,10 +6418,10 @@
           <p:cNvPr id="13" name="Straight Connector 12">
             <a:extLst>
               <a:ext uri="{FF2B5EF4-FFF2-40B4-BE49-F238E27FC236}">
-                <a16:creationId xmlns:a16="http://schemas.microsoft.com/office/drawing/2014/main" id="{3BBC7667-C352-4842-9AFD-E5C16AD002F4}"/>
+                <a16:creationId xmlns:a16="http://schemas.microsoft.com/office/drawing/2014/main" xmlns="" id="{3BBC7667-C352-4842-9AFD-E5C16AD002F4}"/>
               </a:ext>
               <a:ext uri="{C183D7F6-B498-43B3-948B-1728B52AA6E4}">
-                <adec:decorative xmlns:adec="http://schemas.microsoft.com/office/drawing/2017/decorative" val="1"/>
+                <adec:decorative xmlns:adec="http://schemas.microsoft.com/office/drawing/2017/decorative" xmlns="" val="1"/>
               </a:ext>
             </a:extLst>
           </p:cNvPr>
@@ -6431,7 +6431,7 @@
           <p:nvPr>
             <p:extLst>
               <p:ext uri="{386F3935-93C4-4BCD-93E2-E3B085C9AB24}">
-                <p16:designElem xmlns:p16="http://schemas.microsoft.com/office/powerpoint/2015/main" val="1"/>
+                <p16:designElem xmlns:p16="http://schemas.microsoft.com/office/powerpoint/2015/main" xmlns="" val="1"/>
               </p:ext>
             </p:extLst>
           </p:nvPr>
@@ -6466,10 +6466,10 @@
           <p:cNvPr id="15" name="Rectangle 14">
             <a:extLst>
               <a:ext uri="{FF2B5EF4-FFF2-40B4-BE49-F238E27FC236}">
-                <a16:creationId xmlns:a16="http://schemas.microsoft.com/office/drawing/2014/main" id="{F0AB17F6-592B-45CB-96F6-705C9825AFBC}"/>
+                <a16:creationId xmlns:a16="http://schemas.microsoft.com/office/drawing/2014/main" xmlns="" id="{F0AB17F6-592B-45CB-96F6-705C9825AFBC}"/>
               </a:ext>
               <a:ext uri="{C183D7F6-B498-43B3-948B-1728B52AA6E4}">
-                <adec:decorative xmlns:adec="http://schemas.microsoft.com/office/drawing/2017/decorative" val="1"/>
+                <adec:decorative xmlns:adec="http://schemas.microsoft.com/office/drawing/2017/decorative" xmlns="" val="1"/>
               </a:ext>
             </a:extLst>
           </p:cNvPr>
@@ -6479,7 +6479,7 @@
           <p:nvPr>
             <p:extLst>
               <p:ext uri="{386F3935-93C4-4BCD-93E2-E3B085C9AB24}">
-                <p16:designElem xmlns:p16="http://schemas.microsoft.com/office/powerpoint/2015/main" val="1"/>
+                <p16:designElem xmlns:p16="http://schemas.microsoft.com/office/powerpoint/2015/main" xmlns="" val="1"/>
               </p:ext>
             </p:extLst>
           </p:nvPr>
@@ -6526,7 +6526,7 @@
           <p:cNvPr id="2" name="Title 1">
             <a:extLst>
               <a:ext uri="{FF2B5EF4-FFF2-40B4-BE49-F238E27FC236}">
-                <a16:creationId xmlns:a16="http://schemas.microsoft.com/office/drawing/2014/main" id="{6FC29038-DDBC-4BFF-89F4-CE1EC9E6EEB3}"/>
+                <a16:creationId xmlns:a16="http://schemas.microsoft.com/office/drawing/2014/main" xmlns="" id="{6FC29038-DDBC-4BFF-89F4-CE1EC9E6EEB3}"/>
               </a:ext>
             </a:extLst>
           </p:cNvPr>
@@ -6566,10 +6566,10 @@
           <p:cNvPr id="17" name="Straight Connector 16">
             <a:extLst>
               <a:ext uri="{FF2B5EF4-FFF2-40B4-BE49-F238E27FC236}">
-                <a16:creationId xmlns:a16="http://schemas.microsoft.com/office/drawing/2014/main" id="{5A9284E7-0823-472D-9963-18D89DFEB8B4}"/>
+                <a16:creationId xmlns:a16="http://schemas.microsoft.com/office/drawing/2014/main" xmlns="" id="{5A9284E7-0823-472D-9963-18D89DFEB8B4}"/>
               </a:ext>
               <a:ext uri="{C183D7F6-B498-43B3-948B-1728B52AA6E4}">
-                <adec:decorative xmlns:adec="http://schemas.microsoft.com/office/drawing/2017/decorative" val="1"/>
+                <adec:decorative xmlns:adec="http://schemas.microsoft.com/office/drawing/2017/decorative" xmlns="" val="1"/>
               </a:ext>
             </a:extLst>
           </p:cNvPr>
@@ -6579,7 +6579,7 @@
           <p:nvPr>
             <p:extLst>
               <p:ext uri="{386F3935-93C4-4BCD-93E2-E3B085C9AB24}">
-                <p16:designElem xmlns:p16="http://schemas.microsoft.com/office/powerpoint/2015/main" val="1"/>
+                <p16:designElem xmlns:p16="http://schemas.microsoft.com/office/powerpoint/2015/main" xmlns="" val="1"/>
               </p:ext>
             </p:extLst>
           </p:nvPr>
@@ -6668,10 +6668,10 @@
           <p:cNvPr id="90" name="Rectangle 89">
             <a:extLst>
               <a:ext uri="{FF2B5EF4-FFF2-40B4-BE49-F238E27FC236}">
-                <a16:creationId xmlns:a16="http://schemas.microsoft.com/office/drawing/2014/main" id="{9AB26DBC-1F7F-4AC0-A88C-69712701E629}"/>
+                <a16:creationId xmlns:a16="http://schemas.microsoft.com/office/drawing/2014/main" xmlns="" id="{9AB26DBC-1F7F-4AC0-A88C-69712701E629}"/>
               </a:ext>
               <a:ext uri="{C183D7F6-B498-43B3-948B-1728B52AA6E4}">
-                <adec:decorative xmlns:adec="http://schemas.microsoft.com/office/drawing/2017/decorative" val="1"/>
+                <adec:decorative xmlns:adec="http://schemas.microsoft.com/office/drawing/2017/decorative" xmlns="" val="1"/>
               </a:ext>
             </a:extLst>
           </p:cNvPr>
@@ -6681,7 +6681,7 @@
           <p:nvPr>
             <p:extLst>
               <p:ext uri="{386F3935-93C4-4BCD-93E2-E3B085C9AB24}">
-                <p16:designElem xmlns:p16="http://schemas.microsoft.com/office/powerpoint/2015/main" val="1"/>
+                <p16:designElem xmlns:p16="http://schemas.microsoft.com/office/powerpoint/2015/main" xmlns="" val="1"/>
               </p:ext>
             </p:extLst>
           </p:nvPr>
@@ -6728,10 +6728,10 @@
           <p:cNvPr id="92" name="Rectangle 91">
             <a:extLst>
               <a:ext uri="{FF2B5EF4-FFF2-40B4-BE49-F238E27FC236}">
-                <a16:creationId xmlns:a16="http://schemas.microsoft.com/office/drawing/2014/main" id="{6F099884-7695-4976-8EBD-ECB5AF05355F}"/>
+                <a16:creationId xmlns:a16="http://schemas.microsoft.com/office/drawing/2014/main" xmlns="" id="{6F099884-7695-4976-8EBD-ECB5AF05355F}"/>
               </a:ext>
               <a:ext uri="{C183D7F6-B498-43B3-948B-1728B52AA6E4}">
-                <adec:decorative xmlns:adec="http://schemas.microsoft.com/office/drawing/2017/decorative" val="1"/>
+                <adec:decorative xmlns:adec="http://schemas.microsoft.com/office/drawing/2017/decorative" xmlns="" val="1"/>
               </a:ext>
             </a:extLst>
           </p:cNvPr>
@@ -6741,7 +6741,7 @@
           <p:nvPr>
             <p:extLst>
               <p:ext uri="{386F3935-93C4-4BCD-93E2-E3B085C9AB24}">
-                <p16:designElem xmlns:p16="http://schemas.microsoft.com/office/powerpoint/2015/main" val="1"/>
+                <p16:designElem xmlns:p16="http://schemas.microsoft.com/office/powerpoint/2015/main" xmlns="" val="1"/>
               </p:ext>
             </p:extLst>
           </p:nvPr>
@@ -6802,7 +6802,7 @@
           <p:cNvPr id="2" name="Title 1">
             <a:extLst>
               <a:ext uri="{FF2B5EF4-FFF2-40B4-BE49-F238E27FC236}">
-                <a16:creationId xmlns:a16="http://schemas.microsoft.com/office/drawing/2014/main" id="{2E025604-A81D-4F18-82B3-98894BAF829C}"/>
+                <a16:creationId xmlns:a16="http://schemas.microsoft.com/office/drawing/2014/main" xmlns="" id="{2E025604-A81D-4F18-82B3-98894BAF829C}"/>
               </a:ext>
             </a:extLst>
           </p:cNvPr>
@@ -6837,7 +6837,7 @@
           <p:cNvPr id="3" name="Subtitle 2">
             <a:extLst>
               <a:ext uri="{FF2B5EF4-FFF2-40B4-BE49-F238E27FC236}">
-                <a16:creationId xmlns:a16="http://schemas.microsoft.com/office/drawing/2014/main" id="{E9D15432-801C-4592-9DCE-0CB4042BB4CA}"/>
+                <a16:creationId xmlns:a16="http://schemas.microsoft.com/office/drawing/2014/main" xmlns="" id="{E9D15432-801C-4592-9DCE-0CB4042BB4CA}"/>
               </a:ext>
             </a:extLst>
           </p:cNvPr>
@@ -6962,10 +6962,10 @@
           <p:cNvPr id="94" name="Group 93">
             <a:extLst>
               <a:ext uri="{FF2B5EF4-FFF2-40B4-BE49-F238E27FC236}">
-                <a16:creationId xmlns:a16="http://schemas.microsoft.com/office/drawing/2014/main" id="{32F6B6B9-C579-41A6-A7D1-A7AB4AA6D233}"/>
+                <a16:creationId xmlns:a16="http://schemas.microsoft.com/office/drawing/2014/main" xmlns="" id="{32F6B6B9-C579-41A6-A7D1-A7AB4AA6D233}"/>
               </a:ext>
               <a:ext uri="{C183D7F6-B498-43B3-948B-1728B52AA6E4}">
-                <adec:decorative xmlns:adec="http://schemas.microsoft.com/office/drawing/2017/decorative" val="1"/>
+                <adec:decorative xmlns:adec="http://schemas.microsoft.com/office/drawing/2017/decorative" xmlns="" val="1"/>
               </a:ext>
             </a:extLst>
           </p:cNvPr>
@@ -6975,7 +6975,7 @@
           <p:nvPr>
             <p:extLst>
               <p:ext uri="{386F3935-93C4-4BCD-93E2-E3B085C9AB24}">
-                <p16:designElem xmlns:p16="http://schemas.microsoft.com/office/powerpoint/2015/main" val="1"/>
+                <p16:designElem xmlns:p16="http://schemas.microsoft.com/office/powerpoint/2015/main" xmlns="" val="1"/>
               </p:ext>
             </p:extLst>
           </p:nvPr>
@@ -6993,10 +6993,10 @@
             <p:cNvPr id="95" name="Rectangle 94">
               <a:extLst>
                 <a:ext uri="{FF2B5EF4-FFF2-40B4-BE49-F238E27FC236}">
-                  <a16:creationId xmlns:a16="http://schemas.microsoft.com/office/drawing/2014/main" id="{DC0B55B5-5A26-423B-ACDC-B151A280A1D6}"/>
+                  <a16:creationId xmlns:a16="http://schemas.microsoft.com/office/drawing/2014/main" xmlns="" id="{DC0B55B5-5A26-423B-ACDC-B151A280A1D6}"/>
                 </a:ext>
                 <a:ext uri="{C183D7F6-B498-43B3-948B-1728B52AA6E4}">
-                  <adec:decorative xmlns:adec="http://schemas.microsoft.com/office/drawing/2017/decorative" val="1"/>
+                  <adec:decorative xmlns:adec="http://schemas.microsoft.com/office/drawing/2017/decorative" xmlns="" val="1"/>
                 </a:ext>
               </a:extLst>
             </p:cNvPr>
@@ -7004,7 +7004,7 @@
             <p:nvPr>
               <p:extLst>
                 <p:ext uri="{386F3935-93C4-4BCD-93E2-E3B085C9AB24}">
-                  <p16:designElem xmlns:p16="http://schemas.microsoft.com/office/powerpoint/2015/main" val="1"/>
+                  <p16:designElem xmlns:p16="http://schemas.microsoft.com/office/powerpoint/2015/main" xmlns="" val="1"/>
                 </p:ext>
               </p:extLst>
             </p:nvPr>
@@ -7074,10 +7074,10 @@
             <p:cNvPr id="96" name="Rectangle 95">
               <a:extLst>
                 <a:ext uri="{FF2B5EF4-FFF2-40B4-BE49-F238E27FC236}">
-                  <a16:creationId xmlns:a16="http://schemas.microsoft.com/office/drawing/2014/main" id="{8AD2DF8D-6B65-43EB-86A8-9DB52572A032}"/>
+                  <a16:creationId xmlns:a16="http://schemas.microsoft.com/office/drawing/2014/main" xmlns="" id="{8AD2DF8D-6B65-43EB-86A8-9DB52572A032}"/>
                 </a:ext>
                 <a:ext uri="{C183D7F6-B498-43B3-948B-1728B52AA6E4}">
-                  <adec:decorative xmlns:adec="http://schemas.microsoft.com/office/drawing/2017/decorative" val="1"/>
+                  <adec:decorative xmlns:adec="http://schemas.microsoft.com/office/drawing/2017/decorative" xmlns="" val="1"/>
                 </a:ext>
               </a:extLst>
             </p:cNvPr>
@@ -7085,7 +7085,7 @@
             <p:nvPr>
               <p:extLst>
                 <p:ext uri="{386F3935-93C4-4BCD-93E2-E3B085C9AB24}">
-                  <p16:designElem xmlns:p16="http://schemas.microsoft.com/office/powerpoint/2015/main" val="1"/>
+                  <p16:designElem xmlns:p16="http://schemas.microsoft.com/office/powerpoint/2015/main" xmlns="" val="1"/>
                 </p:ext>
               </p:extLst>
             </p:nvPr>
@@ -7159,10 +7159,10 @@
           <p:cNvPr id="98" name="Rectangle 97">
             <a:extLst>
               <a:ext uri="{FF2B5EF4-FFF2-40B4-BE49-F238E27FC236}">
-                <a16:creationId xmlns:a16="http://schemas.microsoft.com/office/drawing/2014/main" id="{74163961-0280-48BA-BC84-97E03B009955}"/>
+                <a16:creationId xmlns:a16="http://schemas.microsoft.com/office/drawing/2014/main" xmlns="" id="{74163961-0280-48BA-BC84-97E03B009955}"/>
               </a:ext>
               <a:ext uri="{C183D7F6-B498-43B3-948B-1728B52AA6E4}">
-                <adec:decorative xmlns:adec="http://schemas.microsoft.com/office/drawing/2017/decorative" val="1"/>
+                <adec:decorative xmlns:adec="http://schemas.microsoft.com/office/drawing/2017/decorative" xmlns="" val="1"/>
               </a:ext>
             </a:extLst>
           </p:cNvPr>
@@ -7172,7 +7172,7 @@
           <p:nvPr>
             <p:extLst>
               <p:ext uri="{386F3935-93C4-4BCD-93E2-E3B085C9AB24}">
-                <p16:designElem xmlns:p16="http://schemas.microsoft.com/office/powerpoint/2015/main" val="1"/>
+                <p16:designElem xmlns:p16="http://schemas.microsoft.com/office/powerpoint/2015/main" xmlns="" val="1"/>
               </p:ext>
             </p:extLst>
           </p:nvPr>
@@ -7224,7 +7224,7 @@
           <p:cNvPr id="31" name="Picture 3" descr="Scribbles on a notebook">
             <a:extLst>
               <a:ext uri="{FF2B5EF4-FFF2-40B4-BE49-F238E27FC236}">
-                <a16:creationId xmlns:a16="http://schemas.microsoft.com/office/drawing/2014/main" id="{552BC37F-B83E-0A14-C568-9D7AF3908C92}"/>
+                <a16:creationId xmlns:a16="http://schemas.microsoft.com/office/drawing/2014/main" xmlns="" id="{552BC37F-B83E-0A14-C568-9D7AF3908C92}"/>
               </a:ext>
             </a:extLst>
           </p:cNvPr>
@@ -7253,10 +7253,10 @@
           <p:cNvPr id="100" name="Straight Connector 99">
             <a:extLst>
               <a:ext uri="{FF2B5EF4-FFF2-40B4-BE49-F238E27FC236}">
-                <a16:creationId xmlns:a16="http://schemas.microsoft.com/office/drawing/2014/main" id="{BFAC20BB-5902-4D8F-9A2A-E4B516EF39DE}"/>
+                <a16:creationId xmlns:a16="http://schemas.microsoft.com/office/drawing/2014/main" xmlns="" id="{BFAC20BB-5902-4D8F-9A2A-E4B516EF39DE}"/>
               </a:ext>
               <a:ext uri="{C183D7F6-B498-43B3-948B-1728B52AA6E4}">
-                <adec:decorative xmlns:adec="http://schemas.microsoft.com/office/drawing/2017/decorative" val="1"/>
+                <adec:decorative xmlns:adec="http://schemas.microsoft.com/office/drawing/2017/decorative" xmlns="" val="1"/>
               </a:ext>
             </a:extLst>
           </p:cNvPr>
@@ -7266,7 +7266,7 @@
           <p:nvPr>
             <p:extLst>
               <p:ext uri="{386F3935-93C4-4BCD-93E2-E3B085C9AB24}">
-                <p16:designElem xmlns:p16="http://schemas.microsoft.com/office/powerpoint/2015/main" val="1"/>
+                <p16:designElem xmlns:p16="http://schemas.microsoft.com/office/powerpoint/2015/main" xmlns="" val="1"/>
               </p:ext>
             </p:extLst>
           </p:nvPr>
@@ -7301,10 +7301,10 @@
           <p:cNvPr id="159" name="Picture 101">
             <a:extLst>
               <a:ext uri="{FF2B5EF4-FFF2-40B4-BE49-F238E27FC236}">
-                <a16:creationId xmlns:a16="http://schemas.microsoft.com/office/drawing/2014/main" id="{FC7852F8-6371-4D0E-ADF1-AD67B8FD8F9E}"/>
+                <a16:creationId xmlns:a16="http://schemas.microsoft.com/office/drawing/2014/main" xmlns="" id="{FC7852F8-6371-4D0E-ADF1-AD67B8FD8F9E}"/>
               </a:ext>
               <a:ext uri="{C183D7F6-B498-43B3-948B-1728B52AA6E4}">
-                <adec:decorative xmlns:adec="http://schemas.microsoft.com/office/drawing/2017/decorative" val="1"/>
+                <adec:decorative xmlns:adec="http://schemas.microsoft.com/office/drawing/2017/decorative" xmlns="" val="1"/>
               </a:ext>
             </a:extLst>
           </p:cNvPr>
@@ -7314,7 +7314,7 @@
           <p:nvPr>
             <p:extLst>
               <p:ext uri="{386F3935-93C4-4BCD-93E2-E3B085C9AB24}">
-                <p16:designElem xmlns:p16="http://schemas.microsoft.com/office/powerpoint/2015/main" val="1"/>
+                <p16:designElem xmlns:p16="http://schemas.microsoft.com/office/powerpoint/2015/main" xmlns="" val="1"/>
               </p:ext>
             </p:extLst>
           </p:nvPr>
@@ -7345,10 +7345,10 @@
           <p:cNvPr id="160" name="Straight Connector 103">
             <a:extLst>
               <a:ext uri="{FF2B5EF4-FFF2-40B4-BE49-F238E27FC236}">
-                <a16:creationId xmlns:a16="http://schemas.microsoft.com/office/drawing/2014/main" id="{60356817-A471-4572-AE96-579F6D6BFD9B}"/>
+                <a16:creationId xmlns:a16="http://schemas.microsoft.com/office/drawing/2014/main" xmlns="" id="{60356817-A471-4572-AE96-579F6D6BFD9B}"/>
               </a:ext>
               <a:ext uri="{C183D7F6-B498-43B3-948B-1728B52AA6E4}">
-                <adec:decorative xmlns:adec="http://schemas.microsoft.com/office/drawing/2017/decorative" val="1"/>
+                <adec:decorative xmlns:adec="http://schemas.microsoft.com/office/drawing/2017/decorative" xmlns="" val="1"/>
               </a:ext>
             </a:extLst>
           </p:cNvPr>
@@ -7358,7 +7358,7 @@
           <p:nvPr>
             <p:extLst>
               <p:ext uri="{386F3935-93C4-4BCD-93E2-E3B085C9AB24}">
-                <p16:designElem xmlns:p16="http://schemas.microsoft.com/office/powerpoint/2015/main" val="1"/>
+                <p16:designElem xmlns:p16="http://schemas.microsoft.com/office/powerpoint/2015/main" xmlns="" val="1"/>
               </p:ext>
             </p:extLst>
           </p:nvPr>
@@ -7453,10 +7453,10 @@
           <p:cNvPr id="95" name="Rectangle 79">
             <a:extLst>
               <a:ext uri="{FF2B5EF4-FFF2-40B4-BE49-F238E27FC236}">
-                <a16:creationId xmlns:a16="http://schemas.microsoft.com/office/drawing/2014/main" id="{1669046F-5838-4C7A-BBE8-A77F40FD9C7F}"/>
+                <a16:creationId xmlns:a16="http://schemas.microsoft.com/office/drawing/2014/main" xmlns="" id="{1669046F-5838-4C7A-BBE8-A77F40FD9C7F}"/>
               </a:ext>
               <a:ext uri="{C183D7F6-B498-43B3-948B-1728B52AA6E4}">
-                <adec:decorative xmlns:adec="http://schemas.microsoft.com/office/drawing/2017/decorative" val="1"/>
+                <adec:decorative xmlns:adec="http://schemas.microsoft.com/office/drawing/2017/decorative" xmlns="" val="1"/>
               </a:ext>
             </a:extLst>
           </p:cNvPr>
@@ -7466,7 +7466,7 @@
           <p:nvPr>
             <p:extLst>
               <p:ext uri="{386F3935-93C4-4BCD-93E2-E3B085C9AB24}">
-                <p16:designElem xmlns:p16="http://schemas.microsoft.com/office/powerpoint/2015/main" val="1"/>
+                <p16:designElem xmlns:p16="http://schemas.microsoft.com/office/powerpoint/2015/main" xmlns="" val="1"/>
               </p:ext>
             </p:extLst>
           </p:nvPr>
@@ -7513,10 +7513,10 @@
           <p:cNvPr id="96" name="Rectangle 81">
             <a:extLst>
               <a:ext uri="{FF2B5EF4-FFF2-40B4-BE49-F238E27FC236}">
-                <a16:creationId xmlns:a16="http://schemas.microsoft.com/office/drawing/2014/main" id="{2D5E6CDB-92ED-43A1-9491-C46E2C8E9956}"/>
+                <a16:creationId xmlns:a16="http://schemas.microsoft.com/office/drawing/2014/main" xmlns="" id="{2D5E6CDB-92ED-43A1-9491-C46E2C8E9956}"/>
               </a:ext>
               <a:ext uri="{C183D7F6-B498-43B3-948B-1728B52AA6E4}">
-                <adec:decorative xmlns:adec="http://schemas.microsoft.com/office/drawing/2017/decorative" val="1"/>
+                <adec:decorative xmlns:adec="http://schemas.microsoft.com/office/drawing/2017/decorative" xmlns="" val="1"/>
               </a:ext>
             </a:extLst>
           </p:cNvPr>
@@ -7526,7 +7526,7 @@
           <p:nvPr>
             <p:extLst>
               <p:ext uri="{386F3935-93C4-4BCD-93E2-E3B085C9AB24}">
-                <p16:designElem xmlns:p16="http://schemas.microsoft.com/office/powerpoint/2015/main" val="1"/>
+                <p16:designElem xmlns:p16="http://schemas.microsoft.com/office/powerpoint/2015/main" xmlns="" val="1"/>
               </p:ext>
             </p:extLst>
           </p:nvPr>
@@ -7587,10 +7587,10 @@
           <p:cNvPr id="97" name="Group 83">
             <a:extLst>
               <a:ext uri="{FF2B5EF4-FFF2-40B4-BE49-F238E27FC236}">
-                <a16:creationId xmlns:a16="http://schemas.microsoft.com/office/drawing/2014/main" id="{EBB966BC-DC49-4138-8DEF-B1CD13033926}"/>
+                <a16:creationId xmlns:a16="http://schemas.microsoft.com/office/drawing/2014/main" xmlns="" id="{EBB966BC-DC49-4138-8DEF-B1CD13033926}"/>
               </a:ext>
               <a:ext uri="{C183D7F6-B498-43B3-948B-1728B52AA6E4}">
-                <adec:decorative xmlns:adec="http://schemas.microsoft.com/office/drawing/2017/decorative" val="1"/>
+                <adec:decorative xmlns:adec="http://schemas.microsoft.com/office/drawing/2017/decorative" xmlns="" val="1"/>
               </a:ext>
             </a:extLst>
           </p:cNvPr>
@@ -7600,7 +7600,7 @@
           <p:nvPr>
             <p:extLst>
               <p:ext uri="{386F3935-93C4-4BCD-93E2-E3B085C9AB24}">
-                <p16:designElem xmlns:p16="http://schemas.microsoft.com/office/powerpoint/2015/main" val="1"/>
+                <p16:designElem xmlns:p16="http://schemas.microsoft.com/office/powerpoint/2015/main" xmlns="" val="1"/>
               </p:ext>
             </p:extLst>
           </p:nvPr>
@@ -7618,10 +7618,10 @@
             <p:cNvPr id="85" name="Rectangle 84">
               <a:extLst>
                 <a:ext uri="{FF2B5EF4-FFF2-40B4-BE49-F238E27FC236}">
-                  <a16:creationId xmlns:a16="http://schemas.microsoft.com/office/drawing/2014/main" id="{EDD0BD06-EC5B-4F0E-A221-562BC2BA69B2}"/>
+                  <a16:creationId xmlns:a16="http://schemas.microsoft.com/office/drawing/2014/main" xmlns="" id="{EDD0BD06-EC5B-4F0E-A221-562BC2BA69B2}"/>
                 </a:ext>
                 <a:ext uri="{C183D7F6-B498-43B3-948B-1728B52AA6E4}">
-                  <adec:decorative xmlns:adec="http://schemas.microsoft.com/office/drawing/2017/decorative" val="1"/>
+                  <adec:decorative xmlns:adec="http://schemas.microsoft.com/office/drawing/2017/decorative" xmlns="" val="1"/>
                 </a:ext>
               </a:extLst>
             </p:cNvPr>
@@ -7629,7 +7629,7 @@
             <p:nvPr>
               <p:extLst>
                 <p:ext uri="{386F3935-93C4-4BCD-93E2-E3B085C9AB24}">
-                  <p16:designElem xmlns:p16="http://schemas.microsoft.com/office/powerpoint/2015/main" val="1"/>
+                  <p16:designElem xmlns:p16="http://schemas.microsoft.com/office/powerpoint/2015/main" xmlns="" val="1"/>
                 </p:ext>
               </p:extLst>
             </p:nvPr>
@@ -7699,10 +7699,10 @@
             <p:cNvPr id="98" name="Rectangle 85">
               <a:extLst>
                 <a:ext uri="{FF2B5EF4-FFF2-40B4-BE49-F238E27FC236}">
-                  <a16:creationId xmlns:a16="http://schemas.microsoft.com/office/drawing/2014/main" id="{634200B3-EC47-4A5B-A640-7118BF6AD272}"/>
+                  <a16:creationId xmlns:a16="http://schemas.microsoft.com/office/drawing/2014/main" xmlns="" id="{634200B3-EC47-4A5B-A640-7118BF6AD272}"/>
                 </a:ext>
                 <a:ext uri="{C183D7F6-B498-43B3-948B-1728B52AA6E4}">
-                  <adec:decorative xmlns:adec="http://schemas.microsoft.com/office/drawing/2017/decorative" val="1"/>
+                  <adec:decorative xmlns:adec="http://schemas.microsoft.com/office/drawing/2017/decorative" xmlns="" val="1"/>
                 </a:ext>
               </a:extLst>
             </p:cNvPr>
@@ -7710,7 +7710,7 @@
             <p:nvPr>
               <p:extLst>
                 <p:ext uri="{386F3935-93C4-4BCD-93E2-E3B085C9AB24}">
-                  <p16:designElem xmlns:p16="http://schemas.microsoft.com/office/powerpoint/2015/main" val="1"/>
+                  <p16:designElem xmlns:p16="http://schemas.microsoft.com/office/powerpoint/2015/main" xmlns="" val="1"/>
                 </p:ext>
               </p:extLst>
             </p:nvPr>
@@ -7784,10 +7784,10 @@
           <p:cNvPr id="99" name="Rectangle 87">
             <a:extLst>
               <a:ext uri="{FF2B5EF4-FFF2-40B4-BE49-F238E27FC236}">
-                <a16:creationId xmlns:a16="http://schemas.microsoft.com/office/drawing/2014/main" id="{23B9DAF8-7DB4-40CB-85F8-7E02F95C6CA7}"/>
+                <a16:creationId xmlns:a16="http://schemas.microsoft.com/office/drawing/2014/main" xmlns="" id="{23B9DAF8-7DB4-40CB-85F8-7E02F95C6CA7}"/>
               </a:ext>
               <a:ext uri="{C183D7F6-B498-43B3-948B-1728B52AA6E4}">
-                <adec:decorative xmlns:adec="http://schemas.microsoft.com/office/drawing/2017/decorative" val="1"/>
+                <adec:decorative xmlns:adec="http://schemas.microsoft.com/office/drawing/2017/decorative" xmlns="" val="1"/>
               </a:ext>
             </a:extLst>
           </p:cNvPr>
@@ -7797,7 +7797,7 @@
           <p:nvPr>
             <p:extLst>
               <p:ext uri="{386F3935-93C4-4BCD-93E2-E3B085C9AB24}">
-                <p16:designElem xmlns:p16="http://schemas.microsoft.com/office/powerpoint/2015/main" val="1"/>
+                <p16:designElem xmlns:p16="http://schemas.microsoft.com/office/powerpoint/2015/main" xmlns="" val="1"/>
               </p:ext>
             </p:extLst>
           </p:nvPr>
@@ -7849,10 +7849,10 @@
           <p:cNvPr id="100" name="Straight Connector 89">
             <a:extLst>
               <a:ext uri="{FF2B5EF4-FFF2-40B4-BE49-F238E27FC236}">
-                <a16:creationId xmlns:a16="http://schemas.microsoft.com/office/drawing/2014/main" id="{606AED2C-61BA-485C-9DD4-B23B6280F9D8}"/>
+                <a16:creationId xmlns:a16="http://schemas.microsoft.com/office/drawing/2014/main" xmlns="" id="{606AED2C-61BA-485C-9DD4-B23B6280F9D8}"/>
               </a:ext>
               <a:ext uri="{C183D7F6-B498-43B3-948B-1728B52AA6E4}">
-                <adec:decorative xmlns:adec="http://schemas.microsoft.com/office/drawing/2017/decorative" val="1"/>
+                <adec:decorative xmlns:adec="http://schemas.microsoft.com/office/drawing/2017/decorative" xmlns="" val="1"/>
               </a:ext>
             </a:extLst>
           </p:cNvPr>
@@ -7862,7 +7862,7 @@
           <p:nvPr>
             <p:extLst>
               <p:ext uri="{386F3935-93C4-4BCD-93E2-E3B085C9AB24}">
-                <p16:designElem xmlns:p16="http://schemas.microsoft.com/office/powerpoint/2015/main" val="1"/>
+                <p16:designElem xmlns:p16="http://schemas.microsoft.com/office/powerpoint/2015/main" xmlns="" val="1"/>
               </p:ext>
             </p:extLst>
           </p:nvPr>
@@ -7897,7 +7897,7 @@
           <p:cNvPr id="2" name="Title 1">
             <a:extLst>
               <a:ext uri="{FF2B5EF4-FFF2-40B4-BE49-F238E27FC236}">
-                <a16:creationId xmlns:a16="http://schemas.microsoft.com/office/drawing/2014/main" id="{427A07C9-2785-487F-8E6F-0A9136FD3D69}"/>
+                <a16:creationId xmlns:a16="http://schemas.microsoft.com/office/drawing/2014/main" xmlns="" id="{427A07C9-2785-487F-8E6F-0A9136FD3D69}"/>
               </a:ext>
             </a:extLst>
           </p:cNvPr>
@@ -7932,7 +7932,7 @@
           <p:cNvPr id="10" name="Picture 9" descr="Chart, histogram&#10;&#10;Description automatically generated">
             <a:extLst>
               <a:ext uri="{FF2B5EF4-FFF2-40B4-BE49-F238E27FC236}">
-                <a16:creationId xmlns:a16="http://schemas.microsoft.com/office/drawing/2014/main" id="{36420580-8C8E-455B-9542-38C01AC627AB}"/>
+                <a16:creationId xmlns:a16="http://schemas.microsoft.com/office/drawing/2014/main" xmlns="" id="{36420580-8C8E-455B-9542-38C01AC627AB}"/>
               </a:ext>
             </a:extLst>
           </p:cNvPr>
@@ -7942,7 +7942,7 @@
           <p:nvPr/>
         </p:nvPicPr>
         <p:blipFill>
-          <a:blip r:embed="rId2">
+          <a:blip r:embed="rId2" cstate="print">
             <a:extLst>
               <a:ext uri="{28A0092B-C50C-407E-A947-70E740481C1C}">
                 <a14:useLocalDpi xmlns:a14="http://schemas.microsoft.com/office/drawing/2010/main" val="0"/>
@@ -7968,7 +7968,7 @@
           <p:cNvPr id="4" name="Content Placeholder 3">
             <a:extLst>
               <a:ext uri="{FF2B5EF4-FFF2-40B4-BE49-F238E27FC236}">
-                <a16:creationId xmlns:a16="http://schemas.microsoft.com/office/drawing/2014/main" id="{1300C3DD-F88F-42DA-AC1D-6CC4CC4119CA}"/>
+                <a16:creationId xmlns:a16="http://schemas.microsoft.com/office/drawing/2014/main" xmlns="" id="{1300C3DD-F88F-42DA-AC1D-6CC4CC4119CA}"/>
               </a:ext>
             </a:extLst>
           </p:cNvPr>
@@ -8027,10 +8027,10 @@
           <p:cNvPr id="101" name="Picture 91">
             <a:extLst>
               <a:ext uri="{FF2B5EF4-FFF2-40B4-BE49-F238E27FC236}">
-                <a16:creationId xmlns:a16="http://schemas.microsoft.com/office/drawing/2014/main" id="{7EFCF05C-6070-460B-8E60-12BE3EFD19F0}"/>
+                <a16:creationId xmlns:a16="http://schemas.microsoft.com/office/drawing/2014/main" xmlns="" id="{7EFCF05C-6070-460B-8E60-12BE3EFD19F0}"/>
               </a:ext>
               <a:ext uri="{C183D7F6-B498-43B3-948B-1728B52AA6E4}">
-                <adec:decorative xmlns:adec="http://schemas.microsoft.com/office/drawing/2017/decorative" val="1"/>
+                <adec:decorative xmlns:adec="http://schemas.microsoft.com/office/drawing/2017/decorative" xmlns="" val="1"/>
               </a:ext>
             </a:extLst>
           </p:cNvPr>
@@ -8040,7 +8040,7 @@
           <p:nvPr>
             <p:extLst>
               <p:ext uri="{386F3935-93C4-4BCD-93E2-E3B085C9AB24}">
-                <p16:designElem xmlns:p16="http://schemas.microsoft.com/office/powerpoint/2015/main" val="1"/>
+                <p16:designElem xmlns:p16="http://schemas.microsoft.com/office/powerpoint/2015/main" xmlns="" val="1"/>
               </p:ext>
             </p:extLst>
           </p:nvPr>
@@ -8071,10 +8071,10 @@
           <p:cNvPr id="94" name="Straight Connector 93">
             <a:extLst>
               <a:ext uri="{FF2B5EF4-FFF2-40B4-BE49-F238E27FC236}">
-                <a16:creationId xmlns:a16="http://schemas.microsoft.com/office/drawing/2014/main" id="{CFD731F1-726F-453E-9516-3058095DE995}"/>
+                <a16:creationId xmlns:a16="http://schemas.microsoft.com/office/drawing/2014/main" xmlns="" id="{CFD731F1-726F-453E-9516-3058095DE995}"/>
               </a:ext>
               <a:ext uri="{C183D7F6-B498-43B3-948B-1728B52AA6E4}">
-                <adec:decorative xmlns:adec="http://schemas.microsoft.com/office/drawing/2017/decorative" val="1"/>
+                <adec:decorative xmlns:adec="http://schemas.microsoft.com/office/drawing/2017/decorative" xmlns="" val="1"/>
               </a:ext>
             </a:extLst>
           </p:cNvPr>
@@ -8084,7 +8084,7 @@
           <p:nvPr>
             <p:extLst>
               <p:ext uri="{386F3935-93C4-4BCD-93E2-E3B085C9AB24}">
-                <p16:designElem xmlns:p16="http://schemas.microsoft.com/office/powerpoint/2015/main" val="1"/>
+                <p16:designElem xmlns:p16="http://schemas.microsoft.com/office/powerpoint/2015/main" xmlns="" val="1"/>
               </p:ext>
             </p:extLst>
           </p:nvPr>
@@ -8179,10 +8179,10 @@
           <p:cNvPr id="7" name="Rectangle 6">
             <a:extLst>
               <a:ext uri="{FF2B5EF4-FFF2-40B4-BE49-F238E27FC236}">
-                <a16:creationId xmlns:a16="http://schemas.microsoft.com/office/drawing/2014/main" id="{23522FE7-5A29-4EF6-B1EF-2CA55748A772}"/>
+                <a16:creationId xmlns:a16="http://schemas.microsoft.com/office/drawing/2014/main" xmlns="" id="{23522FE7-5A29-4EF6-B1EF-2CA55748A772}"/>
               </a:ext>
               <a:ext uri="{C183D7F6-B498-43B3-948B-1728B52AA6E4}">
-                <adec:decorative xmlns:adec="http://schemas.microsoft.com/office/drawing/2017/decorative" val="1"/>
+                <adec:decorative xmlns:adec="http://schemas.microsoft.com/office/drawing/2017/decorative" xmlns="" val="1"/>
               </a:ext>
             </a:extLst>
           </p:cNvPr>
@@ -8192,7 +8192,7 @@
           <p:nvPr>
             <p:extLst>
               <p:ext uri="{386F3935-93C4-4BCD-93E2-E3B085C9AB24}">
-                <p16:designElem xmlns:p16="http://schemas.microsoft.com/office/powerpoint/2015/main" val="1"/>
+                <p16:designElem xmlns:p16="http://schemas.microsoft.com/office/powerpoint/2015/main" xmlns="" val="1"/>
               </p:ext>
             </p:extLst>
           </p:nvPr>
@@ -8245,10 +8245,10 @@
           <p:cNvPr id="9" name="Picture 8">
             <a:extLst>
               <a:ext uri="{FF2B5EF4-FFF2-40B4-BE49-F238E27FC236}">
-                <a16:creationId xmlns:a16="http://schemas.microsoft.com/office/drawing/2014/main" id="{C2192E09-EBC7-416C-B887-DFF915D7F43D}"/>
+                <a16:creationId xmlns:a16="http://schemas.microsoft.com/office/drawing/2014/main" xmlns="" id="{C2192E09-EBC7-416C-B887-DFF915D7F43D}"/>
               </a:ext>
               <a:ext uri="{C183D7F6-B498-43B3-948B-1728B52AA6E4}">
-                <adec:decorative xmlns:adec="http://schemas.microsoft.com/office/drawing/2017/decorative" val="1"/>
+                <adec:decorative xmlns:adec="http://schemas.microsoft.com/office/drawing/2017/decorative" xmlns="" val="1"/>
               </a:ext>
             </a:extLst>
           </p:cNvPr>
@@ -8258,7 +8258,7 @@
           <p:nvPr>
             <p:extLst>
               <p:ext uri="{386F3935-93C4-4BCD-93E2-E3B085C9AB24}">
-                <p16:designElem xmlns:p16="http://schemas.microsoft.com/office/powerpoint/2015/main" val="1"/>
+                <p16:designElem xmlns:p16="http://schemas.microsoft.com/office/powerpoint/2015/main" xmlns="" val="1"/>
               </p:ext>
             </p:extLst>
           </p:nvPr>
@@ -8289,10 +8289,10 @@
           <p:cNvPr id="11" name="Straight Connector 10">
             <a:extLst>
               <a:ext uri="{FF2B5EF4-FFF2-40B4-BE49-F238E27FC236}">
-                <a16:creationId xmlns:a16="http://schemas.microsoft.com/office/drawing/2014/main" id="{2924498D-E084-44BE-A196-CFCE35564350}"/>
+                <a16:creationId xmlns:a16="http://schemas.microsoft.com/office/drawing/2014/main" xmlns="" id="{2924498D-E084-44BE-A196-CFCE35564350}"/>
               </a:ext>
               <a:ext uri="{C183D7F6-B498-43B3-948B-1728B52AA6E4}">
-                <adec:decorative xmlns:adec="http://schemas.microsoft.com/office/drawing/2017/decorative" val="1"/>
+                <adec:decorative xmlns:adec="http://schemas.microsoft.com/office/drawing/2017/decorative" xmlns="" val="1"/>
               </a:ext>
             </a:extLst>
           </p:cNvPr>
@@ -8302,7 +8302,7 @@
           <p:nvPr>
             <p:extLst>
               <p:ext uri="{386F3935-93C4-4BCD-93E2-E3B085C9AB24}">
-                <p16:designElem xmlns:p16="http://schemas.microsoft.com/office/powerpoint/2015/main" val="1"/>
+                <p16:designElem xmlns:p16="http://schemas.microsoft.com/office/powerpoint/2015/main" xmlns="" val="1"/>
               </p:ext>
             </p:extLst>
           </p:nvPr>
@@ -8343,10 +8343,10 @@
           <p:cNvPr id="13" name="Straight Connector 12">
             <a:extLst>
               <a:ext uri="{FF2B5EF4-FFF2-40B4-BE49-F238E27FC236}">
-                <a16:creationId xmlns:a16="http://schemas.microsoft.com/office/drawing/2014/main" id="{3BBC7667-C352-4842-9AFD-E5C16AD002F4}"/>
+                <a16:creationId xmlns:a16="http://schemas.microsoft.com/office/drawing/2014/main" xmlns="" id="{3BBC7667-C352-4842-9AFD-E5C16AD002F4}"/>
               </a:ext>
               <a:ext uri="{C183D7F6-B498-43B3-948B-1728B52AA6E4}">
-                <adec:decorative xmlns:adec="http://schemas.microsoft.com/office/drawing/2017/decorative" val="1"/>
+                <adec:decorative xmlns:adec="http://schemas.microsoft.com/office/drawing/2017/decorative" xmlns="" val="1"/>
               </a:ext>
             </a:extLst>
           </p:cNvPr>
@@ -8356,7 +8356,7 @@
           <p:nvPr>
             <p:extLst>
               <p:ext uri="{386F3935-93C4-4BCD-93E2-E3B085C9AB24}">
-                <p16:designElem xmlns:p16="http://schemas.microsoft.com/office/powerpoint/2015/main" val="1"/>
+                <p16:designElem xmlns:p16="http://schemas.microsoft.com/office/powerpoint/2015/main" xmlns="" val="1"/>
               </p:ext>
             </p:extLst>
           </p:nvPr>
@@ -8391,10 +8391,10 @@
           <p:cNvPr id="15" name="Rectangle 14">
             <a:extLst>
               <a:ext uri="{FF2B5EF4-FFF2-40B4-BE49-F238E27FC236}">
-                <a16:creationId xmlns:a16="http://schemas.microsoft.com/office/drawing/2014/main" id="{F0AB17F6-592B-45CB-96F6-705C9825AFBC}"/>
+                <a16:creationId xmlns:a16="http://schemas.microsoft.com/office/drawing/2014/main" xmlns="" id="{F0AB17F6-592B-45CB-96F6-705C9825AFBC}"/>
               </a:ext>
               <a:ext uri="{C183D7F6-B498-43B3-948B-1728B52AA6E4}">
-                <adec:decorative xmlns:adec="http://schemas.microsoft.com/office/drawing/2017/decorative" val="1"/>
+                <adec:decorative xmlns:adec="http://schemas.microsoft.com/office/drawing/2017/decorative" xmlns="" val="1"/>
               </a:ext>
             </a:extLst>
           </p:cNvPr>
@@ -8404,7 +8404,7 @@
           <p:nvPr>
             <p:extLst>
               <p:ext uri="{386F3935-93C4-4BCD-93E2-E3B085C9AB24}">
-                <p16:designElem xmlns:p16="http://schemas.microsoft.com/office/powerpoint/2015/main" val="1"/>
+                <p16:designElem xmlns:p16="http://schemas.microsoft.com/office/powerpoint/2015/main" xmlns="" val="1"/>
               </p:ext>
             </p:extLst>
           </p:nvPr>
@@ -8451,7 +8451,7 @@
           <p:cNvPr id="2" name="Title 1">
             <a:extLst>
               <a:ext uri="{FF2B5EF4-FFF2-40B4-BE49-F238E27FC236}">
-                <a16:creationId xmlns:a16="http://schemas.microsoft.com/office/drawing/2014/main" id="{6FC29038-DDBC-4BFF-89F4-CE1EC9E6EEB3}"/>
+                <a16:creationId xmlns:a16="http://schemas.microsoft.com/office/drawing/2014/main" xmlns="" id="{6FC29038-DDBC-4BFF-89F4-CE1EC9E6EEB3}"/>
               </a:ext>
             </a:extLst>
           </p:cNvPr>
@@ -8491,10 +8491,10 @@
           <p:cNvPr id="17" name="Straight Connector 16">
             <a:extLst>
               <a:ext uri="{FF2B5EF4-FFF2-40B4-BE49-F238E27FC236}">
-                <a16:creationId xmlns:a16="http://schemas.microsoft.com/office/drawing/2014/main" id="{5A9284E7-0823-472D-9963-18D89DFEB8B4}"/>
+                <a16:creationId xmlns:a16="http://schemas.microsoft.com/office/drawing/2014/main" xmlns="" id="{5A9284E7-0823-472D-9963-18D89DFEB8B4}"/>
               </a:ext>
               <a:ext uri="{C183D7F6-B498-43B3-948B-1728B52AA6E4}">
-                <adec:decorative xmlns:adec="http://schemas.microsoft.com/office/drawing/2017/decorative" val="1"/>
+                <adec:decorative xmlns:adec="http://schemas.microsoft.com/office/drawing/2017/decorative" xmlns="" val="1"/>
               </a:ext>
             </a:extLst>
           </p:cNvPr>
@@ -8504,7 +8504,7 @@
           <p:nvPr>
             <p:extLst>
               <p:ext uri="{386F3935-93C4-4BCD-93E2-E3B085C9AB24}">
-                <p16:designElem xmlns:p16="http://schemas.microsoft.com/office/powerpoint/2015/main" val="1"/>
+                <p16:designElem xmlns:p16="http://schemas.microsoft.com/office/powerpoint/2015/main" xmlns="" val="1"/>
               </p:ext>
             </p:extLst>
           </p:nvPr>
@@ -8593,10 +8593,10 @@
           <p:cNvPr id="54" name="Rectangle 53">
             <a:extLst>
               <a:ext uri="{FF2B5EF4-FFF2-40B4-BE49-F238E27FC236}">
-                <a16:creationId xmlns:a16="http://schemas.microsoft.com/office/drawing/2014/main" id="{2FAC8C30-93FA-4F99-80C4-C952D83A4950}"/>
+                <a16:creationId xmlns:a16="http://schemas.microsoft.com/office/drawing/2014/main" xmlns="" id="{2FAC8C30-93FA-4F99-80C4-C952D83A4950}"/>
               </a:ext>
               <a:ext uri="{C183D7F6-B498-43B3-948B-1728B52AA6E4}">
-                <adec:decorative xmlns:adec="http://schemas.microsoft.com/office/drawing/2017/decorative" val="1"/>
+                <adec:decorative xmlns:adec="http://schemas.microsoft.com/office/drawing/2017/decorative" xmlns="" val="1"/>
               </a:ext>
             </a:extLst>
           </p:cNvPr>
@@ -8606,7 +8606,7 @@
           <p:nvPr>
             <p:extLst>
               <p:ext uri="{386F3935-93C4-4BCD-93E2-E3B085C9AB24}">
-                <p16:designElem xmlns:p16="http://schemas.microsoft.com/office/powerpoint/2015/main" val="1"/>
+                <p16:designElem xmlns:p16="http://schemas.microsoft.com/office/powerpoint/2015/main" xmlns="" val="1"/>
               </p:ext>
             </p:extLst>
           </p:nvPr>
@@ -8659,10 +8659,10 @@
           <p:cNvPr id="56" name="Picture 55">
             <a:extLst>
               <a:ext uri="{FF2B5EF4-FFF2-40B4-BE49-F238E27FC236}">
-                <a16:creationId xmlns:a16="http://schemas.microsoft.com/office/drawing/2014/main" id="{F3ACDE2A-6BC1-4786-87B1-F7DA35351E7A}"/>
+                <a16:creationId xmlns:a16="http://schemas.microsoft.com/office/drawing/2014/main" xmlns="" id="{F3ACDE2A-6BC1-4786-87B1-F7DA35351E7A}"/>
               </a:ext>
               <a:ext uri="{C183D7F6-B498-43B3-948B-1728B52AA6E4}">
-                <adec:decorative xmlns:adec="http://schemas.microsoft.com/office/drawing/2017/decorative" val="1"/>
+                <adec:decorative xmlns:adec="http://schemas.microsoft.com/office/drawing/2017/decorative" xmlns="" val="1"/>
               </a:ext>
             </a:extLst>
           </p:cNvPr>
@@ -8672,7 +8672,7 @@
           <p:nvPr>
             <p:extLst>
               <p:ext uri="{386F3935-93C4-4BCD-93E2-E3B085C9AB24}">
-                <p16:designElem xmlns:p16="http://schemas.microsoft.com/office/powerpoint/2015/main" val="1"/>
+                <p16:designElem xmlns:p16="http://schemas.microsoft.com/office/powerpoint/2015/main" xmlns="" val="1"/>
               </p:ext>
             </p:extLst>
           </p:nvPr>
@@ -8703,10 +8703,10 @@
           <p:cNvPr id="58" name="Straight Connector 57">
             <a:extLst>
               <a:ext uri="{FF2B5EF4-FFF2-40B4-BE49-F238E27FC236}">
-                <a16:creationId xmlns:a16="http://schemas.microsoft.com/office/drawing/2014/main" id="{0A2CC8B5-9886-4AFA-BE09-6178A4ED301A}"/>
+                <a16:creationId xmlns:a16="http://schemas.microsoft.com/office/drawing/2014/main" xmlns="" id="{0A2CC8B5-9886-4AFA-BE09-6178A4ED301A}"/>
               </a:ext>
               <a:ext uri="{C183D7F6-B498-43B3-948B-1728B52AA6E4}">
-                <adec:decorative xmlns:adec="http://schemas.microsoft.com/office/drawing/2017/decorative" val="1"/>
+                <adec:decorative xmlns:adec="http://schemas.microsoft.com/office/drawing/2017/decorative" xmlns="" val="1"/>
               </a:ext>
             </a:extLst>
           </p:cNvPr>
@@ -8716,7 +8716,7 @@
           <p:nvPr>
             <p:extLst>
               <p:ext uri="{386F3935-93C4-4BCD-93E2-E3B085C9AB24}">
-                <p16:designElem xmlns:p16="http://schemas.microsoft.com/office/powerpoint/2015/main" val="1"/>
+                <p16:designElem xmlns:p16="http://schemas.microsoft.com/office/powerpoint/2015/main" xmlns="" val="1"/>
               </p:ext>
             </p:extLst>
           </p:nvPr>
@@ -8757,7 +8757,7 @@
           <p:cNvPr id="5" name="Content Placeholder 4" descr="Chart, bar chart&#10;&#10;Description automatically generated">
             <a:extLst>
               <a:ext uri="{FF2B5EF4-FFF2-40B4-BE49-F238E27FC236}">
-                <a16:creationId xmlns:a16="http://schemas.microsoft.com/office/drawing/2014/main" id="{547E7EDD-C720-46E5-AC32-ED481B39FEE0}"/>
+                <a16:creationId xmlns:a16="http://schemas.microsoft.com/office/drawing/2014/main" xmlns="" id="{547E7EDD-C720-46E5-AC32-ED481B39FEE0}"/>
               </a:ext>
             </a:extLst>
           </p:cNvPr>
@@ -8802,7 +8802,7 @@
           <p:cNvPr id="7" name="Picture 6" descr="Text&#10;&#10;Description automatically generated">
             <a:extLst>
               <a:ext uri="{FF2B5EF4-FFF2-40B4-BE49-F238E27FC236}">
-                <a16:creationId xmlns:a16="http://schemas.microsoft.com/office/drawing/2014/main" id="{332F66FF-0952-48DF-9EB1-159C6F78CC00}"/>
+                <a16:creationId xmlns:a16="http://schemas.microsoft.com/office/drawing/2014/main" xmlns="" id="{332F66FF-0952-48DF-9EB1-159C6F78CC00}"/>
               </a:ext>
             </a:extLst>
           </p:cNvPr>
@@ -8899,10 +8899,10 @@
           <p:cNvPr id="7" name="Rectangle 6">
             <a:extLst>
               <a:ext uri="{FF2B5EF4-FFF2-40B4-BE49-F238E27FC236}">
-                <a16:creationId xmlns:a16="http://schemas.microsoft.com/office/drawing/2014/main" id="{23522FE7-5A29-4EF6-B1EF-2CA55748A772}"/>
+                <a16:creationId xmlns:a16="http://schemas.microsoft.com/office/drawing/2014/main" xmlns="" id="{23522FE7-5A29-4EF6-B1EF-2CA55748A772}"/>
               </a:ext>
               <a:ext uri="{C183D7F6-B498-43B3-948B-1728B52AA6E4}">
-                <adec:decorative xmlns:adec="http://schemas.microsoft.com/office/drawing/2017/decorative" val="1"/>
+                <adec:decorative xmlns:adec="http://schemas.microsoft.com/office/drawing/2017/decorative" xmlns="" val="1"/>
               </a:ext>
             </a:extLst>
           </p:cNvPr>
@@ -8912,7 +8912,7 @@
           <p:nvPr>
             <p:extLst>
               <p:ext uri="{386F3935-93C4-4BCD-93E2-E3B085C9AB24}">
-                <p16:designElem xmlns:p16="http://schemas.microsoft.com/office/powerpoint/2015/main" val="1"/>
+                <p16:designElem xmlns:p16="http://schemas.microsoft.com/office/powerpoint/2015/main" xmlns="" val="1"/>
               </p:ext>
             </p:extLst>
           </p:nvPr>
@@ -8965,10 +8965,10 @@
           <p:cNvPr id="9" name="Picture 8">
             <a:extLst>
               <a:ext uri="{FF2B5EF4-FFF2-40B4-BE49-F238E27FC236}">
-                <a16:creationId xmlns:a16="http://schemas.microsoft.com/office/drawing/2014/main" id="{C2192E09-EBC7-416C-B887-DFF915D7F43D}"/>
+                <a16:creationId xmlns:a16="http://schemas.microsoft.com/office/drawing/2014/main" xmlns="" id="{C2192E09-EBC7-416C-B887-DFF915D7F43D}"/>
               </a:ext>
               <a:ext uri="{C183D7F6-B498-43B3-948B-1728B52AA6E4}">
-                <adec:decorative xmlns:adec="http://schemas.microsoft.com/office/drawing/2017/decorative" val="1"/>
+                <adec:decorative xmlns:adec="http://schemas.microsoft.com/office/drawing/2017/decorative" xmlns="" val="1"/>
               </a:ext>
             </a:extLst>
           </p:cNvPr>
@@ -8978,7 +8978,7 @@
           <p:nvPr>
             <p:extLst>
               <p:ext uri="{386F3935-93C4-4BCD-93E2-E3B085C9AB24}">
-                <p16:designElem xmlns:p16="http://schemas.microsoft.com/office/powerpoint/2015/main" val="1"/>
+                <p16:designElem xmlns:p16="http://schemas.microsoft.com/office/powerpoint/2015/main" xmlns="" val="1"/>
               </p:ext>
             </p:extLst>
           </p:nvPr>
@@ -9009,10 +9009,10 @@
           <p:cNvPr id="11" name="Straight Connector 10">
             <a:extLst>
               <a:ext uri="{FF2B5EF4-FFF2-40B4-BE49-F238E27FC236}">
-                <a16:creationId xmlns:a16="http://schemas.microsoft.com/office/drawing/2014/main" id="{2924498D-E084-44BE-A196-CFCE35564350}"/>
+                <a16:creationId xmlns:a16="http://schemas.microsoft.com/office/drawing/2014/main" xmlns="" id="{2924498D-E084-44BE-A196-CFCE35564350}"/>
               </a:ext>
               <a:ext uri="{C183D7F6-B498-43B3-948B-1728B52AA6E4}">
-                <adec:decorative xmlns:adec="http://schemas.microsoft.com/office/drawing/2017/decorative" val="1"/>
+                <adec:decorative xmlns:adec="http://schemas.microsoft.com/office/drawing/2017/decorative" xmlns="" val="1"/>
               </a:ext>
             </a:extLst>
           </p:cNvPr>
@@ -9022,7 +9022,7 @@
           <p:nvPr>
             <p:extLst>
               <p:ext uri="{386F3935-93C4-4BCD-93E2-E3B085C9AB24}">
-                <p16:designElem xmlns:p16="http://schemas.microsoft.com/office/powerpoint/2015/main" val="1"/>
+                <p16:designElem xmlns:p16="http://schemas.microsoft.com/office/powerpoint/2015/main" xmlns="" val="1"/>
               </p:ext>
             </p:extLst>
           </p:nvPr>
@@ -9063,10 +9063,10 @@
           <p:cNvPr id="13" name="Straight Connector 12">
             <a:extLst>
               <a:ext uri="{FF2B5EF4-FFF2-40B4-BE49-F238E27FC236}">
-                <a16:creationId xmlns:a16="http://schemas.microsoft.com/office/drawing/2014/main" id="{3BBC7667-C352-4842-9AFD-E5C16AD002F4}"/>
+                <a16:creationId xmlns:a16="http://schemas.microsoft.com/office/drawing/2014/main" xmlns="" id="{3BBC7667-C352-4842-9AFD-E5C16AD002F4}"/>
               </a:ext>
               <a:ext uri="{C183D7F6-B498-43B3-948B-1728B52AA6E4}">
-                <adec:decorative xmlns:adec="http://schemas.microsoft.com/office/drawing/2017/decorative" val="1"/>
+                <adec:decorative xmlns:adec="http://schemas.microsoft.com/office/drawing/2017/decorative" xmlns="" val="1"/>
               </a:ext>
             </a:extLst>
           </p:cNvPr>
@@ -9076,7 +9076,7 @@
           <p:nvPr>
             <p:extLst>
               <p:ext uri="{386F3935-93C4-4BCD-93E2-E3B085C9AB24}">
-                <p16:designElem xmlns:p16="http://schemas.microsoft.com/office/powerpoint/2015/main" val="1"/>
+                <p16:designElem xmlns:p16="http://schemas.microsoft.com/office/powerpoint/2015/main" xmlns="" val="1"/>
               </p:ext>
             </p:extLst>
           </p:nvPr>
@@ -9111,10 +9111,10 @@
           <p:cNvPr id="15" name="Rectangle 14">
             <a:extLst>
               <a:ext uri="{FF2B5EF4-FFF2-40B4-BE49-F238E27FC236}">
-                <a16:creationId xmlns:a16="http://schemas.microsoft.com/office/drawing/2014/main" id="{F0AB17F6-592B-45CB-96F6-705C9825AFBC}"/>
+                <a16:creationId xmlns:a16="http://schemas.microsoft.com/office/drawing/2014/main" xmlns="" id="{F0AB17F6-592B-45CB-96F6-705C9825AFBC}"/>
               </a:ext>
               <a:ext uri="{C183D7F6-B498-43B3-948B-1728B52AA6E4}">
-                <adec:decorative xmlns:adec="http://schemas.microsoft.com/office/drawing/2017/decorative" val="1"/>
+                <adec:decorative xmlns:adec="http://schemas.microsoft.com/office/drawing/2017/decorative" xmlns="" val="1"/>
               </a:ext>
             </a:extLst>
           </p:cNvPr>
@@ -9124,7 +9124,7 @@
           <p:nvPr>
             <p:extLst>
               <p:ext uri="{386F3935-93C4-4BCD-93E2-E3B085C9AB24}">
-                <p16:designElem xmlns:p16="http://schemas.microsoft.com/office/powerpoint/2015/main" val="1"/>
+                <p16:designElem xmlns:p16="http://schemas.microsoft.com/office/powerpoint/2015/main" xmlns="" val="1"/>
               </p:ext>
             </p:extLst>
           </p:nvPr>
@@ -9171,7 +9171,7 @@
           <p:cNvPr id="2" name="Title 1">
             <a:extLst>
               <a:ext uri="{FF2B5EF4-FFF2-40B4-BE49-F238E27FC236}">
-                <a16:creationId xmlns:a16="http://schemas.microsoft.com/office/drawing/2014/main" id="{6FC29038-DDBC-4BFF-89F4-CE1EC9E6EEB3}"/>
+                <a16:creationId xmlns:a16="http://schemas.microsoft.com/office/drawing/2014/main" xmlns="" id="{6FC29038-DDBC-4BFF-89F4-CE1EC9E6EEB3}"/>
               </a:ext>
             </a:extLst>
           </p:cNvPr>
@@ -9211,10 +9211,10 @@
           <p:cNvPr id="17" name="Straight Connector 16">
             <a:extLst>
               <a:ext uri="{FF2B5EF4-FFF2-40B4-BE49-F238E27FC236}">
-                <a16:creationId xmlns:a16="http://schemas.microsoft.com/office/drawing/2014/main" id="{5A9284E7-0823-472D-9963-18D89DFEB8B4}"/>
+                <a16:creationId xmlns:a16="http://schemas.microsoft.com/office/drawing/2014/main" xmlns="" id="{5A9284E7-0823-472D-9963-18D89DFEB8B4}"/>
               </a:ext>
               <a:ext uri="{C183D7F6-B498-43B3-948B-1728B52AA6E4}">
-                <adec:decorative xmlns:adec="http://schemas.microsoft.com/office/drawing/2017/decorative" val="1"/>
+                <adec:decorative xmlns:adec="http://schemas.microsoft.com/office/drawing/2017/decorative" xmlns="" val="1"/>
               </a:ext>
             </a:extLst>
           </p:cNvPr>
@@ -9224,7 +9224,7 @@
           <p:nvPr>
             <p:extLst>
               <p:ext uri="{386F3935-93C4-4BCD-93E2-E3B085C9AB24}">
-                <p16:designElem xmlns:p16="http://schemas.microsoft.com/office/powerpoint/2015/main" val="1"/>
+                <p16:designElem xmlns:p16="http://schemas.microsoft.com/office/powerpoint/2015/main" xmlns="" val="1"/>
               </p:ext>
             </p:extLst>
           </p:nvPr>
@@ -9313,10 +9313,10 @@
           <p:cNvPr id="20" name="Rectangle 19">
             <a:extLst>
               <a:ext uri="{FF2B5EF4-FFF2-40B4-BE49-F238E27FC236}">
-                <a16:creationId xmlns:a16="http://schemas.microsoft.com/office/drawing/2014/main" id="{8D11E4C3-B2CB-4105-9B42-B5E438A1910F}"/>
+                <a16:creationId xmlns:a16="http://schemas.microsoft.com/office/drawing/2014/main" xmlns="" id="{8D11E4C3-B2CB-4105-9B42-B5E438A1910F}"/>
               </a:ext>
               <a:ext uri="{C183D7F6-B498-43B3-948B-1728B52AA6E4}">
-                <adec:decorative xmlns:adec="http://schemas.microsoft.com/office/drawing/2017/decorative" val="1"/>
+                <adec:decorative xmlns:adec="http://schemas.microsoft.com/office/drawing/2017/decorative" xmlns="" val="1"/>
               </a:ext>
             </a:extLst>
           </p:cNvPr>
@@ -9326,7 +9326,7 @@
           <p:nvPr>
             <p:extLst>
               <p:ext uri="{386F3935-93C4-4BCD-93E2-E3B085C9AB24}">
-                <p16:designElem xmlns:p16="http://schemas.microsoft.com/office/powerpoint/2015/main" val="1"/>
+                <p16:designElem xmlns:p16="http://schemas.microsoft.com/office/powerpoint/2015/main" xmlns="" val="1"/>
               </p:ext>
             </p:extLst>
           </p:nvPr>
@@ -9379,10 +9379,10 @@
           <p:cNvPr id="22" name="Picture 21">
             <a:extLst>
               <a:ext uri="{FF2B5EF4-FFF2-40B4-BE49-F238E27FC236}">
-                <a16:creationId xmlns:a16="http://schemas.microsoft.com/office/drawing/2014/main" id="{D801A41D-49C4-4F95-AA12-FE7B943A5079}"/>
+                <a16:creationId xmlns:a16="http://schemas.microsoft.com/office/drawing/2014/main" xmlns="" id="{D801A41D-49C4-4F95-AA12-FE7B943A5079}"/>
               </a:ext>
               <a:ext uri="{C183D7F6-B498-43B3-948B-1728B52AA6E4}">
-                <adec:decorative xmlns:adec="http://schemas.microsoft.com/office/drawing/2017/decorative" val="1"/>
+                <adec:decorative xmlns:adec="http://schemas.microsoft.com/office/drawing/2017/decorative" xmlns="" val="1"/>
               </a:ext>
             </a:extLst>
           </p:cNvPr>
@@ -9392,7 +9392,7 @@
           <p:nvPr>
             <p:extLst>
               <p:ext uri="{386F3935-93C4-4BCD-93E2-E3B085C9AB24}">
-                <p16:designElem xmlns:p16="http://schemas.microsoft.com/office/powerpoint/2015/main" val="1"/>
+                <p16:designElem xmlns:p16="http://schemas.microsoft.com/office/powerpoint/2015/main" xmlns="" val="1"/>
               </p:ext>
             </p:extLst>
           </p:nvPr>
@@ -9423,10 +9423,10 @@
           <p:cNvPr id="24" name="Straight Connector 23">
             <a:extLst>
               <a:ext uri="{FF2B5EF4-FFF2-40B4-BE49-F238E27FC236}">
-                <a16:creationId xmlns:a16="http://schemas.microsoft.com/office/drawing/2014/main" id="{0073EB83-C81E-44B9-8EF1-2975C77B947D}"/>
+                <a16:creationId xmlns:a16="http://schemas.microsoft.com/office/drawing/2014/main" xmlns="" id="{0073EB83-C81E-44B9-8EF1-2975C77B947D}"/>
               </a:ext>
               <a:ext uri="{C183D7F6-B498-43B3-948B-1728B52AA6E4}">
-                <adec:decorative xmlns:adec="http://schemas.microsoft.com/office/drawing/2017/decorative" val="1"/>
+                <adec:decorative xmlns:adec="http://schemas.microsoft.com/office/drawing/2017/decorative" xmlns="" val="1"/>
               </a:ext>
             </a:extLst>
           </p:cNvPr>
@@ -9436,7 +9436,7 @@
           <p:nvPr>
             <p:extLst>
               <p:ext uri="{386F3935-93C4-4BCD-93E2-E3B085C9AB24}">
-                <p16:designElem xmlns:p16="http://schemas.microsoft.com/office/powerpoint/2015/main" val="1"/>
+                <p16:designElem xmlns:p16="http://schemas.microsoft.com/office/powerpoint/2015/main" xmlns="" val="1"/>
               </p:ext>
             </p:extLst>
           </p:nvPr>
@@ -9477,10 +9477,10 @@
           <p:cNvPr id="26" name="Rectangle 25">
             <a:extLst>
               <a:ext uri="{FF2B5EF4-FFF2-40B4-BE49-F238E27FC236}">
-                <a16:creationId xmlns:a16="http://schemas.microsoft.com/office/drawing/2014/main" id="{5E2F33F9-B3D5-437B-AB8D-7624445EBD3B}"/>
+                <a16:creationId xmlns:a16="http://schemas.microsoft.com/office/drawing/2014/main" xmlns="" id="{5E2F33F9-B3D5-437B-AB8D-7624445EBD3B}"/>
               </a:ext>
               <a:ext uri="{C183D7F6-B498-43B3-948B-1728B52AA6E4}">
-                <adec:decorative xmlns:adec="http://schemas.microsoft.com/office/drawing/2017/decorative" val="1"/>
+                <adec:decorative xmlns:adec="http://schemas.microsoft.com/office/drawing/2017/decorative" xmlns="" val="1"/>
               </a:ext>
             </a:extLst>
           </p:cNvPr>
@@ -9490,7 +9490,7 @@
           <p:nvPr>
             <p:extLst>
               <p:ext uri="{386F3935-93C4-4BCD-93E2-E3B085C9AB24}">
-                <p16:designElem xmlns:p16="http://schemas.microsoft.com/office/powerpoint/2015/main" val="1"/>
+                <p16:designElem xmlns:p16="http://schemas.microsoft.com/office/powerpoint/2015/main" xmlns="" val="1"/>
               </p:ext>
             </p:extLst>
           </p:nvPr>
@@ -9540,7 +9540,7 @@
           <p:cNvPr id="3" name="Picture 2" descr="A picture containing electronics&#10;&#10;Description automatically generated">
             <a:extLst>
               <a:ext uri="{FF2B5EF4-FFF2-40B4-BE49-F238E27FC236}">
-                <a16:creationId xmlns:a16="http://schemas.microsoft.com/office/drawing/2014/main" id="{EAC95AA0-7569-48A2-9169-44F3C43EC0E2}"/>
+                <a16:creationId xmlns:a16="http://schemas.microsoft.com/office/drawing/2014/main" xmlns="" id="{EAC95AA0-7569-48A2-9169-44F3C43EC0E2}"/>
               </a:ext>
             </a:extLst>
           </p:cNvPr>
@@ -9575,7 +9575,7 @@
           <p:cNvPr id="6" name="Content Placeholder 5" descr="Icon&#10;&#10;Description automatically generated">
             <a:extLst>
               <a:ext uri="{FF2B5EF4-FFF2-40B4-BE49-F238E27FC236}">
-                <a16:creationId xmlns:a16="http://schemas.microsoft.com/office/drawing/2014/main" id="{4B369CB3-9EB4-40BF-BFE9-4CD7D398D1E6}"/>
+                <a16:creationId xmlns:a16="http://schemas.microsoft.com/office/drawing/2014/main" xmlns="" id="{4B369CB3-9EB4-40BF-BFE9-4CD7D398D1E6}"/>
               </a:ext>
             </a:extLst>
           </p:cNvPr>
@@ -9672,10 +9672,10 @@
           <p:cNvPr id="24" name="Rectangle 23">
             <a:extLst>
               <a:ext uri="{FF2B5EF4-FFF2-40B4-BE49-F238E27FC236}">
-                <a16:creationId xmlns:a16="http://schemas.microsoft.com/office/drawing/2014/main" id="{1CE580D1-F917-4567-AFB4-99AA9B52ADF0}"/>
+                <a16:creationId xmlns:a16="http://schemas.microsoft.com/office/drawing/2014/main" xmlns="" id="{1CE580D1-F917-4567-AFB4-99AA9B52ADF0}"/>
               </a:ext>
               <a:ext uri="{C183D7F6-B498-43B3-948B-1728B52AA6E4}">
-                <adec:decorative xmlns:adec="http://schemas.microsoft.com/office/drawing/2017/decorative" val="1"/>
+                <adec:decorative xmlns:adec="http://schemas.microsoft.com/office/drawing/2017/decorative" xmlns="" val="1"/>
               </a:ext>
             </a:extLst>
           </p:cNvPr>
@@ -9685,7 +9685,7 @@
           <p:nvPr>
             <p:extLst>
               <p:ext uri="{386F3935-93C4-4BCD-93E2-E3B085C9AB24}">
-                <p16:designElem xmlns:p16="http://schemas.microsoft.com/office/powerpoint/2015/main" val="1"/>
+                <p16:designElem xmlns:p16="http://schemas.microsoft.com/office/powerpoint/2015/main" xmlns="" val="1"/>
               </p:ext>
             </p:extLst>
           </p:nvPr>
@@ -9738,10 +9738,10 @@
           <p:cNvPr id="26" name="Picture 25">
             <a:extLst>
               <a:ext uri="{FF2B5EF4-FFF2-40B4-BE49-F238E27FC236}">
-                <a16:creationId xmlns:a16="http://schemas.microsoft.com/office/drawing/2014/main" id="{1F5620B8-A2D8-4568-B566-F0453A0D9167}"/>
+                <a16:creationId xmlns:a16="http://schemas.microsoft.com/office/drawing/2014/main" xmlns="" id="{1F5620B8-A2D8-4568-B566-F0453A0D9167}"/>
               </a:ext>
               <a:ext uri="{C183D7F6-B498-43B3-948B-1728B52AA6E4}">
-                <adec:decorative xmlns:adec="http://schemas.microsoft.com/office/drawing/2017/decorative" val="1"/>
+                <adec:decorative xmlns:adec="http://schemas.microsoft.com/office/drawing/2017/decorative" xmlns="" val="1"/>
               </a:ext>
             </a:extLst>
           </p:cNvPr>
@@ -9751,7 +9751,7 @@
           <p:nvPr>
             <p:extLst>
               <p:ext uri="{386F3935-93C4-4BCD-93E2-E3B085C9AB24}">
-                <p16:designElem xmlns:p16="http://schemas.microsoft.com/office/powerpoint/2015/main" val="1"/>
+                <p16:designElem xmlns:p16="http://schemas.microsoft.com/office/powerpoint/2015/main" xmlns="" val="1"/>
               </p:ext>
             </p:extLst>
           </p:nvPr>
@@ -9782,10 +9782,10 @@
           <p:cNvPr id="28" name="Straight Connector 27">
             <a:extLst>
               <a:ext uri="{FF2B5EF4-FFF2-40B4-BE49-F238E27FC236}">
-                <a16:creationId xmlns:a16="http://schemas.microsoft.com/office/drawing/2014/main" id="{1C7D2BA4-4B7A-4596-8BCC-5CF715423894}"/>
+                <a16:creationId xmlns:a16="http://schemas.microsoft.com/office/drawing/2014/main" xmlns="" id="{1C7D2BA4-4B7A-4596-8BCC-5CF715423894}"/>
               </a:ext>
               <a:ext uri="{C183D7F6-B498-43B3-948B-1728B52AA6E4}">
-                <adec:decorative xmlns:adec="http://schemas.microsoft.com/office/drawing/2017/decorative" val="1"/>
+                <adec:decorative xmlns:adec="http://schemas.microsoft.com/office/drawing/2017/decorative" xmlns="" val="1"/>
               </a:ext>
             </a:extLst>
           </p:cNvPr>
@@ -9795,7 +9795,7 @@
           <p:nvPr>
             <p:extLst>
               <p:ext uri="{386F3935-93C4-4BCD-93E2-E3B085C9AB24}">
-                <p16:designElem xmlns:p16="http://schemas.microsoft.com/office/powerpoint/2015/main" val="1"/>
+                <p16:designElem xmlns:p16="http://schemas.microsoft.com/office/powerpoint/2015/main" xmlns="" val="1"/>
               </p:ext>
             </p:extLst>
           </p:nvPr>
@@ -9836,10 +9836,10 @@
           <p:cNvPr id="30" name="Straight Connector 29">
             <a:extLst>
               <a:ext uri="{FF2B5EF4-FFF2-40B4-BE49-F238E27FC236}">
-                <a16:creationId xmlns:a16="http://schemas.microsoft.com/office/drawing/2014/main" id="{4977F1E1-2B6F-4BB6-899F-67D8764D83C5}"/>
+                <a16:creationId xmlns:a16="http://schemas.microsoft.com/office/drawing/2014/main" xmlns="" id="{4977F1E1-2B6F-4BB6-899F-67D8764D83C5}"/>
               </a:ext>
               <a:ext uri="{C183D7F6-B498-43B3-948B-1728B52AA6E4}">
-                <adec:decorative xmlns:adec="http://schemas.microsoft.com/office/drawing/2017/decorative" val="1"/>
+                <adec:decorative xmlns:adec="http://schemas.microsoft.com/office/drawing/2017/decorative" xmlns="" val="1"/>
               </a:ext>
             </a:extLst>
           </p:cNvPr>
@@ -9849,7 +9849,7 @@
           <p:nvPr>
             <p:extLst>
               <p:ext uri="{386F3935-93C4-4BCD-93E2-E3B085C9AB24}">
-                <p16:designElem xmlns:p16="http://schemas.microsoft.com/office/powerpoint/2015/main" val="1"/>
+                <p16:designElem xmlns:p16="http://schemas.microsoft.com/office/powerpoint/2015/main" xmlns="" val="1"/>
               </p:ext>
             </p:extLst>
           </p:nvPr>
@@ -9884,7 +9884,7 @@
           <p:cNvPr id="4" name="Picture 3" descr="A picture containing text, vector graphics&#10;&#10;Description automatically generated">
             <a:extLst>
               <a:ext uri="{FF2B5EF4-FFF2-40B4-BE49-F238E27FC236}">
-                <a16:creationId xmlns:a16="http://schemas.microsoft.com/office/drawing/2014/main" id="{D65BEFA9-CCE3-4E53-9CF9-7E3EEAC54E8E}"/>
+                <a16:creationId xmlns:a16="http://schemas.microsoft.com/office/drawing/2014/main" xmlns="" id="{D65BEFA9-CCE3-4E53-9CF9-7E3EEAC54E8E}"/>
               </a:ext>
             </a:extLst>
           </p:cNvPr>
@@ -9919,10 +9919,10 @@
           <p:cNvPr id="32" name="Rectangle 31">
             <a:extLst>
               <a:ext uri="{FF2B5EF4-FFF2-40B4-BE49-F238E27FC236}">
-                <a16:creationId xmlns:a16="http://schemas.microsoft.com/office/drawing/2014/main" id="{A4092ECB-D375-4A85-AD6E-85644D2A99E5}"/>
+                <a16:creationId xmlns:a16="http://schemas.microsoft.com/office/drawing/2014/main" xmlns="" id="{A4092ECB-D375-4A85-AD6E-85644D2A99E5}"/>
               </a:ext>
               <a:ext uri="{C183D7F6-B498-43B3-948B-1728B52AA6E4}">
-                <adec:decorative xmlns:adec="http://schemas.microsoft.com/office/drawing/2017/decorative" val="1"/>
+                <adec:decorative xmlns:adec="http://schemas.microsoft.com/office/drawing/2017/decorative" xmlns="" val="1"/>
               </a:ext>
             </a:extLst>
           </p:cNvPr>
@@ -9932,7 +9932,7 @@
           <p:nvPr>
             <p:extLst>
               <p:ext uri="{386F3935-93C4-4BCD-93E2-E3B085C9AB24}">
-                <p16:designElem xmlns:p16="http://schemas.microsoft.com/office/powerpoint/2015/main" val="1"/>
+                <p16:designElem xmlns:p16="http://schemas.microsoft.com/office/powerpoint/2015/main" xmlns="" val="1"/>
               </p:ext>
             </p:extLst>
           </p:nvPr>
@@ -9982,7 +9982,7 @@
           <p:cNvPr id="2" name="Title 1">
             <a:extLst>
               <a:ext uri="{FF2B5EF4-FFF2-40B4-BE49-F238E27FC236}">
-                <a16:creationId xmlns:a16="http://schemas.microsoft.com/office/drawing/2014/main" id="{1A5D062A-AC8A-4ACD-8909-22A198F00884}"/>
+                <a16:creationId xmlns:a16="http://schemas.microsoft.com/office/drawing/2014/main" xmlns="" id="{1A5D062A-AC8A-4ACD-8909-22A198F00884}"/>
               </a:ext>
             </a:extLst>
           </p:cNvPr>
@@ -10022,10 +10022,10 @@
           <p:cNvPr id="34" name="Straight Connector 33">
             <a:extLst>
               <a:ext uri="{FF2B5EF4-FFF2-40B4-BE49-F238E27FC236}">
-                <a16:creationId xmlns:a16="http://schemas.microsoft.com/office/drawing/2014/main" id="{B6C1711D-6DAC-4FE1-B7B6-AC8A81B84C08}"/>
+                <a16:creationId xmlns:a16="http://schemas.microsoft.com/office/drawing/2014/main" xmlns="" id="{B6C1711D-6DAC-4FE1-B7B6-AC8A81B84C08}"/>
               </a:ext>
               <a:ext uri="{C183D7F6-B498-43B3-948B-1728B52AA6E4}">
-                <adec:decorative xmlns:adec="http://schemas.microsoft.com/office/drawing/2017/decorative" val="1"/>
+                <adec:decorative xmlns:adec="http://schemas.microsoft.com/office/drawing/2017/decorative" xmlns="" val="1"/>
               </a:ext>
             </a:extLst>
           </p:cNvPr>
@@ -10035,7 +10035,7 @@
           <p:nvPr>
             <p:extLst>
               <p:ext uri="{386F3935-93C4-4BCD-93E2-E3B085C9AB24}">
-                <p16:designElem xmlns:p16="http://schemas.microsoft.com/office/powerpoint/2015/main" val="1"/>
+                <p16:designElem xmlns:p16="http://schemas.microsoft.com/office/powerpoint/2015/main" xmlns="" val="1"/>
               </p:ext>
             </p:extLst>
           </p:nvPr>
@@ -10128,10 +10128,10 @@
           <p:cNvPr id="7" name="Rectangle 6">
             <a:extLst>
               <a:ext uri="{FF2B5EF4-FFF2-40B4-BE49-F238E27FC236}">
-                <a16:creationId xmlns:a16="http://schemas.microsoft.com/office/drawing/2014/main" id="{23522FE7-5A29-4EF6-B1EF-2CA55748A772}"/>
+                <a16:creationId xmlns:a16="http://schemas.microsoft.com/office/drawing/2014/main" xmlns="" id="{23522FE7-5A29-4EF6-B1EF-2CA55748A772}"/>
               </a:ext>
               <a:ext uri="{C183D7F6-B498-43B3-948B-1728B52AA6E4}">
-                <adec:decorative xmlns:adec="http://schemas.microsoft.com/office/drawing/2017/decorative" val="1"/>
+                <adec:decorative xmlns:adec="http://schemas.microsoft.com/office/drawing/2017/decorative" xmlns="" val="1"/>
               </a:ext>
             </a:extLst>
           </p:cNvPr>
@@ -10141,7 +10141,7 @@
           <p:nvPr>
             <p:extLst>
               <p:ext uri="{386F3935-93C4-4BCD-93E2-E3B085C9AB24}">
-                <p16:designElem xmlns:p16="http://schemas.microsoft.com/office/powerpoint/2015/main" val="1"/>
+                <p16:designElem xmlns:p16="http://schemas.microsoft.com/office/powerpoint/2015/main" xmlns="" val="1"/>
               </p:ext>
             </p:extLst>
           </p:nvPr>
@@ -10194,10 +10194,10 @@
           <p:cNvPr id="9" name="Picture 8">
             <a:extLst>
               <a:ext uri="{FF2B5EF4-FFF2-40B4-BE49-F238E27FC236}">
-                <a16:creationId xmlns:a16="http://schemas.microsoft.com/office/drawing/2014/main" id="{C2192E09-EBC7-416C-B887-DFF915D7F43D}"/>
+                <a16:creationId xmlns:a16="http://schemas.microsoft.com/office/drawing/2014/main" xmlns="" id="{C2192E09-EBC7-416C-B887-DFF915D7F43D}"/>
               </a:ext>
               <a:ext uri="{C183D7F6-B498-43B3-948B-1728B52AA6E4}">
-                <adec:decorative xmlns:adec="http://schemas.microsoft.com/office/drawing/2017/decorative" val="1"/>
+                <adec:decorative xmlns:adec="http://schemas.microsoft.com/office/drawing/2017/decorative" xmlns="" val="1"/>
               </a:ext>
             </a:extLst>
           </p:cNvPr>
@@ -10207,7 +10207,7 @@
           <p:nvPr>
             <p:extLst>
               <p:ext uri="{386F3935-93C4-4BCD-93E2-E3B085C9AB24}">
-                <p16:designElem xmlns:p16="http://schemas.microsoft.com/office/powerpoint/2015/main" val="1"/>
+                <p16:designElem xmlns:p16="http://schemas.microsoft.com/office/powerpoint/2015/main" xmlns="" val="1"/>
               </p:ext>
             </p:extLst>
           </p:nvPr>
@@ -10238,10 +10238,10 @@
           <p:cNvPr id="11" name="Straight Connector 10">
             <a:extLst>
               <a:ext uri="{FF2B5EF4-FFF2-40B4-BE49-F238E27FC236}">
-                <a16:creationId xmlns:a16="http://schemas.microsoft.com/office/drawing/2014/main" id="{2924498D-E084-44BE-A196-CFCE35564350}"/>
+                <a16:creationId xmlns:a16="http://schemas.microsoft.com/office/drawing/2014/main" xmlns="" id="{2924498D-E084-44BE-A196-CFCE35564350}"/>
               </a:ext>
               <a:ext uri="{C183D7F6-B498-43B3-948B-1728B52AA6E4}">
-                <adec:decorative xmlns:adec="http://schemas.microsoft.com/office/drawing/2017/decorative" val="1"/>
+                <adec:decorative xmlns:adec="http://schemas.microsoft.com/office/drawing/2017/decorative" xmlns="" val="1"/>
               </a:ext>
             </a:extLst>
           </p:cNvPr>
@@ -10251,7 +10251,7 @@
           <p:nvPr>
             <p:extLst>
               <p:ext uri="{386F3935-93C4-4BCD-93E2-E3B085C9AB24}">
-                <p16:designElem xmlns:p16="http://schemas.microsoft.com/office/powerpoint/2015/main" val="1"/>
+                <p16:designElem xmlns:p16="http://schemas.microsoft.com/office/powerpoint/2015/main" xmlns="" val="1"/>
               </p:ext>
             </p:extLst>
           </p:nvPr>
@@ -10292,10 +10292,10 @@
           <p:cNvPr id="13" name="Straight Connector 12">
             <a:extLst>
               <a:ext uri="{FF2B5EF4-FFF2-40B4-BE49-F238E27FC236}">
-                <a16:creationId xmlns:a16="http://schemas.microsoft.com/office/drawing/2014/main" id="{3BBC7667-C352-4842-9AFD-E5C16AD002F4}"/>
+                <a16:creationId xmlns:a16="http://schemas.microsoft.com/office/drawing/2014/main" xmlns="" id="{3BBC7667-C352-4842-9AFD-E5C16AD002F4}"/>
               </a:ext>
               <a:ext uri="{C183D7F6-B498-43B3-948B-1728B52AA6E4}">
-                <adec:decorative xmlns:adec="http://schemas.microsoft.com/office/drawing/2017/decorative" val="1"/>
+                <adec:decorative xmlns:adec="http://schemas.microsoft.com/office/drawing/2017/decorative" xmlns="" val="1"/>
               </a:ext>
             </a:extLst>
           </p:cNvPr>
@@ -10305,7 +10305,7 @@
           <p:nvPr>
             <p:extLst>
               <p:ext uri="{386F3935-93C4-4BCD-93E2-E3B085C9AB24}">
-                <p16:designElem xmlns:p16="http://schemas.microsoft.com/office/powerpoint/2015/main" val="1"/>
+                <p16:designElem xmlns:p16="http://schemas.microsoft.com/office/powerpoint/2015/main" xmlns="" val="1"/>
               </p:ext>
             </p:extLst>
           </p:nvPr>
@@ -10340,10 +10340,10 @@
           <p:cNvPr id="15" name="Rectangle 14">
             <a:extLst>
               <a:ext uri="{FF2B5EF4-FFF2-40B4-BE49-F238E27FC236}">
-                <a16:creationId xmlns:a16="http://schemas.microsoft.com/office/drawing/2014/main" id="{F0AB17F6-592B-45CB-96F6-705C9825AFBC}"/>
+                <a16:creationId xmlns:a16="http://schemas.microsoft.com/office/drawing/2014/main" xmlns="" id="{F0AB17F6-592B-45CB-96F6-705C9825AFBC}"/>
               </a:ext>
               <a:ext uri="{C183D7F6-B498-43B3-948B-1728B52AA6E4}">
-                <adec:decorative xmlns:adec="http://schemas.microsoft.com/office/drawing/2017/decorative" val="1"/>
+                <adec:decorative xmlns:adec="http://schemas.microsoft.com/office/drawing/2017/decorative" xmlns="" val="1"/>
               </a:ext>
             </a:extLst>
           </p:cNvPr>
@@ -10353,7 +10353,7 @@
           <p:nvPr>
             <p:extLst>
               <p:ext uri="{386F3935-93C4-4BCD-93E2-E3B085C9AB24}">
-                <p16:designElem xmlns:p16="http://schemas.microsoft.com/office/powerpoint/2015/main" val="1"/>
+                <p16:designElem xmlns:p16="http://schemas.microsoft.com/office/powerpoint/2015/main" xmlns="" val="1"/>
               </p:ext>
             </p:extLst>
           </p:nvPr>
@@ -10400,7 +10400,7 @@
           <p:cNvPr id="2" name="Title 1">
             <a:extLst>
               <a:ext uri="{FF2B5EF4-FFF2-40B4-BE49-F238E27FC236}">
-                <a16:creationId xmlns:a16="http://schemas.microsoft.com/office/drawing/2014/main" id="{6FC29038-DDBC-4BFF-89F4-CE1EC9E6EEB3}"/>
+                <a16:creationId xmlns:a16="http://schemas.microsoft.com/office/drawing/2014/main" xmlns="" id="{6FC29038-DDBC-4BFF-89F4-CE1EC9E6EEB3}"/>
               </a:ext>
             </a:extLst>
           </p:cNvPr>
@@ -10440,10 +10440,10 @@
           <p:cNvPr id="17" name="Straight Connector 16">
             <a:extLst>
               <a:ext uri="{FF2B5EF4-FFF2-40B4-BE49-F238E27FC236}">
-                <a16:creationId xmlns:a16="http://schemas.microsoft.com/office/drawing/2014/main" id="{5A9284E7-0823-472D-9963-18D89DFEB8B4}"/>
+                <a16:creationId xmlns:a16="http://schemas.microsoft.com/office/drawing/2014/main" xmlns="" id="{5A9284E7-0823-472D-9963-18D89DFEB8B4}"/>
               </a:ext>
               <a:ext uri="{C183D7F6-B498-43B3-948B-1728B52AA6E4}">
-                <adec:decorative xmlns:adec="http://schemas.microsoft.com/office/drawing/2017/decorative" val="1"/>
+                <adec:decorative xmlns:adec="http://schemas.microsoft.com/office/drawing/2017/decorative" xmlns="" val="1"/>
               </a:ext>
             </a:extLst>
           </p:cNvPr>
@@ -10453,7 +10453,7 @@
           <p:nvPr>
             <p:extLst>
               <p:ext uri="{386F3935-93C4-4BCD-93E2-E3B085C9AB24}">
-                <p16:designElem xmlns:p16="http://schemas.microsoft.com/office/powerpoint/2015/main" val="1"/>
+                <p16:designElem xmlns:p16="http://schemas.microsoft.com/office/powerpoint/2015/main" xmlns="" val="1"/>
               </p:ext>
             </p:extLst>
           </p:nvPr>
@@ -10542,10 +10542,10 @@
           <p:cNvPr id="49" name="Rectangle 28">
             <a:extLst>
               <a:ext uri="{FF2B5EF4-FFF2-40B4-BE49-F238E27FC236}">
-                <a16:creationId xmlns:a16="http://schemas.microsoft.com/office/drawing/2014/main" id="{021A4066-B261-49FE-952E-A0FE3EE75CD2}"/>
+                <a16:creationId xmlns:a16="http://schemas.microsoft.com/office/drawing/2014/main" xmlns="" id="{021A4066-B261-49FE-952E-A0FE3EE75CD2}"/>
               </a:ext>
               <a:ext uri="{C183D7F6-B498-43B3-948B-1728B52AA6E4}">
-                <adec:decorative xmlns:adec="http://schemas.microsoft.com/office/drawing/2017/decorative" val="1"/>
+                <adec:decorative xmlns:adec="http://schemas.microsoft.com/office/drawing/2017/decorative" xmlns="" val="1"/>
               </a:ext>
             </a:extLst>
           </p:cNvPr>
@@ -10555,7 +10555,7 @@
           <p:nvPr>
             <p:extLst>
               <p:ext uri="{386F3935-93C4-4BCD-93E2-E3B085C9AB24}">
-                <p16:designElem xmlns:p16="http://schemas.microsoft.com/office/powerpoint/2015/main" val="1"/>
+                <p16:designElem xmlns:p16="http://schemas.microsoft.com/office/powerpoint/2015/main" xmlns="" val="1"/>
               </p:ext>
             </p:extLst>
           </p:nvPr>
@@ -10602,10 +10602,10 @@
           <p:cNvPr id="50" name="Straight Connector 30">
             <a:extLst>
               <a:ext uri="{FF2B5EF4-FFF2-40B4-BE49-F238E27FC236}">
-                <a16:creationId xmlns:a16="http://schemas.microsoft.com/office/drawing/2014/main" id="{381B4579-E2EA-4BD7-94FF-0A0BEE135C6B}"/>
+                <a16:creationId xmlns:a16="http://schemas.microsoft.com/office/drawing/2014/main" xmlns="" id="{381B4579-E2EA-4BD7-94FF-0A0BEE135C6B}"/>
               </a:ext>
               <a:ext uri="{C183D7F6-B498-43B3-948B-1728B52AA6E4}">
-                <adec:decorative xmlns:adec="http://schemas.microsoft.com/office/drawing/2017/decorative" val="1"/>
+                <adec:decorative xmlns:adec="http://schemas.microsoft.com/office/drawing/2017/decorative" xmlns="" val="1"/>
               </a:ext>
             </a:extLst>
           </p:cNvPr>
@@ -10615,7 +10615,7 @@
           <p:nvPr>
             <p:extLst>
               <p:ext uri="{386F3935-93C4-4BCD-93E2-E3B085C9AB24}">
-                <p16:designElem xmlns:p16="http://schemas.microsoft.com/office/powerpoint/2015/main" val="1"/>
+                <p16:designElem xmlns:p16="http://schemas.microsoft.com/office/powerpoint/2015/main" xmlns="" val="1"/>
               </p:ext>
             </p:extLst>
           </p:nvPr>
@@ -10650,7 +10650,7 @@
           <p:cNvPr id="2" name="Title 1">
             <a:extLst>
               <a:ext uri="{FF2B5EF4-FFF2-40B4-BE49-F238E27FC236}">
-                <a16:creationId xmlns:a16="http://schemas.microsoft.com/office/drawing/2014/main" id="{795DB3BF-3CE7-4BD2-B84B-21AA455D263D}"/>
+                <a16:creationId xmlns:a16="http://schemas.microsoft.com/office/drawing/2014/main" xmlns="" id="{795DB3BF-3CE7-4BD2-B84B-21AA455D263D}"/>
               </a:ext>
             </a:extLst>
           </p:cNvPr>
@@ -10685,10 +10685,10 @@
           <p:cNvPr id="51" name="Rectangle 32">
             <a:extLst>
               <a:ext uri="{FF2B5EF4-FFF2-40B4-BE49-F238E27FC236}">
-                <a16:creationId xmlns:a16="http://schemas.microsoft.com/office/drawing/2014/main" id="{81958111-BC13-4D45-AB27-0C2C83F9BA64}"/>
+                <a16:creationId xmlns:a16="http://schemas.microsoft.com/office/drawing/2014/main" xmlns="" id="{81958111-BC13-4D45-AB27-0C2C83F9BA64}"/>
               </a:ext>
               <a:ext uri="{C183D7F6-B498-43B3-948B-1728B52AA6E4}">
-                <adec:decorative xmlns:adec="http://schemas.microsoft.com/office/drawing/2017/decorative" val="1"/>
+                <adec:decorative xmlns:adec="http://schemas.microsoft.com/office/drawing/2017/decorative" xmlns="" val="1"/>
               </a:ext>
             </a:extLst>
           </p:cNvPr>
@@ -10698,7 +10698,7 @@
           <p:nvPr>
             <p:extLst>
               <p:ext uri="{386F3935-93C4-4BCD-93E2-E3B085C9AB24}">
-                <p16:designElem xmlns:p16="http://schemas.microsoft.com/office/powerpoint/2015/main" val="1"/>
+                <p16:designElem xmlns:p16="http://schemas.microsoft.com/office/powerpoint/2015/main" xmlns="" val="1"/>
               </p:ext>
             </p:extLst>
           </p:nvPr>
@@ -10759,7 +10759,7 @@
           <p:cNvPr id="26" name="Content Placeholder 25">
             <a:extLst>
               <a:ext uri="{FF2B5EF4-FFF2-40B4-BE49-F238E27FC236}">
-                <a16:creationId xmlns:a16="http://schemas.microsoft.com/office/drawing/2014/main" id="{EEEC9B65-B358-AE16-2919-517F7129E7C2}"/>
+                <a16:creationId xmlns:a16="http://schemas.microsoft.com/office/drawing/2014/main" xmlns="" id="{EEEC9B65-B358-AE16-2919-517F7129E7C2}"/>
               </a:ext>
             </a:extLst>
           </p:cNvPr>
@@ -10804,10 +10804,10 @@
           <p:cNvPr id="52" name="Group 34">
             <a:extLst>
               <a:ext uri="{FF2B5EF4-FFF2-40B4-BE49-F238E27FC236}">
-                <a16:creationId xmlns:a16="http://schemas.microsoft.com/office/drawing/2014/main" id="{82188758-E18A-4CE5-9D03-F4BF5D887C3F}"/>
+                <a16:creationId xmlns:a16="http://schemas.microsoft.com/office/drawing/2014/main" xmlns="" id="{82188758-E18A-4CE5-9D03-F4BF5D887C3F}"/>
               </a:ext>
               <a:ext uri="{C183D7F6-B498-43B3-948B-1728B52AA6E4}">
-                <adec:decorative xmlns:adec="http://schemas.microsoft.com/office/drawing/2017/decorative" val="1"/>
+                <adec:decorative xmlns:adec="http://schemas.microsoft.com/office/drawing/2017/decorative" xmlns="" val="1"/>
               </a:ext>
             </a:extLst>
           </p:cNvPr>
@@ -10817,7 +10817,7 @@
           <p:nvPr>
             <p:extLst>
               <p:ext uri="{386F3935-93C4-4BCD-93E2-E3B085C9AB24}">
-                <p16:designElem xmlns:p16="http://schemas.microsoft.com/office/powerpoint/2015/main" val="1"/>
+                <p16:designElem xmlns:p16="http://schemas.microsoft.com/office/powerpoint/2015/main" xmlns="" val="1"/>
               </p:ext>
             </p:extLst>
           </p:nvPr>
@@ -10835,10 +10835,10 @@
             <p:cNvPr id="36" name="Rectangle 35">
               <a:extLst>
                 <a:ext uri="{FF2B5EF4-FFF2-40B4-BE49-F238E27FC236}">
-                  <a16:creationId xmlns:a16="http://schemas.microsoft.com/office/drawing/2014/main" id="{821513DD-C15F-4381-AEA6-ED9E5E218CA6}"/>
+                  <a16:creationId xmlns:a16="http://schemas.microsoft.com/office/drawing/2014/main" xmlns="" id="{821513DD-C15F-4381-AEA6-ED9E5E218CA6}"/>
                 </a:ext>
                 <a:ext uri="{C183D7F6-B498-43B3-948B-1728B52AA6E4}">
-                  <adec:decorative xmlns:adec="http://schemas.microsoft.com/office/drawing/2017/decorative" val="1"/>
+                  <adec:decorative xmlns:adec="http://schemas.microsoft.com/office/drawing/2017/decorative" xmlns="" val="1"/>
                 </a:ext>
               </a:extLst>
             </p:cNvPr>
@@ -10846,7 +10846,7 @@
             <p:nvPr>
               <p:extLst>
                 <p:ext uri="{386F3935-93C4-4BCD-93E2-E3B085C9AB24}">
-                  <p16:designElem xmlns:p16="http://schemas.microsoft.com/office/powerpoint/2015/main" val="1"/>
+                  <p16:designElem xmlns:p16="http://schemas.microsoft.com/office/powerpoint/2015/main" xmlns="" val="1"/>
                 </p:ext>
               </p:extLst>
             </p:nvPr>
@@ -10916,10 +10916,10 @@
             <p:cNvPr id="53" name="Rectangle 36">
               <a:extLst>
                 <a:ext uri="{FF2B5EF4-FFF2-40B4-BE49-F238E27FC236}">
-                  <a16:creationId xmlns:a16="http://schemas.microsoft.com/office/drawing/2014/main" id="{CED2DE01-7F43-4858-85FC-27022DA78120}"/>
+                  <a16:creationId xmlns:a16="http://schemas.microsoft.com/office/drawing/2014/main" xmlns="" id="{CED2DE01-7F43-4858-85FC-27022DA78120}"/>
                 </a:ext>
                 <a:ext uri="{C183D7F6-B498-43B3-948B-1728B52AA6E4}">
-                  <adec:decorative xmlns:adec="http://schemas.microsoft.com/office/drawing/2017/decorative" val="1"/>
+                  <adec:decorative xmlns:adec="http://schemas.microsoft.com/office/drawing/2017/decorative" xmlns="" val="1"/>
                 </a:ext>
               </a:extLst>
             </p:cNvPr>
@@ -10927,7 +10927,7 @@
             <p:nvPr>
               <p:extLst>
                 <p:ext uri="{386F3935-93C4-4BCD-93E2-E3B085C9AB24}">
-                  <p16:designElem xmlns:p16="http://schemas.microsoft.com/office/powerpoint/2015/main" val="1"/>
+                  <p16:designElem xmlns:p16="http://schemas.microsoft.com/office/powerpoint/2015/main" xmlns="" val="1"/>
                 </p:ext>
               </p:extLst>
             </p:nvPr>
@@ -11001,7 +11001,7 @@
           <p:cNvPr id="22" name="Content Placeholder 21" descr="A picture containing text&#10;&#10;Description automatically generated">
             <a:extLst>
               <a:ext uri="{FF2B5EF4-FFF2-40B4-BE49-F238E27FC236}">
-                <a16:creationId xmlns:a16="http://schemas.microsoft.com/office/drawing/2014/main" id="{55AF8C6B-0C2F-4026-9EEF-FA2E5DFAE417}"/>
+                <a16:creationId xmlns:a16="http://schemas.microsoft.com/office/drawing/2014/main" xmlns="" id="{55AF8C6B-0C2F-4026-9EEF-FA2E5DFAE417}"/>
               </a:ext>
             </a:extLst>
           </p:cNvPr>
@@ -11036,10 +11036,10 @@
           <p:cNvPr id="54" name="Picture 38">
             <a:extLst>
               <a:ext uri="{FF2B5EF4-FFF2-40B4-BE49-F238E27FC236}">
-                <a16:creationId xmlns:a16="http://schemas.microsoft.com/office/drawing/2014/main" id="{D42F4933-2ECF-4EE5-BCE4-F19E3CA609FE}"/>
+                <a16:creationId xmlns:a16="http://schemas.microsoft.com/office/drawing/2014/main" xmlns="" id="{D42F4933-2ECF-4EE5-BCE4-F19E3CA609FE}"/>
               </a:ext>
               <a:ext uri="{C183D7F6-B498-43B3-948B-1728B52AA6E4}">
-                <adec:decorative xmlns:adec="http://schemas.microsoft.com/office/drawing/2017/decorative" val="1"/>
+                <adec:decorative xmlns:adec="http://schemas.microsoft.com/office/drawing/2017/decorative" xmlns="" val="1"/>
               </a:ext>
             </a:extLst>
           </p:cNvPr>
@@ -11049,7 +11049,7 @@
           <p:nvPr>
             <p:extLst>
               <p:ext uri="{386F3935-93C4-4BCD-93E2-E3B085C9AB24}">
-                <p16:designElem xmlns:p16="http://schemas.microsoft.com/office/powerpoint/2015/main" val="1"/>
+                <p16:designElem xmlns:p16="http://schemas.microsoft.com/office/powerpoint/2015/main" xmlns="" val="1"/>
               </p:ext>
             </p:extLst>
           </p:nvPr>
@@ -11080,10 +11080,10 @@
           <p:cNvPr id="55" name="Straight Connector 40">
             <a:extLst>
               <a:ext uri="{FF2B5EF4-FFF2-40B4-BE49-F238E27FC236}">
-                <a16:creationId xmlns:a16="http://schemas.microsoft.com/office/drawing/2014/main" id="{C6FAC23C-014D-4AC5-AD1B-36F7D0E7EF32}"/>
+                <a16:creationId xmlns:a16="http://schemas.microsoft.com/office/drawing/2014/main" xmlns="" id="{C6FAC23C-014D-4AC5-AD1B-36F7D0E7EF32}"/>
               </a:ext>
               <a:ext uri="{C183D7F6-B498-43B3-948B-1728B52AA6E4}">
-                <adec:decorative xmlns:adec="http://schemas.microsoft.com/office/drawing/2017/decorative" val="1"/>
+                <adec:decorative xmlns:adec="http://schemas.microsoft.com/office/drawing/2017/decorative" xmlns="" val="1"/>
               </a:ext>
             </a:extLst>
           </p:cNvPr>
@@ -11093,7 +11093,7 @@
           <p:nvPr>
             <p:extLst>
               <p:ext uri="{386F3935-93C4-4BCD-93E2-E3B085C9AB24}">
-                <p16:designElem xmlns:p16="http://schemas.microsoft.com/office/powerpoint/2015/main" val="1"/>
+                <p16:designElem xmlns:p16="http://schemas.microsoft.com/office/powerpoint/2015/main" xmlns="" val="1"/>
               </p:ext>
             </p:extLst>
           </p:nvPr>
@@ -11188,10 +11188,10 @@
           <p:cNvPr id="7" name="Rectangle 6">
             <a:extLst>
               <a:ext uri="{FF2B5EF4-FFF2-40B4-BE49-F238E27FC236}">
-                <a16:creationId xmlns:a16="http://schemas.microsoft.com/office/drawing/2014/main" id="{23522FE7-5A29-4EF6-B1EF-2CA55748A772}"/>
+                <a16:creationId xmlns:a16="http://schemas.microsoft.com/office/drawing/2014/main" xmlns="" id="{23522FE7-5A29-4EF6-B1EF-2CA55748A772}"/>
               </a:ext>
               <a:ext uri="{C183D7F6-B498-43B3-948B-1728B52AA6E4}">
-                <adec:decorative xmlns:adec="http://schemas.microsoft.com/office/drawing/2017/decorative" val="1"/>
+                <adec:decorative xmlns:adec="http://schemas.microsoft.com/office/drawing/2017/decorative" xmlns="" val="1"/>
               </a:ext>
             </a:extLst>
           </p:cNvPr>
@@ -11201,7 +11201,7 @@
           <p:nvPr>
             <p:extLst>
               <p:ext uri="{386F3935-93C4-4BCD-93E2-E3B085C9AB24}">
-                <p16:designElem xmlns:p16="http://schemas.microsoft.com/office/powerpoint/2015/main" val="1"/>
+                <p16:designElem xmlns:p16="http://schemas.microsoft.com/office/powerpoint/2015/main" xmlns="" val="1"/>
               </p:ext>
             </p:extLst>
           </p:nvPr>
@@ -11254,10 +11254,10 @@
           <p:cNvPr id="9" name="Picture 8">
             <a:extLst>
               <a:ext uri="{FF2B5EF4-FFF2-40B4-BE49-F238E27FC236}">
-                <a16:creationId xmlns:a16="http://schemas.microsoft.com/office/drawing/2014/main" id="{C2192E09-EBC7-416C-B887-DFF915D7F43D}"/>
+                <a16:creationId xmlns:a16="http://schemas.microsoft.com/office/drawing/2014/main" xmlns="" id="{C2192E09-EBC7-416C-B887-DFF915D7F43D}"/>
               </a:ext>
               <a:ext uri="{C183D7F6-B498-43B3-948B-1728B52AA6E4}">
-                <adec:decorative xmlns:adec="http://schemas.microsoft.com/office/drawing/2017/decorative" val="1"/>
+                <adec:decorative xmlns:adec="http://schemas.microsoft.com/office/drawing/2017/decorative" xmlns="" val="1"/>
               </a:ext>
             </a:extLst>
           </p:cNvPr>
@@ -11267,7 +11267,7 @@
           <p:nvPr>
             <p:extLst>
               <p:ext uri="{386F3935-93C4-4BCD-93E2-E3B085C9AB24}">
-                <p16:designElem xmlns:p16="http://schemas.microsoft.com/office/powerpoint/2015/main" val="1"/>
+                <p16:designElem xmlns:p16="http://schemas.microsoft.com/office/powerpoint/2015/main" xmlns="" val="1"/>
               </p:ext>
             </p:extLst>
           </p:nvPr>
@@ -11298,10 +11298,10 @@
           <p:cNvPr id="11" name="Straight Connector 10">
             <a:extLst>
               <a:ext uri="{FF2B5EF4-FFF2-40B4-BE49-F238E27FC236}">
-                <a16:creationId xmlns:a16="http://schemas.microsoft.com/office/drawing/2014/main" id="{2924498D-E084-44BE-A196-CFCE35564350}"/>
+                <a16:creationId xmlns:a16="http://schemas.microsoft.com/office/drawing/2014/main" xmlns="" id="{2924498D-E084-44BE-A196-CFCE35564350}"/>
               </a:ext>
               <a:ext uri="{C183D7F6-B498-43B3-948B-1728B52AA6E4}">
-                <adec:decorative xmlns:adec="http://schemas.microsoft.com/office/drawing/2017/decorative" val="1"/>
+                <adec:decorative xmlns:adec="http://schemas.microsoft.com/office/drawing/2017/decorative" xmlns="" val="1"/>
               </a:ext>
             </a:extLst>
           </p:cNvPr>
@@ -11311,7 +11311,7 @@
           <p:nvPr>
             <p:extLst>
               <p:ext uri="{386F3935-93C4-4BCD-93E2-E3B085C9AB24}">
-                <p16:designElem xmlns:p16="http://schemas.microsoft.com/office/powerpoint/2015/main" val="1"/>
+                <p16:designElem xmlns:p16="http://schemas.microsoft.com/office/powerpoint/2015/main" xmlns="" val="1"/>
               </p:ext>
             </p:extLst>
           </p:nvPr>
@@ -11352,10 +11352,10 @@
           <p:cNvPr id="13" name="Straight Connector 12">
             <a:extLst>
               <a:ext uri="{FF2B5EF4-FFF2-40B4-BE49-F238E27FC236}">
-                <a16:creationId xmlns:a16="http://schemas.microsoft.com/office/drawing/2014/main" id="{3BBC7667-C352-4842-9AFD-E5C16AD002F4}"/>
+                <a16:creationId xmlns:a16="http://schemas.microsoft.com/office/drawing/2014/main" xmlns="" id="{3BBC7667-C352-4842-9AFD-E5C16AD002F4}"/>
               </a:ext>
               <a:ext uri="{C183D7F6-B498-43B3-948B-1728B52AA6E4}">
-                <adec:decorative xmlns:adec="http://schemas.microsoft.com/office/drawing/2017/decorative" val="1"/>
+                <adec:decorative xmlns:adec="http://schemas.microsoft.com/office/drawing/2017/decorative" xmlns="" val="1"/>
               </a:ext>
             </a:extLst>
           </p:cNvPr>
@@ -11365,7 +11365,7 @@
           <p:nvPr>
             <p:extLst>
               <p:ext uri="{386F3935-93C4-4BCD-93E2-E3B085C9AB24}">
-                <p16:designElem xmlns:p16="http://schemas.microsoft.com/office/powerpoint/2015/main" val="1"/>
+                <p16:designElem xmlns:p16="http://schemas.microsoft.com/office/powerpoint/2015/main" xmlns="" val="1"/>
               </p:ext>
             </p:extLst>
           </p:nvPr>
@@ -11400,10 +11400,10 @@
           <p:cNvPr id="15" name="Rectangle 14">
             <a:extLst>
               <a:ext uri="{FF2B5EF4-FFF2-40B4-BE49-F238E27FC236}">
-                <a16:creationId xmlns:a16="http://schemas.microsoft.com/office/drawing/2014/main" id="{F0AB17F6-592B-45CB-96F6-705C9825AFBC}"/>
+                <a16:creationId xmlns:a16="http://schemas.microsoft.com/office/drawing/2014/main" xmlns="" id="{F0AB17F6-592B-45CB-96F6-705C9825AFBC}"/>
               </a:ext>
               <a:ext uri="{C183D7F6-B498-43B3-948B-1728B52AA6E4}">
-                <adec:decorative xmlns:adec="http://schemas.microsoft.com/office/drawing/2017/decorative" val="1"/>
+                <adec:decorative xmlns:adec="http://schemas.microsoft.com/office/drawing/2017/decorative" xmlns="" val="1"/>
               </a:ext>
             </a:extLst>
           </p:cNvPr>
@@ -11413,7 +11413,7 @@
           <p:nvPr>
             <p:extLst>
               <p:ext uri="{386F3935-93C4-4BCD-93E2-E3B085C9AB24}">
-                <p16:designElem xmlns:p16="http://schemas.microsoft.com/office/powerpoint/2015/main" val="1"/>
+                <p16:designElem xmlns:p16="http://schemas.microsoft.com/office/powerpoint/2015/main" xmlns="" val="1"/>
               </p:ext>
             </p:extLst>
           </p:nvPr>
@@ -11460,7 +11460,7 @@
           <p:cNvPr id="2" name="Title 1">
             <a:extLst>
               <a:ext uri="{FF2B5EF4-FFF2-40B4-BE49-F238E27FC236}">
-                <a16:creationId xmlns:a16="http://schemas.microsoft.com/office/drawing/2014/main" id="{6FC29038-DDBC-4BFF-89F4-CE1EC9E6EEB3}"/>
+                <a16:creationId xmlns:a16="http://schemas.microsoft.com/office/drawing/2014/main" xmlns="" id="{6FC29038-DDBC-4BFF-89F4-CE1EC9E6EEB3}"/>
               </a:ext>
             </a:extLst>
           </p:cNvPr>
@@ -11507,10 +11507,10 @@
           <p:cNvPr id="17" name="Straight Connector 16">
             <a:extLst>
               <a:ext uri="{FF2B5EF4-FFF2-40B4-BE49-F238E27FC236}">
-                <a16:creationId xmlns:a16="http://schemas.microsoft.com/office/drawing/2014/main" id="{5A9284E7-0823-472D-9963-18D89DFEB8B4}"/>
+                <a16:creationId xmlns:a16="http://schemas.microsoft.com/office/drawing/2014/main" xmlns="" id="{5A9284E7-0823-472D-9963-18D89DFEB8B4}"/>
               </a:ext>
               <a:ext uri="{C183D7F6-B498-43B3-948B-1728B52AA6E4}">
-                <adec:decorative xmlns:adec="http://schemas.microsoft.com/office/drawing/2017/decorative" val="1"/>
+                <adec:decorative xmlns:adec="http://schemas.microsoft.com/office/drawing/2017/decorative" xmlns="" val="1"/>
               </a:ext>
             </a:extLst>
           </p:cNvPr>
@@ -11520,7 +11520,7 @@
           <p:nvPr>
             <p:extLst>
               <p:ext uri="{386F3935-93C4-4BCD-93E2-E3B085C9AB24}">
-                <p16:designElem xmlns:p16="http://schemas.microsoft.com/office/powerpoint/2015/main" val="1"/>
+                <p16:designElem xmlns:p16="http://schemas.microsoft.com/office/powerpoint/2015/main" xmlns="" val="1"/>
               </p:ext>
             </p:extLst>
           </p:nvPr>
@@ -11609,10 +11609,10 @@
           <p:cNvPr id="10" name="Rectangle 9">
             <a:extLst>
               <a:ext uri="{FF2B5EF4-FFF2-40B4-BE49-F238E27FC236}">
-                <a16:creationId xmlns:a16="http://schemas.microsoft.com/office/drawing/2014/main" id="{3193BA5C-B8F3-4972-BA54-014C48FAFA42}"/>
+                <a16:creationId xmlns:a16="http://schemas.microsoft.com/office/drawing/2014/main" xmlns="" id="{3193BA5C-B8F3-4972-BA54-014C48FAFA42}"/>
               </a:ext>
               <a:ext uri="{C183D7F6-B498-43B3-948B-1728B52AA6E4}">
-                <adec:decorative xmlns:adec="http://schemas.microsoft.com/office/drawing/2017/decorative" val="1"/>
+                <adec:decorative xmlns:adec="http://schemas.microsoft.com/office/drawing/2017/decorative" xmlns="" val="1"/>
               </a:ext>
             </a:extLst>
           </p:cNvPr>
@@ -11622,7 +11622,7 @@
           <p:nvPr>
             <p:extLst>
               <p:ext uri="{386F3935-93C4-4BCD-93E2-E3B085C9AB24}">
-                <p16:designElem xmlns:p16="http://schemas.microsoft.com/office/powerpoint/2015/main" val="1"/>
+                <p16:designElem xmlns:p16="http://schemas.microsoft.com/office/powerpoint/2015/main" xmlns="" val="1"/>
               </p:ext>
             </p:extLst>
           </p:nvPr>
@@ -11669,10 +11669,10 @@
           <p:cNvPr id="12" name="Straight Connector 11">
             <a:extLst>
               <a:ext uri="{FF2B5EF4-FFF2-40B4-BE49-F238E27FC236}">
-                <a16:creationId xmlns:a16="http://schemas.microsoft.com/office/drawing/2014/main" id="{D7162BAB-C25E-4CE9-B87C-F118DC7E7C22}"/>
+                <a16:creationId xmlns:a16="http://schemas.microsoft.com/office/drawing/2014/main" xmlns="" id="{D7162BAB-C25E-4CE9-B87C-F118DC7E7C22}"/>
               </a:ext>
               <a:ext uri="{C183D7F6-B498-43B3-948B-1728B52AA6E4}">
-                <adec:decorative xmlns:adec="http://schemas.microsoft.com/office/drawing/2017/decorative" val="1"/>
+                <adec:decorative xmlns:adec="http://schemas.microsoft.com/office/drawing/2017/decorative" xmlns="" val="1"/>
               </a:ext>
             </a:extLst>
           </p:cNvPr>
@@ -11682,7 +11682,7 @@
           <p:nvPr>
             <p:extLst>
               <p:ext uri="{386F3935-93C4-4BCD-93E2-E3B085C9AB24}">
-                <p16:designElem xmlns:p16="http://schemas.microsoft.com/office/powerpoint/2015/main" val="1"/>
+                <p16:designElem xmlns:p16="http://schemas.microsoft.com/office/powerpoint/2015/main" xmlns="" val="1"/>
               </p:ext>
             </p:extLst>
           </p:nvPr>
@@ -11717,7 +11717,7 @@
           <p:cNvPr id="2" name="Title 1">
             <a:extLst>
               <a:ext uri="{FF2B5EF4-FFF2-40B4-BE49-F238E27FC236}">
-                <a16:creationId xmlns:a16="http://schemas.microsoft.com/office/drawing/2014/main" id="{9C888BC2-5FB8-4A00-9D2C-ABE5250D796C}"/>
+                <a16:creationId xmlns:a16="http://schemas.microsoft.com/office/drawing/2014/main" xmlns="" id="{9C888BC2-5FB8-4A00-9D2C-ABE5250D796C}"/>
               </a:ext>
             </a:extLst>
           </p:cNvPr>
@@ -11759,10 +11759,10 @@
           <p:cNvPr id="14" name="Rectangle 13">
             <a:extLst>
               <a:ext uri="{FF2B5EF4-FFF2-40B4-BE49-F238E27FC236}">
-                <a16:creationId xmlns:a16="http://schemas.microsoft.com/office/drawing/2014/main" id="{05B93327-222A-4DAC-9163-371BF44CDB0C}"/>
+                <a16:creationId xmlns:a16="http://schemas.microsoft.com/office/drawing/2014/main" xmlns="" id="{05B93327-222A-4DAC-9163-371BF44CDB0C}"/>
               </a:ext>
               <a:ext uri="{C183D7F6-B498-43B3-948B-1728B52AA6E4}">
-                <adec:decorative xmlns:adec="http://schemas.microsoft.com/office/drawing/2017/decorative" val="1"/>
+                <adec:decorative xmlns:adec="http://schemas.microsoft.com/office/drawing/2017/decorative" xmlns="" val="1"/>
               </a:ext>
             </a:extLst>
           </p:cNvPr>
@@ -11772,7 +11772,7 @@
           <p:nvPr>
             <p:extLst>
               <p:ext uri="{386F3935-93C4-4BCD-93E2-E3B085C9AB24}">
-                <p16:designElem xmlns:p16="http://schemas.microsoft.com/office/powerpoint/2015/main" val="1"/>
+                <p16:designElem xmlns:p16="http://schemas.microsoft.com/office/powerpoint/2015/main" xmlns="" val="1"/>
               </p:ext>
             </p:extLst>
           </p:nvPr>
@@ -11833,7 +11833,7 @@
           <p:cNvPr id="3" name="Content Placeholder 2">
             <a:extLst>
               <a:ext uri="{FF2B5EF4-FFF2-40B4-BE49-F238E27FC236}">
-                <a16:creationId xmlns:a16="http://schemas.microsoft.com/office/drawing/2014/main" id="{9E6039AD-E8AC-4ACC-89A2-926D9DB406F5}"/>
+                <a16:creationId xmlns:a16="http://schemas.microsoft.com/office/drawing/2014/main" xmlns="" id="{9E6039AD-E8AC-4ACC-89A2-926D9DB406F5}"/>
               </a:ext>
             </a:extLst>
           </p:cNvPr>
@@ -11885,10 +11885,10 @@
           <p:cNvPr id="16" name="Group 15">
             <a:extLst>
               <a:ext uri="{FF2B5EF4-FFF2-40B4-BE49-F238E27FC236}">
-                <a16:creationId xmlns:a16="http://schemas.microsoft.com/office/drawing/2014/main" id="{14EE34E3-F117-4487-8ACF-33DA65FA11B3}"/>
+                <a16:creationId xmlns:a16="http://schemas.microsoft.com/office/drawing/2014/main" xmlns="" id="{14EE34E3-F117-4487-8ACF-33DA65FA11B3}"/>
               </a:ext>
               <a:ext uri="{C183D7F6-B498-43B3-948B-1728B52AA6E4}">
-                <adec:decorative xmlns:adec="http://schemas.microsoft.com/office/drawing/2017/decorative" val="1"/>
+                <adec:decorative xmlns:adec="http://schemas.microsoft.com/office/drawing/2017/decorative" xmlns="" val="1"/>
               </a:ext>
             </a:extLst>
           </p:cNvPr>
@@ -11898,7 +11898,7 @@
           <p:nvPr>
             <p:extLst>
               <p:ext uri="{386F3935-93C4-4BCD-93E2-E3B085C9AB24}">
-                <p16:designElem xmlns:p16="http://schemas.microsoft.com/office/powerpoint/2015/main" val="1"/>
+                <p16:designElem xmlns:p16="http://schemas.microsoft.com/office/powerpoint/2015/main" xmlns="" val="1"/>
               </p:ext>
             </p:extLst>
           </p:nvPr>
@@ -11916,10 +11916,10 @@
             <p:cNvPr id="17" name="Rectangle 16">
               <a:extLst>
                 <a:ext uri="{FF2B5EF4-FFF2-40B4-BE49-F238E27FC236}">
-                  <a16:creationId xmlns:a16="http://schemas.microsoft.com/office/drawing/2014/main" id="{39ACC02C-6424-4165-93C4-E83C8E81D462}"/>
+                  <a16:creationId xmlns:a16="http://schemas.microsoft.com/office/drawing/2014/main" xmlns="" id="{39ACC02C-6424-4165-93C4-E83C8E81D462}"/>
                 </a:ext>
                 <a:ext uri="{C183D7F6-B498-43B3-948B-1728B52AA6E4}">
-                  <adec:decorative xmlns:adec="http://schemas.microsoft.com/office/drawing/2017/decorative" val="1"/>
+                  <adec:decorative xmlns:adec="http://schemas.microsoft.com/office/drawing/2017/decorative" xmlns="" val="1"/>
                 </a:ext>
               </a:extLst>
             </p:cNvPr>
@@ -11927,7 +11927,7 @@
             <p:nvPr>
               <p:extLst>
                 <p:ext uri="{386F3935-93C4-4BCD-93E2-E3B085C9AB24}">
-                  <p16:designElem xmlns:p16="http://schemas.microsoft.com/office/powerpoint/2015/main" val="1"/>
+                  <p16:designElem xmlns:p16="http://schemas.microsoft.com/office/powerpoint/2015/main" xmlns="" val="1"/>
                 </p:ext>
               </p:extLst>
             </p:nvPr>
@@ -11997,10 +11997,10 @@
             <p:cNvPr id="18" name="Rectangle 17">
               <a:extLst>
                 <a:ext uri="{FF2B5EF4-FFF2-40B4-BE49-F238E27FC236}">
-                  <a16:creationId xmlns:a16="http://schemas.microsoft.com/office/drawing/2014/main" id="{C182CB9C-C978-4C9B-9AAD-8B1341897550}"/>
+                  <a16:creationId xmlns:a16="http://schemas.microsoft.com/office/drawing/2014/main" xmlns="" id="{C182CB9C-C978-4C9B-9AAD-8B1341897550}"/>
                 </a:ext>
                 <a:ext uri="{C183D7F6-B498-43B3-948B-1728B52AA6E4}">
-                  <adec:decorative xmlns:adec="http://schemas.microsoft.com/office/drawing/2017/decorative" val="1"/>
+                  <adec:decorative xmlns:adec="http://schemas.microsoft.com/office/drawing/2017/decorative" xmlns="" val="1"/>
                 </a:ext>
               </a:extLst>
             </p:cNvPr>
@@ -12008,7 +12008,7 @@
             <p:nvPr>
               <p:extLst>
                 <p:ext uri="{386F3935-93C4-4BCD-93E2-E3B085C9AB24}">
-                  <p16:designElem xmlns:p16="http://schemas.microsoft.com/office/powerpoint/2015/main" val="1"/>
+                  <p16:designElem xmlns:p16="http://schemas.microsoft.com/office/powerpoint/2015/main" xmlns="" val="1"/>
                 </p:ext>
               </p:extLst>
             </p:nvPr>
@@ -12082,10 +12082,10 @@
           <p:cNvPr id="20" name="Rectangle 19">
             <a:extLst>
               <a:ext uri="{FF2B5EF4-FFF2-40B4-BE49-F238E27FC236}">
-                <a16:creationId xmlns:a16="http://schemas.microsoft.com/office/drawing/2014/main" id="{56388820-A63D-463C-9DBC-060A5ABE33B6}"/>
+                <a16:creationId xmlns:a16="http://schemas.microsoft.com/office/drawing/2014/main" xmlns="" id="{56388820-A63D-463C-9DBC-060A5ABE33B6}"/>
               </a:ext>
               <a:ext uri="{C183D7F6-B498-43B3-948B-1728B52AA6E4}">
-                <adec:decorative xmlns:adec="http://schemas.microsoft.com/office/drawing/2017/decorative" val="1"/>
+                <adec:decorative xmlns:adec="http://schemas.microsoft.com/office/drawing/2017/decorative" xmlns="" val="1"/>
               </a:ext>
             </a:extLst>
           </p:cNvPr>
@@ -12095,7 +12095,7 @@
           <p:nvPr>
             <p:extLst>
               <p:ext uri="{386F3935-93C4-4BCD-93E2-E3B085C9AB24}">
-                <p16:designElem xmlns:p16="http://schemas.microsoft.com/office/powerpoint/2015/main" val="1"/>
+                <p16:designElem xmlns:p16="http://schemas.microsoft.com/office/powerpoint/2015/main" xmlns="" val="1"/>
               </p:ext>
             </p:extLst>
           </p:nvPr>
@@ -12147,7 +12147,7 @@
           <p:cNvPr id="5" name="Picture 4" descr="Chart, line chart&#10;&#10;Description automatically generated">
             <a:extLst>
               <a:ext uri="{FF2B5EF4-FFF2-40B4-BE49-F238E27FC236}">
-                <a16:creationId xmlns:a16="http://schemas.microsoft.com/office/drawing/2014/main" id="{EFB2BA66-CE5C-498F-99C7-457081A9781B}"/>
+                <a16:creationId xmlns:a16="http://schemas.microsoft.com/office/drawing/2014/main" xmlns="" id="{EFB2BA66-CE5C-498F-99C7-457081A9781B}"/>
               </a:ext>
             </a:extLst>
           </p:cNvPr>
@@ -12183,10 +12183,10 @@
           <p:cNvPr id="22" name="Picture 21">
             <a:extLst>
               <a:ext uri="{FF2B5EF4-FFF2-40B4-BE49-F238E27FC236}">
-                <a16:creationId xmlns:a16="http://schemas.microsoft.com/office/drawing/2014/main" id="{C04ED70F-D6FD-4EB1-A171-D30F885FE73E}"/>
+                <a16:creationId xmlns:a16="http://schemas.microsoft.com/office/drawing/2014/main" xmlns="" id="{C04ED70F-D6FD-4EB1-A171-D30F885FE73E}"/>
               </a:ext>
               <a:ext uri="{C183D7F6-B498-43B3-948B-1728B52AA6E4}">
-                <adec:decorative xmlns:adec="http://schemas.microsoft.com/office/drawing/2017/decorative" val="1"/>
+                <adec:decorative xmlns:adec="http://schemas.microsoft.com/office/drawing/2017/decorative" xmlns="" val="1"/>
               </a:ext>
             </a:extLst>
           </p:cNvPr>
@@ -12196,7 +12196,7 @@
           <p:nvPr>
             <p:extLst>
               <p:ext uri="{386F3935-93C4-4BCD-93E2-E3B085C9AB24}">
-                <p16:designElem xmlns:p16="http://schemas.microsoft.com/office/powerpoint/2015/main" val="1"/>
+                <p16:designElem xmlns:p16="http://schemas.microsoft.com/office/powerpoint/2015/main" xmlns="" val="1"/>
               </p:ext>
             </p:extLst>
           </p:nvPr>
@@ -12227,10 +12227,10 @@
           <p:cNvPr id="24" name="Straight Connector 23">
             <a:extLst>
               <a:ext uri="{FF2B5EF4-FFF2-40B4-BE49-F238E27FC236}">
-                <a16:creationId xmlns:a16="http://schemas.microsoft.com/office/drawing/2014/main" id="{DA26CAE9-74C4-4EDD-8A80-77F79EAA86F4}"/>
+                <a16:creationId xmlns:a16="http://schemas.microsoft.com/office/drawing/2014/main" xmlns="" id="{DA26CAE9-74C4-4EDD-8A80-77F79EAA86F4}"/>
               </a:ext>
               <a:ext uri="{C183D7F6-B498-43B3-948B-1728B52AA6E4}">
-                <adec:decorative xmlns:adec="http://schemas.microsoft.com/office/drawing/2017/decorative" val="1"/>
+                <adec:decorative xmlns:adec="http://schemas.microsoft.com/office/drawing/2017/decorative" xmlns="" val="1"/>
               </a:ext>
             </a:extLst>
           </p:cNvPr>
@@ -12240,7 +12240,7 @@
           <p:nvPr>
             <p:extLst>
               <p:ext uri="{386F3935-93C4-4BCD-93E2-E3B085C9AB24}">
-                <p16:designElem xmlns:p16="http://schemas.microsoft.com/office/powerpoint/2015/main" val="1"/>
+                <p16:designElem xmlns:p16="http://schemas.microsoft.com/office/powerpoint/2015/main" xmlns="" val="1"/>
               </p:ext>
             </p:extLst>
           </p:nvPr>
@@ -12335,10 +12335,10 @@
           <p:cNvPr id="23" name="Rectangle 12">
             <a:extLst>
               <a:ext uri="{FF2B5EF4-FFF2-40B4-BE49-F238E27FC236}">
-                <a16:creationId xmlns:a16="http://schemas.microsoft.com/office/drawing/2014/main" id="{EED2B910-B28F-4A54-B17C-8B7E5893AABB}"/>
+                <a16:creationId xmlns:a16="http://schemas.microsoft.com/office/drawing/2014/main" xmlns="" id="{EED2B910-B28F-4A54-B17C-8B7E5893AABB}"/>
               </a:ext>
               <a:ext uri="{C183D7F6-B498-43B3-948B-1728B52AA6E4}">
-                <adec:decorative xmlns:adec="http://schemas.microsoft.com/office/drawing/2017/decorative" val="1"/>
+                <adec:decorative xmlns:adec="http://schemas.microsoft.com/office/drawing/2017/decorative" xmlns="" val="1"/>
               </a:ext>
             </a:extLst>
           </p:cNvPr>
@@ -12348,7 +12348,7 @@
           <p:nvPr>
             <p:extLst>
               <p:ext uri="{386F3935-93C4-4BCD-93E2-E3B085C9AB24}">
-                <p16:designElem xmlns:p16="http://schemas.microsoft.com/office/powerpoint/2015/main" val="1"/>
+                <p16:designElem xmlns:p16="http://schemas.microsoft.com/office/powerpoint/2015/main" xmlns="" val="1"/>
               </p:ext>
             </p:extLst>
           </p:nvPr>
@@ -12395,10 +12395,10 @@
           <p:cNvPr id="24" name="Straight Connector 14">
             <a:extLst>
               <a:ext uri="{FF2B5EF4-FFF2-40B4-BE49-F238E27FC236}">
-                <a16:creationId xmlns:a16="http://schemas.microsoft.com/office/drawing/2014/main" id="{C545F118-1DF8-46A9-8A77-B3D9422CEA4A}"/>
+                <a16:creationId xmlns:a16="http://schemas.microsoft.com/office/drawing/2014/main" xmlns="" id="{C545F118-1DF8-46A9-8A77-B3D9422CEA4A}"/>
               </a:ext>
               <a:ext uri="{C183D7F6-B498-43B3-948B-1728B52AA6E4}">
-                <adec:decorative xmlns:adec="http://schemas.microsoft.com/office/drawing/2017/decorative" val="1"/>
+                <adec:decorative xmlns:adec="http://schemas.microsoft.com/office/drawing/2017/decorative" xmlns="" val="1"/>
               </a:ext>
             </a:extLst>
           </p:cNvPr>
@@ -12408,7 +12408,7 @@
           <p:nvPr>
             <p:extLst>
               <p:ext uri="{386F3935-93C4-4BCD-93E2-E3B085C9AB24}">
-                <p16:designElem xmlns:p16="http://schemas.microsoft.com/office/powerpoint/2015/main" val="1"/>
+                <p16:designElem xmlns:p16="http://schemas.microsoft.com/office/powerpoint/2015/main" xmlns="" val="1"/>
               </p:ext>
             </p:extLst>
           </p:nvPr>
@@ -12443,7 +12443,7 @@
           <p:cNvPr id="2" name="Title 1">
             <a:extLst>
               <a:ext uri="{FF2B5EF4-FFF2-40B4-BE49-F238E27FC236}">
-                <a16:creationId xmlns:a16="http://schemas.microsoft.com/office/drawing/2014/main" id="{9C888BC2-5FB8-4A00-9D2C-ABE5250D796C}"/>
+                <a16:creationId xmlns:a16="http://schemas.microsoft.com/office/drawing/2014/main" xmlns="" id="{9C888BC2-5FB8-4A00-9D2C-ABE5250D796C}"/>
               </a:ext>
             </a:extLst>
           </p:cNvPr>
@@ -12473,12 +12473,26 @@
               </a:rPr>
               <a:t>Social Media Fact Sheet – from Pew Research center</a:t>
             </a:r>
+            <a:r>
+              <a:rPr lang="en-US" sz="1500" b="1" i="0" dirty="0">
+                <a:effectLst/>
+                <a:latin typeface="abril-text"/>
+              </a:rPr>
+              <a:t/>
+            </a:r>
             <a:br>
               <a:rPr lang="en-US" sz="1500" b="1" i="0" dirty="0">
                 <a:effectLst/>
                 <a:latin typeface="abril-text"/>
               </a:rPr>
             </a:br>
+            <a:r>
+              <a:rPr lang="en-US" sz="1500" b="1" i="0" dirty="0">
+                <a:effectLst/>
+                <a:latin typeface="-apple-system"/>
+              </a:rPr>
+              <a:t/>
+            </a:r>
             <a:br>
               <a:rPr lang="en-US" sz="1500" b="1" i="0" dirty="0">
                 <a:effectLst/>
@@ -12494,10 +12508,10 @@
           <p:cNvPr id="25" name="Rectangle 16">
             <a:extLst>
               <a:ext uri="{FF2B5EF4-FFF2-40B4-BE49-F238E27FC236}">
-                <a16:creationId xmlns:a16="http://schemas.microsoft.com/office/drawing/2014/main" id="{7CAB7D27-148D-4082-B160-72FAD580D663}"/>
+                <a16:creationId xmlns:a16="http://schemas.microsoft.com/office/drawing/2014/main" xmlns="" id="{7CAB7D27-148D-4082-B160-72FAD580D663}"/>
               </a:ext>
               <a:ext uri="{C183D7F6-B498-43B3-948B-1728B52AA6E4}">
-                <adec:decorative xmlns:adec="http://schemas.microsoft.com/office/drawing/2017/decorative" val="1"/>
+                <adec:decorative xmlns:adec="http://schemas.microsoft.com/office/drawing/2017/decorative" xmlns="" val="1"/>
               </a:ext>
             </a:extLst>
           </p:cNvPr>
@@ -12507,7 +12521,7 @@
           <p:nvPr>
             <p:extLst>
               <p:ext uri="{386F3935-93C4-4BCD-93E2-E3B085C9AB24}">
-                <p16:designElem xmlns:p16="http://schemas.microsoft.com/office/powerpoint/2015/main" val="1"/>
+                <p16:designElem xmlns:p16="http://schemas.microsoft.com/office/powerpoint/2015/main" xmlns="" val="1"/>
               </p:ext>
             </p:extLst>
           </p:nvPr>
@@ -12568,7 +12582,7 @@
           <p:cNvPr id="6" name="Picture 5" descr="Chart, line chart&#10;&#10;Description automatically generated">
             <a:extLst>
               <a:ext uri="{FF2B5EF4-FFF2-40B4-BE49-F238E27FC236}">
-                <a16:creationId xmlns:a16="http://schemas.microsoft.com/office/drawing/2014/main" id="{BB35D74C-E7AE-4A1E-9B7D-C4DAA04B970D}"/>
+                <a16:creationId xmlns:a16="http://schemas.microsoft.com/office/drawing/2014/main" xmlns="" id="{BB35D74C-E7AE-4A1E-9B7D-C4DAA04B970D}"/>
               </a:ext>
             </a:extLst>
           </p:cNvPr>
@@ -12603,7 +12617,7 @@
           <p:cNvPr id="8" name="Picture 7" descr="Chart, line chart&#10;&#10;Description automatically generated">
             <a:extLst>
               <a:ext uri="{FF2B5EF4-FFF2-40B4-BE49-F238E27FC236}">
-                <a16:creationId xmlns:a16="http://schemas.microsoft.com/office/drawing/2014/main" id="{968B214E-5401-4E7B-B9A8-C9F24A157A5C}"/>
+                <a16:creationId xmlns:a16="http://schemas.microsoft.com/office/drawing/2014/main" xmlns="" id="{968B214E-5401-4E7B-B9A8-C9F24A157A5C}"/>
               </a:ext>
             </a:extLst>
           </p:cNvPr>
@@ -12638,7 +12652,7 @@
           <p:cNvPr id="3" name="Content Placeholder 2">
             <a:extLst>
               <a:ext uri="{FF2B5EF4-FFF2-40B4-BE49-F238E27FC236}">
-                <a16:creationId xmlns:a16="http://schemas.microsoft.com/office/drawing/2014/main" id="{9E6039AD-E8AC-4ACC-89A2-926D9DB406F5}"/>
+                <a16:creationId xmlns:a16="http://schemas.microsoft.com/office/drawing/2014/main" xmlns="" id="{9E6039AD-E8AC-4ACC-89A2-926D9DB406F5}"/>
               </a:ext>
             </a:extLst>
           </p:cNvPr>
@@ -12685,10 +12699,10 @@
           <p:cNvPr id="26" name="Picture 18">
             <a:extLst>
               <a:ext uri="{FF2B5EF4-FFF2-40B4-BE49-F238E27FC236}">
-                <a16:creationId xmlns:a16="http://schemas.microsoft.com/office/drawing/2014/main" id="{CD88FC76-F691-462A-BCF9-0BA4F5DE6D71}"/>
+                <a16:creationId xmlns:a16="http://schemas.microsoft.com/office/drawing/2014/main" xmlns="" id="{CD88FC76-F691-462A-BCF9-0BA4F5DE6D71}"/>
               </a:ext>
               <a:ext uri="{C183D7F6-B498-43B3-948B-1728B52AA6E4}">
-                <adec:decorative xmlns:adec="http://schemas.microsoft.com/office/drawing/2017/decorative" val="1"/>
+                <adec:decorative xmlns:adec="http://schemas.microsoft.com/office/drawing/2017/decorative" xmlns="" val="1"/>
               </a:ext>
             </a:extLst>
           </p:cNvPr>
@@ -12698,7 +12712,7 @@
           <p:nvPr>
             <p:extLst>
               <p:ext uri="{386F3935-93C4-4BCD-93E2-E3B085C9AB24}">
-                <p16:designElem xmlns:p16="http://schemas.microsoft.com/office/powerpoint/2015/main" val="1"/>
+                <p16:designElem xmlns:p16="http://schemas.microsoft.com/office/powerpoint/2015/main" xmlns="" val="1"/>
               </p:ext>
             </p:extLst>
           </p:nvPr>
@@ -12729,10 +12743,10 @@
           <p:cNvPr id="27" name="Straight Connector 20">
             <a:extLst>
               <a:ext uri="{FF2B5EF4-FFF2-40B4-BE49-F238E27FC236}">
-                <a16:creationId xmlns:a16="http://schemas.microsoft.com/office/drawing/2014/main" id="{33204A7E-B7E9-42D0-9DC4-B82FDC8C4BCC}"/>
+                <a16:creationId xmlns:a16="http://schemas.microsoft.com/office/drawing/2014/main" xmlns="" id="{33204A7E-B7E9-42D0-9DC4-B82FDC8C4BCC}"/>
               </a:ext>
               <a:ext uri="{C183D7F6-B498-43B3-948B-1728B52AA6E4}">
-                <adec:decorative xmlns:adec="http://schemas.microsoft.com/office/drawing/2017/decorative" val="1"/>
+                <adec:decorative xmlns:adec="http://schemas.microsoft.com/office/drawing/2017/decorative" xmlns="" val="1"/>
               </a:ext>
             </a:extLst>
           </p:cNvPr>
@@ -12742,7 +12756,7 @@
           <p:nvPr>
             <p:extLst>
               <p:ext uri="{386F3935-93C4-4BCD-93E2-E3B085C9AB24}">
-                <p16:designElem xmlns:p16="http://schemas.microsoft.com/office/powerpoint/2015/main" val="1"/>
+                <p16:designElem xmlns:p16="http://schemas.microsoft.com/office/powerpoint/2015/main" xmlns="" val="1"/>
               </p:ext>
             </p:extLst>
           </p:nvPr>
@@ -12837,10 +12851,10 @@
           <p:cNvPr id="7" name="Rectangle 6">
             <a:extLst>
               <a:ext uri="{FF2B5EF4-FFF2-40B4-BE49-F238E27FC236}">
-                <a16:creationId xmlns:a16="http://schemas.microsoft.com/office/drawing/2014/main" id="{23522FE7-5A29-4EF6-B1EF-2CA55748A772}"/>
+                <a16:creationId xmlns:a16="http://schemas.microsoft.com/office/drawing/2014/main" xmlns="" id="{23522FE7-5A29-4EF6-B1EF-2CA55748A772}"/>
               </a:ext>
               <a:ext uri="{C183D7F6-B498-43B3-948B-1728B52AA6E4}">
-                <adec:decorative xmlns:adec="http://schemas.microsoft.com/office/drawing/2017/decorative" val="1"/>
+                <adec:decorative xmlns:adec="http://schemas.microsoft.com/office/drawing/2017/decorative" xmlns="" val="1"/>
               </a:ext>
             </a:extLst>
           </p:cNvPr>
@@ -12850,7 +12864,7 @@
           <p:nvPr>
             <p:extLst>
               <p:ext uri="{386F3935-93C4-4BCD-93E2-E3B085C9AB24}">
-                <p16:designElem xmlns:p16="http://schemas.microsoft.com/office/powerpoint/2015/main" val="1"/>
+                <p16:designElem xmlns:p16="http://schemas.microsoft.com/office/powerpoint/2015/main" xmlns="" val="1"/>
               </p:ext>
             </p:extLst>
           </p:nvPr>
@@ -12903,10 +12917,10 @@
           <p:cNvPr id="9" name="Picture 8">
             <a:extLst>
               <a:ext uri="{FF2B5EF4-FFF2-40B4-BE49-F238E27FC236}">
-                <a16:creationId xmlns:a16="http://schemas.microsoft.com/office/drawing/2014/main" id="{C2192E09-EBC7-416C-B887-DFF915D7F43D}"/>
+                <a16:creationId xmlns:a16="http://schemas.microsoft.com/office/drawing/2014/main" xmlns="" id="{C2192E09-EBC7-416C-B887-DFF915D7F43D}"/>
               </a:ext>
               <a:ext uri="{C183D7F6-B498-43B3-948B-1728B52AA6E4}">
-                <adec:decorative xmlns:adec="http://schemas.microsoft.com/office/drawing/2017/decorative" val="1"/>
+                <adec:decorative xmlns:adec="http://schemas.microsoft.com/office/drawing/2017/decorative" xmlns="" val="1"/>
               </a:ext>
             </a:extLst>
           </p:cNvPr>
@@ -12916,7 +12930,7 @@
           <p:nvPr>
             <p:extLst>
               <p:ext uri="{386F3935-93C4-4BCD-93E2-E3B085C9AB24}">
-                <p16:designElem xmlns:p16="http://schemas.microsoft.com/office/powerpoint/2015/main" val="1"/>
+                <p16:designElem xmlns:p16="http://schemas.microsoft.com/office/powerpoint/2015/main" xmlns="" val="1"/>
               </p:ext>
             </p:extLst>
           </p:nvPr>
@@ -12947,10 +12961,10 @@
           <p:cNvPr id="11" name="Straight Connector 10">
             <a:extLst>
               <a:ext uri="{FF2B5EF4-FFF2-40B4-BE49-F238E27FC236}">
-                <a16:creationId xmlns:a16="http://schemas.microsoft.com/office/drawing/2014/main" id="{2924498D-E084-44BE-A196-CFCE35564350}"/>
+                <a16:creationId xmlns:a16="http://schemas.microsoft.com/office/drawing/2014/main" xmlns="" id="{2924498D-E084-44BE-A196-CFCE35564350}"/>
               </a:ext>
               <a:ext uri="{C183D7F6-B498-43B3-948B-1728B52AA6E4}">
-                <adec:decorative xmlns:adec="http://schemas.microsoft.com/office/drawing/2017/decorative" val="1"/>
+                <adec:decorative xmlns:adec="http://schemas.microsoft.com/office/drawing/2017/decorative" xmlns="" val="1"/>
               </a:ext>
             </a:extLst>
           </p:cNvPr>
@@ -12960,7 +12974,7 @@
           <p:nvPr>
             <p:extLst>
               <p:ext uri="{386F3935-93C4-4BCD-93E2-E3B085C9AB24}">
-                <p16:designElem xmlns:p16="http://schemas.microsoft.com/office/powerpoint/2015/main" val="1"/>
+                <p16:designElem xmlns:p16="http://schemas.microsoft.com/office/powerpoint/2015/main" xmlns="" val="1"/>
               </p:ext>
             </p:extLst>
           </p:nvPr>
@@ -13001,10 +13015,10 @@
           <p:cNvPr id="13" name="Straight Connector 12">
             <a:extLst>
               <a:ext uri="{FF2B5EF4-FFF2-40B4-BE49-F238E27FC236}">
-                <a16:creationId xmlns:a16="http://schemas.microsoft.com/office/drawing/2014/main" id="{3BBC7667-C352-4842-9AFD-E5C16AD002F4}"/>
+                <a16:creationId xmlns:a16="http://schemas.microsoft.com/office/drawing/2014/main" xmlns="" id="{3BBC7667-C352-4842-9AFD-E5C16AD002F4}"/>
               </a:ext>
               <a:ext uri="{C183D7F6-B498-43B3-948B-1728B52AA6E4}">
-                <adec:decorative xmlns:adec="http://schemas.microsoft.com/office/drawing/2017/decorative" val="1"/>
+                <adec:decorative xmlns:adec="http://schemas.microsoft.com/office/drawing/2017/decorative" xmlns="" val="1"/>
               </a:ext>
             </a:extLst>
           </p:cNvPr>
@@ -13014,7 +13028,7 @@
           <p:nvPr>
             <p:extLst>
               <p:ext uri="{386F3935-93C4-4BCD-93E2-E3B085C9AB24}">
-                <p16:designElem xmlns:p16="http://schemas.microsoft.com/office/powerpoint/2015/main" val="1"/>
+                <p16:designElem xmlns:p16="http://schemas.microsoft.com/office/powerpoint/2015/main" xmlns="" val="1"/>
               </p:ext>
             </p:extLst>
           </p:nvPr>
@@ -13049,10 +13063,10 @@
           <p:cNvPr id="15" name="Rectangle 14">
             <a:extLst>
               <a:ext uri="{FF2B5EF4-FFF2-40B4-BE49-F238E27FC236}">
-                <a16:creationId xmlns:a16="http://schemas.microsoft.com/office/drawing/2014/main" id="{F0AB17F6-592B-45CB-96F6-705C9825AFBC}"/>
+                <a16:creationId xmlns:a16="http://schemas.microsoft.com/office/drawing/2014/main" xmlns="" id="{F0AB17F6-592B-45CB-96F6-705C9825AFBC}"/>
               </a:ext>
               <a:ext uri="{C183D7F6-B498-43B3-948B-1728B52AA6E4}">
-                <adec:decorative xmlns:adec="http://schemas.microsoft.com/office/drawing/2017/decorative" val="1"/>
+                <adec:decorative xmlns:adec="http://schemas.microsoft.com/office/drawing/2017/decorative" xmlns="" val="1"/>
               </a:ext>
             </a:extLst>
           </p:cNvPr>
@@ -13062,7 +13076,7 @@
           <p:nvPr>
             <p:extLst>
               <p:ext uri="{386F3935-93C4-4BCD-93E2-E3B085C9AB24}">
-                <p16:designElem xmlns:p16="http://schemas.microsoft.com/office/powerpoint/2015/main" val="1"/>
+                <p16:designElem xmlns:p16="http://schemas.microsoft.com/office/powerpoint/2015/main" xmlns="" val="1"/>
               </p:ext>
             </p:extLst>
           </p:nvPr>
@@ -13109,7 +13123,7 @@
           <p:cNvPr id="2" name="Title 1">
             <a:extLst>
               <a:ext uri="{FF2B5EF4-FFF2-40B4-BE49-F238E27FC236}">
-                <a16:creationId xmlns:a16="http://schemas.microsoft.com/office/drawing/2014/main" id="{6FC29038-DDBC-4BFF-89F4-CE1EC9E6EEB3}"/>
+                <a16:creationId xmlns:a16="http://schemas.microsoft.com/office/drawing/2014/main" xmlns="" id="{6FC29038-DDBC-4BFF-89F4-CE1EC9E6EEB3}"/>
               </a:ext>
             </a:extLst>
           </p:cNvPr>
@@ -13149,10 +13163,10 @@
           <p:cNvPr id="17" name="Straight Connector 16">
             <a:extLst>
               <a:ext uri="{FF2B5EF4-FFF2-40B4-BE49-F238E27FC236}">
-                <a16:creationId xmlns:a16="http://schemas.microsoft.com/office/drawing/2014/main" id="{5A9284E7-0823-472D-9963-18D89DFEB8B4}"/>
+                <a16:creationId xmlns:a16="http://schemas.microsoft.com/office/drawing/2014/main" xmlns="" id="{5A9284E7-0823-472D-9963-18D89DFEB8B4}"/>
               </a:ext>
               <a:ext uri="{C183D7F6-B498-43B3-948B-1728B52AA6E4}">
-                <adec:decorative xmlns:adec="http://schemas.microsoft.com/office/drawing/2017/decorative" val="1"/>
+                <adec:decorative xmlns:adec="http://schemas.microsoft.com/office/drawing/2017/decorative" xmlns="" val="1"/>
               </a:ext>
             </a:extLst>
           </p:cNvPr>
@@ -13162,7 +13176,7 @@
           <p:nvPr>
             <p:extLst>
               <p:ext uri="{386F3935-93C4-4BCD-93E2-E3B085C9AB24}">
-                <p16:designElem xmlns:p16="http://schemas.microsoft.com/office/powerpoint/2015/main" val="1"/>
+                <p16:designElem xmlns:p16="http://schemas.microsoft.com/office/powerpoint/2015/main" xmlns="" val="1"/>
               </p:ext>
             </p:extLst>
           </p:nvPr>
@@ -13251,10 +13265,10 @@
           <p:cNvPr id="64" name="Rectangle 63">
             <a:extLst>
               <a:ext uri="{FF2B5EF4-FFF2-40B4-BE49-F238E27FC236}">
-                <a16:creationId xmlns:a16="http://schemas.microsoft.com/office/drawing/2014/main" id="{84C75E2B-CACA-478C-B26B-182AF87A18E3}"/>
+                <a16:creationId xmlns:a16="http://schemas.microsoft.com/office/drawing/2014/main" xmlns="" id="{84C75E2B-CACA-478C-B26B-182AF87A18E3}"/>
               </a:ext>
               <a:ext uri="{C183D7F6-B498-43B3-948B-1728B52AA6E4}">
-                <adec:decorative xmlns:adec="http://schemas.microsoft.com/office/drawing/2017/decorative" val="1"/>
+                <adec:decorative xmlns:adec="http://schemas.microsoft.com/office/drawing/2017/decorative" xmlns="" val="1"/>
               </a:ext>
             </a:extLst>
           </p:cNvPr>
@@ -13264,7 +13278,7 @@
           <p:nvPr>
             <p:extLst>
               <p:ext uri="{386F3935-93C4-4BCD-93E2-E3B085C9AB24}">
-                <p16:designElem xmlns:p16="http://schemas.microsoft.com/office/powerpoint/2015/main" val="1"/>
+                <p16:designElem xmlns:p16="http://schemas.microsoft.com/office/powerpoint/2015/main" xmlns="" val="1"/>
               </p:ext>
             </p:extLst>
           </p:nvPr>
@@ -13317,10 +13331,10 @@
           <p:cNvPr id="66" name="Picture 65">
             <a:extLst>
               <a:ext uri="{FF2B5EF4-FFF2-40B4-BE49-F238E27FC236}">
-                <a16:creationId xmlns:a16="http://schemas.microsoft.com/office/drawing/2014/main" id="{50FF2874-547C-4D14-9E18-28B19002FB8C}"/>
+                <a16:creationId xmlns:a16="http://schemas.microsoft.com/office/drawing/2014/main" xmlns="" id="{50FF2874-547C-4D14-9E18-28B19002FB8C}"/>
               </a:ext>
               <a:ext uri="{C183D7F6-B498-43B3-948B-1728B52AA6E4}">
-                <adec:decorative xmlns:adec="http://schemas.microsoft.com/office/drawing/2017/decorative" val="1"/>
+                <adec:decorative xmlns:adec="http://schemas.microsoft.com/office/drawing/2017/decorative" xmlns="" val="1"/>
               </a:ext>
             </a:extLst>
           </p:cNvPr>
@@ -13330,7 +13344,7 @@
           <p:nvPr>
             <p:extLst>
               <p:ext uri="{386F3935-93C4-4BCD-93E2-E3B085C9AB24}">
-                <p16:designElem xmlns:p16="http://schemas.microsoft.com/office/powerpoint/2015/main" val="1"/>
+                <p16:designElem xmlns:p16="http://schemas.microsoft.com/office/powerpoint/2015/main" xmlns="" val="1"/>
               </p:ext>
             </p:extLst>
           </p:nvPr>
@@ -13361,10 +13375,10 @@
           <p:cNvPr id="68" name="Straight Connector 67">
             <a:extLst>
               <a:ext uri="{FF2B5EF4-FFF2-40B4-BE49-F238E27FC236}">
-                <a16:creationId xmlns:a16="http://schemas.microsoft.com/office/drawing/2014/main" id="{36CF827D-A163-47F7-BD87-34EB4FA7D696}"/>
+                <a16:creationId xmlns:a16="http://schemas.microsoft.com/office/drawing/2014/main" xmlns="" id="{36CF827D-A163-47F7-BD87-34EB4FA7D696}"/>
               </a:ext>
               <a:ext uri="{C183D7F6-B498-43B3-948B-1728B52AA6E4}">
-                <adec:decorative xmlns:adec="http://schemas.microsoft.com/office/drawing/2017/decorative" val="1"/>
+                <adec:decorative xmlns:adec="http://schemas.microsoft.com/office/drawing/2017/decorative" xmlns="" val="1"/>
               </a:ext>
             </a:extLst>
           </p:cNvPr>
@@ -13374,7 +13388,7 @@
           <p:nvPr>
             <p:extLst>
               <p:ext uri="{386F3935-93C4-4BCD-93E2-E3B085C9AB24}">
-                <p16:designElem xmlns:p16="http://schemas.microsoft.com/office/powerpoint/2015/main" val="1"/>
+                <p16:designElem xmlns:p16="http://schemas.microsoft.com/office/powerpoint/2015/main" xmlns="" val="1"/>
               </p:ext>
             </p:extLst>
           </p:nvPr>
@@ -13415,10 +13429,10 @@
           <p:cNvPr id="70" name="Straight Connector 69">
             <a:extLst>
               <a:ext uri="{FF2B5EF4-FFF2-40B4-BE49-F238E27FC236}">
-                <a16:creationId xmlns:a16="http://schemas.microsoft.com/office/drawing/2014/main" id="{D299D9A9-1DA8-433D-A9BC-FB48D93D4217}"/>
+                <a16:creationId xmlns:a16="http://schemas.microsoft.com/office/drawing/2014/main" xmlns="" id="{D299D9A9-1DA8-433D-A9BC-FB48D93D4217}"/>
               </a:ext>
               <a:ext uri="{C183D7F6-B498-43B3-948B-1728B52AA6E4}">
-                <adec:decorative xmlns:adec="http://schemas.microsoft.com/office/drawing/2017/decorative" val="1"/>
+                <adec:decorative xmlns:adec="http://schemas.microsoft.com/office/drawing/2017/decorative" xmlns="" val="1"/>
               </a:ext>
             </a:extLst>
           </p:cNvPr>
@@ -13428,7 +13442,7 @@
           <p:nvPr>
             <p:extLst>
               <p:ext uri="{386F3935-93C4-4BCD-93E2-E3B085C9AB24}">
-                <p16:designElem xmlns:p16="http://schemas.microsoft.com/office/powerpoint/2015/main" val="1"/>
+                <p16:designElem xmlns:p16="http://schemas.microsoft.com/office/powerpoint/2015/main" xmlns="" val="1"/>
               </p:ext>
             </p:extLst>
           </p:nvPr>
@@ -13463,10 +13477,10 @@
           <p:cNvPr id="72" name="Rectangle 71">
             <a:extLst>
               <a:ext uri="{FF2B5EF4-FFF2-40B4-BE49-F238E27FC236}">
-                <a16:creationId xmlns:a16="http://schemas.microsoft.com/office/drawing/2014/main" id="{593D0D1F-C0CE-416A-883C-BF1E03F63B4B}"/>
+                <a16:creationId xmlns:a16="http://schemas.microsoft.com/office/drawing/2014/main" xmlns="" id="{593D0D1F-C0CE-416A-883C-BF1E03F63B4B}"/>
               </a:ext>
               <a:ext uri="{C183D7F6-B498-43B3-948B-1728B52AA6E4}">
-                <adec:decorative xmlns:adec="http://schemas.microsoft.com/office/drawing/2017/decorative" val="1"/>
+                <adec:decorative xmlns:adec="http://schemas.microsoft.com/office/drawing/2017/decorative" xmlns="" val="1"/>
               </a:ext>
             </a:extLst>
           </p:cNvPr>
@@ -13476,7 +13490,7 @@
           <p:nvPr>
             <p:extLst>
               <p:ext uri="{386F3935-93C4-4BCD-93E2-E3B085C9AB24}">
-                <p16:designElem xmlns:p16="http://schemas.microsoft.com/office/powerpoint/2015/main" val="1"/>
+                <p16:designElem xmlns:p16="http://schemas.microsoft.com/office/powerpoint/2015/main" xmlns="" val="1"/>
               </p:ext>
             </p:extLst>
           </p:nvPr>
@@ -13523,10 +13537,10 @@
           <p:cNvPr id="74" name="Rectangle 73">
             <a:extLst>
               <a:ext uri="{FF2B5EF4-FFF2-40B4-BE49-F238E27FC236}">
-                <a16:creationId xmlns:a16="http://schemas.microsoft.com/office/drawing/2014/main" id="{94BB6862-3393-46CC-9A80-E400B3206A09}"/>
+                <a16:creationId xmlns:a16="http://schemas.microsoft.com/office/drawing/2014/main" xmlns="" id="{94BB6862-3393-46CC-9A80-E400B3206A09}"/>
               </a:ext>
               <a:ext uri="{C183D7F6-B498-43B3-948B-1728B52AA6E4}">
-                <adec:decorative xmlns:adec="http://schemas.microsoft.com/office/drawing/2017/decorative" val="1"/>
+                <adec:decorative xmlns:adec="http://schemas.microsoft.com/office/drawing/2017/decorative" xmlns="" val="1"/>
               </a:ext>
             </a:extLst>
           </p:cNvPr>
@@ -13536,7 +13550,7 @@
           <p:nvPr>
             <p:extLst>
               <p:ext uri="{386F3935-93C4-4BCD-93E2-E3B085C9AB24}">
-                <p16:designElem xmlns:p16="http://schemas.microsoft.com/office/powerpoint/2015/main" val="1"/>
+                <p16:designElem xmlns:p16="http://schemas.microsoft.com/office/powerpoint/2015/main" xmlns="" val="1"/>
               </p:ext>
             </p:extLst>
           </p:nvPr>
@@ -13597,7 +13611,7 @@
           <p:cNvPr id="2" name="Title 1">
             <a:extLst>
               <a:ext uri="{FF2B5EF4-FFF2-40B4-BE49-F238E27FC236}">
-                <a16:creationId xmlns:a16="http://schemas.microsoft.com/office/drawing/2014/main" id="{9C888BC2-5FB8-4A00-9D2C-ABE5250D796C}"/>
+                <a16:creationId xmlns:a16="http://schemas.microsoft.com/office/drawing/2014/main" xmlns="" id="{9C888BC2-5FB8-4A00-9D2C-ABE5250D796C}"/>
               </a:ext>
             </a:extLst>
           </p:cNvPr>
@@ -13627,6 +13641,10 @@
             <a:br>
               <a:rPr lang="en-US" sz="2200"/>
             </a:br>
+            <a:r>
+              <a:rPr lang="en-US" sz="2200"/>
+              <a:t/>
+            </a:r>
             <a:br>
               <a:rPr lang="en-US" sz="2200"/>
             </a:br>
@@ -13639,10 +13657,10 @@
           <p:cNvPr id="76" name="Group 75">
             <a:extLst>
               <a:ext uri="{FF2B5EF4-FFF2-40B4-BE49-F238E27FC236}">
-                <a16:creationId xmlns:a16="http://schemas.microsoft.com/office/drawing/2014/main" id="{ECD36A4A-123D-46E3-8A64-13B8B3F019BD}"/>
+                <a16:creationId xmlns:a16="http://schemas.microsoft.com/office/drawing/2014/main" xmlns="" id="{ECD36A4A-123D-46E3-8A64-13B8B3F019BD}"/>
               </a:ext>
               <a:ext uri="{C183D7F6-B498-43B3-948B-1728B52AA6E4}">
-                <adec:decorative xmlns:adec="http://schemas.microsoft.com/office/drawing/2017/decorative" val="1"/>
+                <adec:decorative xmlns:adec="http://schemas.microsoft.com/office/drawing/2017/decorative" xmlns="" val="1"/>
               </a:ext>
             </a:extLst>
           </p:cNvPr>
@@ -13652,7 +13670,7 @@
           <p:nvPr>
             <p:extLst>
               <p:ext uri="{386F3935-93C4-4BCD-93E2-E3B085C9AB24}">
-                <p16:designElem xmlns:p16="http://schemas.microsoft.com/office/powerpoint/2015/main" val="1"/>
+                <p16:designElem xmlns:p16="http://schemas.microsoft.com/office/powerpoint/2015/main" xmlns="" val="1"/>
               </p:ext>
             </p:extLst>
           </p:nvPr>
@@ -13670,10 +13688,10 @@
             <p:cNvPr id="77" name="Rectangle 76">
               <a:extLst>
                 <a:ext uri="{FF2B5EF4-FFF2-40B4-BE49-F238E27FC236}">
-                  <a16:creationId xmlns:a16="http://schemas.microsoft.com/office/drawing/2014/main" id="{612E2361-DAF1-4420-BBBD-218F4138ED2F}"/>
+                  <a16:creationId xmlns:a16="http://schemas.microsoft.com/office/drawing/2014/main" xmlns="" id="{612E2361-DAF1-4420-BBBD-218F4138ED2F}"/>
                 </a:ext>
                 <a:ext uri="{C183D7F6-B498-43B3-948B-1728B52AA6E4}">
-                  <adec:decorative xmlns:adec="http://schemas.microsoft.com/office/drawing/2017/decorative" val="1"/>
+                  <adec:decorative xmlns:adec="http://schemas.microsoft.com/office/drawing/2017/decorative" xmlns="" val="1"/>
                 </a:ext>
               </a:extLst>
             </p:cNvPr>
@@ -13681,7 +13699,7 @@
             <p:nvPr>
               <p:extLst>
                 <p:ext uri="{386F3935-93C4-4BCD-93E2-E3B085C9AB24}">
-                  <p16:designElem xmlns:p16="http://schemas.microsoft.com/office/powerpoint/2015/main" val="1"/>
+                  <p16:designElem xmlns:p16="http://schemas.microsoft.com/office/powerpoint/2015/main" xmlns="" val="1"/>
                 </p:ext>
               </p:extLst>
             </p:nvPr>
@@ -13751,10 +13769,10 @@
             <p:cNvPr id="78" name="Rectangle 77">
               <a:extLst>
                 <a:ext uri="{FF2B5EF4-FFF2-40B4-BE49-F238E27FC236}">
-                  <a16:creationId xmlns:a16="http://schemas.microsoft.com/office/drawing/2014/main" id="{1D6F994B-14BC-49BA-B34D-17DF3069A404}"/>
+                  <a16:creationId xmlns:a16="http://schemas.microsoft.com/office/drawing/2014/main" xmlns="" id="{1D6F994B-14BC-49BA-B34D-17DF3069A404}"/>
                 </a:ext>
                 <a:ext uri="{C183D7F6-B498-43B3-948B-1728B52AA6E4}">
-                  <adec:decorative xmlns:adec="http://schemas.microsoft.com/office/drawing/2017/decorative" val="1"/>
+                  <adec:decorative xmlns:adec="http://schemas.microsoft.com/office/drawing/2017/decorative" xmlns="" val="1"/>
                 </a:ext>
               </a:extLst>
             </p:cNvPr>
@@ -13762,7 +13780,7 @@
             <p:nvPr>
               <p:extLst>
                 <p:ext uri="{386F3935-93C4-4BCD-93E2-E3B085C9AB24}">
-                  <p16:designElem xmlns:p16="http://schemas.microsoft.com/office/powerpoint/2015/main" val="1"/>
+                  <p16:designElem xmlns:p16="http://schemas.microsoft.com/office/powerpoint/2015/main" xmlns="" val="1"/>
                 </p:ext>
               </p:extLst>
             </p:nvPr>
@@ -13836,10 +13854,10 @@
           <p:cNvPr id="80" name="Picture 79">
             <a:extLst>
               <a:ext uri="{FF2B5EF4-FFF2-40B4-BE49-F238E27FC236}">
-                <a16:creationId xmlns:a16="http://schemas.microsoft.com/office/drawing/2014/main" id="{55EC7096-D0A6-471D-AE28-B68D70388E32}"/>
+                <a16:creationId xmlns:a16="http://schemas.microsoft.com/office/drawing/2014/main" xmlns="" id="{55EC7096-D0A6-471D-AE28-B68D70388E32}"/>
               </a:ext>
               <a:ext uri="{C183D7F6-B498-43B3-948B-1728B52AA6E4}">
-                <adec:decorative xmlns:adec="http://schemas.microsoft.com/office/drawing/2017/decorative" val="1"/>
+                <adec:decorative xmlns:adec="http://schemas.microsoft.com/office/drawing/2017/decorative" xmlns="" val="1"/>
               </a:ext>
             </a:extLst>
           </p:cNvPr>
@@ -13849,7 +13867,7 @@
           <p:nvPr>
             <p:extLst>
               <p:ext uri="{386F3935-93C4-4BCD-93E2-E3B085C9AB24}">
-                <p16:designElem xmlns:p16="http://schemas.microsoft.com/office/powerpoint/2015/main" val="1"/>
+                <p16:designElem xmlns:p16="http://schemas.microsoft.com/office/powerpoint/2015/main" xmlns="" val="1"/>
               </p:ext>
             </p:extLst>
           </p:nvPr>
@@ -13880,10 +13898,10 @@
           <p:cNvPr id="82" name="Straight Connector 81">
             <a:extLst>
               <a:ext uri="{FF2B5EF4-FFF2-40B4-BE49-F238E27FC236}">
-                <a16:creationId xmlns:a16="http://schemas.microsoft.com/office/drawing/2014/main" id="{2E98EB88-99B6-483D-B203-0D5D63100504}"/>
+                <a16:creationId xmlns:a16="http://schemas.microsoft.com/office/drawing/2014/main" xmlns="" id="{2E98EB88-99B6-483D-B203-0D5D63100504}"/>
               </a:ext>
               <a:ext uri="{C183D7F6-B498-43B3-948B-1728B52AA6E4}">
-                <adec:decorative xmlns:adec="http://schemas.microsoft.com/office/drawing/2017/decorative" val="1"/>
+                <adec:decorative xmlns:adec="http://schemas.microsoft.com/office/drawing/2017/decorative" xmlns="" val="1"/>
               </a:ext>
             </a:extLst>
           </p:cNvPr>
@@ -13893,7 +13911,7 @@
           <p:nvPr>
             <p:extLst>
               <p:ext uri="{386F3935-93C4-4BCD-93E2-E3B085C9AB24}">
-                <p16:designElem xmlns:p16="http://schemas.microsoft.com/office/powerpoint/2015/main" val="1"/>
+                <p16:designElem xmlns:p16="http://schemas.microsoft.com/office/powerpoint/2015/main" xmlns="" val="1"/>
               </p:ext>
             </p:extLst>
           </p:nvPr>
@@ -13934,7 +13952,7 @@
           <p:cNvPr id="7" name="Content Placeholder 6" descr="Graphical user interface, application, website&#10;&#10;Description automatically generated">
             <a:extLst>
               <a:ext uri="{FF2B5EF4-FFF2-40B4-BE49-F238E27FC236}">
-                <a16:creationId xmlns:a16="http://schemas.microsoft.com/office/drawing/2014/main" id="{7DD458F4-B6EB-4D33-90FE-EAF5AEB25C5C}"/>
+                <a16:creationId xmlns:a16="http://schemas.microsoft.com/office/drawing/2014/main" xmlns="" id="{7DD458F4-B6EB-4D33-90FE-EAF5AEB25C5C}"/>
               </a:ext>
             </a:extLst>
           </p:cNvPr>
@@ -13946,7 +13964,7 @@
           </p:nvPr>
         </p:nvPicPr>
         <p:blipFill>
-          <a:blip r:embed="rId3">
+          <a:blip r:embed="rId3" cstate="print">
             <a:extLst>
               <a:ext uri="{28A0092B-C50C-407E-A947-70E740481C1C}">
                 <a14:useLocalDpi xmlns:a14="http://schemas.microsoft.com/office/drawing/2010/main" val="0"/>
@@ -14224,7 +14242,7 @@
   <a:extraClrSchemeLst/>
   <a:extLst>
     <a:ext uri="{05A4C25C-085E-4340-85A3-A5531E510DB2}">
-      <thm15:themeFamily xmlns:thm15="http://schemas.microsoft.com/office/thememl/2012/main" name="Gallery" id="{BBFCD31E-59A1-489D-B089-A3EAD7CAE12E}" vid="{F5E91637-A7B6-4E27-B710-77DA7014EE1E}"/>
+      <thm15:themeFamily xmlns:thm15="http://schemas.microsoft.com/office/thememl/2012/main" xmlns="" name="Gallery" id="{BBFCD31E-59A1-489D-B089-A3EAD7CAE12E}" vid="{F5E91637-A7B6-4E27-B710-77DA7014EE1E}"/>
     </a:ext>
   </a:extLst>
 </a:theme>

</xml_diff>